<commit_message>
wording edits by Mirja
</commit_message>
<xml_diff>
--- a/review3-brussels/WP4-ReviewFinal.pptx
+++ b/review3-brussels/WP4-ReviewFinal.pptx
@@ -274,7 +274,7 @@
           <a:p>
             <a:fld id="{38AEA946-BE12-485E-8CED-EB49F79C0D9F}" type="datetimeFigureOut">
               <a:rPr lang="de-CH" smtClean="0"/>
-              <a:t>21.01.19</a:t>
+              <a:t>23.01.19</a:t>
             </a:fld>
             <a:endParaRPr lang="de-CH"/>
           </a:p>
@@ -340,7 +340,7 @@
           <a:p>
             <a:fld id="{AB7FCD5B-4957-4027-8017-EFFEE2DC5C01}" type="slidenum">
               <a:rPr lang="de-CH" smtClean="0"/>
-              <a:t>‹#›</a:t>
+              <a:t>‹Nr.›</a:t>
             </a:fld>
             <a:endParaRPr lang="de-CH"/>
           </a:p>
@@ -1413,7 +1413,7 @@
             <a:fld id="{CA36C8A0-BAEB-42C3-A2D9-B1F0D6FD294D}" type="slidenum">
               <a:rPr lang="de-CH" smtClean="0"/>
               <a:pPr/>
-              <a:t>‹#›</a:t>
+              <a:t>‹Nr.›</a:t>
             </a:fld>
             <a:endParaRPr lang="de-CH" dirty="0"/>
           </a:p>
@@ -2576,7 +2576,7 @@
             <a:fld id="{CA36C8A0-BAEB-42C3-A2D9-B1F0D6FD294D}" type="slidenum">
               <a:rPr lang="de-CH" smtClean="0"/>
               <a:pPr/>
-              <a:t>‹#›</a:t>
+              <a:t>‹Nr.›</a:t>
             </a:fld>
             <a:endParaRPr lang="de-CH" dirty="0"/>
           </a:p>
@@ -2988,7 +2988,7 @@
             <a:fld id="{CA36C8A0-BAEB-42C3-A2D9-B1F0D6FD294D}" type="slidenum">
               <a:rPr lang="de-CH" smtClean="0"/>
               <a:pPr/>
-              <a:t>‹#›</a:t>
+              <a:t>‹Nr.›</a:t>
             </a:fld>
             <a:endParaRPr lang="de-CH" dirty="0"/>
           </a:p>
@@ -3400,7 +3400,7 @@
             <a:fld id="{CA36C8A0-BAEB-42C3-A2D9-B1F0D6FD294D}" type="slidenum">
               <a:rPr lang="de-CH" smtClean="0"/>
               <a:pPr/>
-              <a:t>‹#›</a:t>
+              <a:t>‹Nr.›</a:t>
             </a:fld>
             <a:endParaRPr lang="de-CH" dirty="0"/>
           </a:p>
@@ -4955,7 +4955,7 @@
           </a:ln>
           <a:extLst>
             <a:ext uri="{C572A759-6A51-4108-AA02-DFA0A04FC94B}">
-              <ma14:wrappingTextBoxFlag xmlns:ma14="http://schemas.microsoft.com/office/mac/drawingml/2011/main" xmlns="" val="1"/>
+              <ma14:wrappingTextBoxFlag xmlns="" xmlns:ma14="http://schemas.microsoft.com/office/mac/drawingml/2011/main" val="1"/>
             </a:ext>
           </a:extLst>
         </p:spPr>
@@ -5077,7 +5077,7 @@
             <a:fld id="{CA36C8A0-BAEB-42C3-A2D9-B1F0D6FD294D}" type="slidenum">
               <a:rPr lang="de-CH" smtClean="0"/>
               <a:pPr/>
-              <a:t>‹#›</a:t>
+              <a:t>‹Nr.›</a:t>
             </a:fld>
             <a:endParaRPr lang="de-CH" dirty="0"/>
           </a:p>
@@ -5736,7 +5736,7 @@
         </p:spPr>
         <p:txBody>
           <a:bodyPr>
-            <a:normAutofit fontScale="92500" lnSpcReduction="20000"/>
+            <a:normAutofit fontScale="92500" lnSpcReduction="10000"/>
           </a:bodyPr>
           <a:lstStyle/>
           <a:p>
@@ -5778,7 +5778,7 @@
             <a:pPr lvl="1"/>
             <a:r>
               <a:rPr lang="en-GB" sz="2000" dirty="0"/>
-              <a:t>Different stakeholders: researchers, engineers</a:t>
+              <a:t>Different stakeholders: researchers, engineers, operators, OS and middlebox venders</a:t>
             </a:r>
           </a:p>
           <a:p>
@@ -5840,14 +5840,23 @@
             <a:pPr lvl="1"/>
             <a:r>
               <a:rPr lang="en-GB" sz="2000" dirty="0"/>
-              <a:t>At SIGCOMM 2018</a:t>
-            </a:r>
-          </a:p>
-          <a:p>
-            <a:pPr lvl="1"/>
+              <a:t>At SIGCOMM 2018 introducing MAMI tools (</a:t>
+            </a:r>
+            <a:r>
+              <a:rPr lang="en-GB" sz="2000" dirty="0" err="1"/>
+              <a:t>Tracebox</a:t>
+            </a:r>
             <a:r>
               <a:rPr lang="en-GB" sz="2000" dirty="0"/>
-              <a:t>Introducing MAMI tools</a:t>
+              <a:t>, </a:t>
+            </a:r>
+            <a:r>
+              <a:rPr lang="en-GB" sz="2000" dirty="0" err="1"/>
+              <a:t>PATHspider</a:t>
+            </a:r>
+            <a:r>
+              <a:rPr lang="en-GB" sz="2000" dirty="0"/>
+              <a:t> and the PTO)</a:t>
             </a:r>
           </a:p>
           <a:p>
@@ -6344,72 +6353,83 @@
         <p:spPr/>
         <p:txBody>
           <a:bodyPr>
-            <a:normAutofit fontScale="85000" lnSpcReduction="10000"/>
+            <a:normAutofit fontScale="92500" lnSpcReduction="10000"/>
           </a:bodyPr>
           <a:lstStyle/>
           <a:p>
             <a:r>
-              <a:rPr lang="en-GB"/>
+              <a:rPr lang="en-GB" dirty="0"/>
               <a:t>Introduction to the path-aware networking concept</a:t>
             </a:r>
           </a:p>
           <a:p>
             <a:pPr lvl="1"/>
             <a:r>
-              <a:rPr lang="en-GB"/>
+              <a:rPr lang="en-GB" dirty="0"/>
               <a:t>MPLS+SDN+NFV World Congress, Paris</a:t>
             </a:r>
           </a:p>
           <a:p>
             <a:pPr lvl="1"/>
             <a:r>
-              <a:rPr lang="en-GB"/>
+              <a:rPr lang="en-GB" dirty="0"/>
               <a:t>As a continuation of previous introductions to MAMI in other events</a:t>
             </a:r>
           </a:p>
           <a:p>
             <a:r>
-              <a:rPr lang="en-GB"/>
+              <a:rPr lang="en-GB" dirty="0"/>
               <a:t>Three whitepapers addressed to the networking industry</a:t>
             </a:r>
           </a:p>
           <a:p>
-            <a:r>
-              <a:rPr lang="en-GB" i="1"/>
+            <a:pPr lvl="1"/>
+            <a:r>
+              <a:rPr lang="en-GB" i="1" dirty="0"/>
               <a:t>Challenges in Network Management of Encrypted Traffic</a:t>
             </a:r>
           </a:p>
           <a:p>
+            <a:pPr lvl="2"/>
+            <a:r>
+              <a:rPr lang="en-GB" dirty="0"/>
+              <a:t>Conclusion of the Management and Measurement Summit</a:t>
+            </a:r>
+          </a:p>
+          <a:p>
             <a:pPr lvl="1"/>
             <a:r>
-              <a:rPr lang="en-GB"/>
-              <a:t>Conclusion of the Management and Measurement Summit</a:t>
-            </a:r>
-          </a:p>
-          <a:p>
-            <a:r>
-              <a:rPr lang="en-GB" i="1"/>
+              <a:rPr lang="en-GB" i="1" dirty="0"/>
               <a:t>Analysis and Consideration on Management of Encrypted Traffic </a:t>
             </a:r>
           </a:p>
           <a:p>
+            <a:pPr lvl="2"/>
+            <a:r>
+              <a:rPr lang="en-GB" dirty="0"/>
+              <a:t>Advocating the application of path-aware networking as a way for a more open and sustainable Internet </a:t>
+            </a:r>
+            <a:r>
+              <a:rPr lang="en-GB" dirty="0" err="1"/>
+              <a:t>environmen</a:t>
+            </a:r>
+            <a:r>
+              <a:rPr lang="en-GB" dirty="0"/>
+              <a:t> </a:t>
+            </a:r>
+            <a:endParaRPr lang="en-GB" i="1" dirty="0"/>
+          </a:p>
+          <a:p>
             <a:pPr lvl="1"/>
             <a:r>
-              <a:rPr lang="en-GB"/>
-              <a:t>Advocating the application of path-aware networking as a way for a more open and sustainable Internet environmen </a:t>
-            </a:r>
-            <a:endParaRPr lang="en-GB" i="1"/>
-          </a:p>
-          <a:p>
-            <a:r>
-              <a:rPr lang="en-GB" i="1"/>
+              <a:rPr lang="en-GB" i="1" dirty="0"/>
               <a:t>Security and Privacy Implications of Middlebox Cooperation Protocols </a:t>
             </a:r>
           </a:p>
           <a:p>
-            <a:pPr lvl="1"/>
-            <a:r>
-              <a:rPr lang="en-GB"/>
+            <a:pPr lvl="2"/>
+            <a:r>
+              <a:rPr lang="en-GB" dirty="0"/>
               <a:t>Middlebox cooperation can make a passive adversary's job easier, but it does not enable entirely new attacks.</a:t>
             </a:r>
           </a:p>
@@ -6516,107 +6536,139 @@
           <a:lstStyle/>
           <a:p>
             <a:r>
-              <a:rPr lang="en-GB"/>
-              <a:t>MAMI organization hosted on github.com</a:t>
-            </a:r>
+              <a:rPr lang="en-GB" dirty="0"/>
+              <a:t>MAMI organization hosted on </a:t>
+            </a:r>
+            <a:r>
+              <a:rPr lang="en-GB" dirty="0" err="1"/>
+              <a:t>github.com</a:t>
+            </a:r>
+            <a:endParaRPr lang="en-GB" dirty="0"/>
           </a:p>
           <a:p>
             <a:pPr lvl="1"/>
             <a:r>
-              <a:rPr lang="en-GB">
+              <a:rPr lang="en-GB" dirty="0">
                 <a:hlinkClick r:id="rId2"/>
               </a:rPr>
               <a:t>https://github.com/mamiproject</a:t>
             </a:r>
-            <a:endParaRPr lang="en-GB"/>
+            <a:endParaRPr lang="en-GB" dirty="0"/>
           </a:p>
           <a:p>
             <a:pPr lvl="1"/>
             <a:r>
-              <a:rPr lang="en-GB"/>
+              <a:rPr lang="en-GB" dirty="0"/>
               <a:t>Open-source software and public information created by the project</a:t>
             </a:r>
           </a:p>
           <a:p>
             <a:pPr lvl="1"/>
             <a:r>
-              <a:rPr lang="en-GB"/>
+              <a:rPr lang="en-GB" dirty="0"/>
               <a:t>45 active during this last period</a:t>
             </a:r>
           </a:p>
           <a:p>
             <a:pPr lvl="1"/>
             <a:r>
-              <a:rPr lang="en-GB"/>
+              <a:rPr lang="en-GB" dirty="0"/>
               <a:t>Several of them at </a:t>
             </a:r>
             <a:r>
-              <a:rPr lang="en-GB" i="1"/>
+              <a:rPr lang="en-GB" i="1" dirty="0"/>
               <a:t>wide external use </a:t>
             </a:r>
             <a:r>
-              <a:rPr lang="en-GB"/>
+              <a:rPr lang="en-GB" dirty="0"/>
               <a:t>(or more mature) level</a:t>
             </a:r>
           </a:p>
           <a:p>
             <a:r>
-              <a:rPr lang="en-GB"/>
-              <a:t>PATHspider releases already made available through software distribution systems</a:t>
+              <a:rPr lang="en-GB" dirty="0" err="1"/>
+              <a:t>PATHspider</a:t>
+            </a:r>
+            <a:r>
+              <a:rPr lang="en-GB" dirty="0"/>
+              <a:t> releases already made available through software distribution systems</a:t>
             </a:r>
           </a:p>
           <a:p>
             <a:pPr lvl="1"/>
             <a:r>
-              <a:rPr lang="en-GB"/>
-              <a:t>PATHspider releases up to the current 2.0.1 are available for installation from PyPI</a:t>
-            </a:r>
+              <a:rPr lang="en-GB" dirty="0" err="1"/>
+              <a:t>PATHspider</a:t>
+            </a:r>
+            <a:r>
+              <a:rPr lang="en-GB" dirty="0"/>
+              <a:t> releases up to the current 2.0.1 are available for installation from </a:t>
+            </a:r>
+            <a:r>
+              <a:rPr lang="en-GB" dirty="0" err="1"/>
+              <a:t>PyPI</a:t>
+            </a:r>
+            <a:endParaRPr lang="en-GB" dirty="0"/>
           </a:p>
           <a:p>
             <a:pPr lvl="1"/>
             <a:r>
-              <a:rPr lang="en-GB"/>
-              <a:t>PATHspider 1.0.1-1 is included in the latest stable version of the Debian operating system </a:t>
+              <a:rPr lang="en-GB" dirty="0" err="1"/>
+              <a:t>PATHspider</a:t>
+            </a:r>
+            <a:r>
+              <a:rPr lang="en-GB" dirty="0"/>
+              <a:t> 1.0.1-1 is included in the latest stable version of the Debian operating system </a:t>
             </a:r>
           </a:p>
           <a:p>
             <a:pPr lvl="1"/>
             <a:r>
-              <a:rPr lang="en-GB"/>
-              <a:t>These packages were published to the Debian Operating System with MAMI acknowledgement:</a:t>
+              <a:rPr lang="en-GB" dirty="0"/>
+              <a:t>Packages were published to the Debian Operating System with MAMI acknowledgement:</a:t>
             </a:r>
           </a:p>
           <a:p>
             <a:pPr lvl="2"/>
             <a:r>
-              <a:rPr lang="en-GB"/>
-              <a:t>python-libtrace </a:t>
-            </a:r>
+              <a:rPr lang="en-GB" dirty="0"/>
+              <a:t>python-</a:t>
+            </a:r>
+            <a:r>
+              <a:rPr lang="en-GB" dirty="0" err="1"/>
+              <a:t>libtrace</a:t>
+            </a:r>
+            <a:endParaRPr lang="en-GB" dirty="0"/>
           </a:p>
           <a:p>
             <a:pPr lvl="2"/>
             <a:r>
-              <a:rPr lang="en-GB"/>
+              <a:rPr lang="en-GB" dirty="0"/>
               <a:t>scapy3k </a:t>
             </a:r>
           </a:p>
           <a:p>
             <a:pPr lvl="2"/>
             <a:r>
-              <a:rPr lang="en-GB"/>
+              <a:rPr lang="en-GB" dirty="0" err="1"/>
               <a:t>scapy</a:t>
             </a:r>
+            <a:endParaRPr lang="en-GB" dirty="0"/>
           </a:p>
           <a:p>
             <a:pPr lvl="2"/>
             <a:r>
-              <a:rPr lang="en-GB"/>
-              <a:t>pycurl </a:t>
-            </a:r>
-          </a:p>
-          <a:p>
-            <a:r>
-              <a:rPr lang="en-GB"/>
+              <a:rPr lang="en-GB" dirty="0" err="1"/>
+              <a:t>pycurl</a:t>
+            </a:r>
+            <a:r>
+              <a:rPr lang="en-GB" dirty="0"/>
+              <a:t> </a:t>
+            </a:r>
+          </a:p>
+          <a:p>
+            <a:r>
+              <a:rPr lang="en-GB" dirty="0"/>
               <a:t>Regular participation in IETF Hackathons to socialise ideas and code related to MAMI activities</a:t>
             </a:r>
           </a:p>
@@ -7778,27 +7830,43 @@
         <p:spPr/>
         <p:txBody>
           <a:bodyPr>
-            <a:normAutofit lnSpcReduction="10000"/>
+            <a:normAutofit fontScale="92500" lnSpcReduction="20000"/>
           </a:bodyPr>
           <a:lstStyle/>
           <a:p>
             <a:r>
               <a:rPr lang="en-GB" sz="2400" dirty="0"/>
-              <a:t>Applicability of the PTO</a:t>
+              <a:t>Measurements of Path Transparency</a:t>
             </a:r>
           </a:p>
           <a:p>
             <a:pPr lvl="1"/>
             <a:r>
               <a:rPr lang="en-GB" sz="2000" dirty="0"/>
-              <a:t>Measurement collection</a:t>
+              <a:t>Measurement collection in the PTO supports data-enabled analyses by researcher and operators</a:t>
             </a:r>
           </a:p>
           <a:p>
             <a:pPr lvl="1"/>
             <a:r>
               <a:rPr lang="en-GB" sz="2000" dirty="0"/>
-              <a:t>Support data-enabled analyses</a:t>
+              <a:t>Open source tools such as </a:t>
+            </a:r>
+            <a:r>
+              <a:rPr lang="en-GB" sz="2000" dirty="0" err="1"/>
+              <a:t>PATHspider</a:t>
+            </a:r>
+            <a:r>
+              <a:rPr lang="en-GB" sz="2000" dirty="0"/>
+              <a:t> and </a:t>
+            </a:r>
+            <a:r>
+              <a:rPr lang="en-GB" sz="2000" dirty="0" err="1"/>
+              <a:t>tracebox</a:t>
+            </a:r>
+            <a:r>
+              <a:rPr lang="en-GB" sz="2000" dirty="0"/>
+              <a:t> available to research community beyond end of project</a:t>
             </a:r>
           </a:p>
           <a:p>
@@ -7811,14 +7879,38 @@
             <a:pPr lvl="1"/>
             <a:r>
               <a:rPr lang="en-GB" sz="2000" dirty="0"/>
-              <a:t>Essentially within the IETF</a:t>
+              <a:t>Essentially within the IETF, e.g. QUIC, </a:t>
+            </a:r>
+            <a:r>
+              <a:rPr lang="en-GB" sz="2000" dirty="0" err="1"/>
+              <a:t>tsvwg</a:t>
+            </a:r>
+            <a:r>
+              <a:rPr lang="en-GB" sz="2000" dirty="0"/>
+              <a:t>, taps, </a:t>
+            </a:r>
+            <a:r>
+              <a:rPr lang="en-GB" sz="2000" dirty="0" err="1"/>
+              <a:t>tcpm</a:t>
+            </a:r>
+            <a:r>
+              <a:rPr lang="en-GB" sz="2000" dirty="0"/>
+              <a:t>, 6man, acme, </a:t>
+            </a:r>
+            <a:r>
+              <a:rPr lang="en-GB" sz="2000" dirty="0" err="1"/>
+              <a:t>tls</a:t>
+            </a:r>
+            <a:r>
+              <a:rPr lang="en-GB" sz="2000" dirty="0"/>
+              <a:t>, …</a:t>
             </a:r>
           </a:p>
           <a:p>
             <a:pPr lvl="1"/>
             <a:r>
               <a:rPr lang="en-GB" sz="2000" dirty="0"/>
-              <a:t>And beyond</a:t>
+              <a:t>And beyond (GSMA, ETSI, ...)</a:t>
             </a:r>
           </a:p>
           <a:p>
@@ -7831,21 +7923,29 @@
             <a:pPr lvl="1"/>
             <a:r>
               <a:rPr lang="en-GB" sz="2000" dirty="0"/>
-              <a:t>Independent measurements, experiment repeatability, impairment analysis…</a:t>
+              <a:t>Scientific publications and organization of academic events, e.g. SIGCOMM RCM tutorial, MNM workshops, and MAMI summer school</a:t>
             </a:r>
           </a:p>
           <a:p>
             <a:pPr lvl="1"/>
             <a:r>
               <a:rPr lang="en-GB" sz="2000" dirty="0"/>
-              <a:t>Open source availability</a:t>
+              <a:t>Focus on standardization as well as participation and organization of industry events, e.g. M3S</a:t>
             </a:r>
           </a:p>
           <a:p>
             <a:pPr lvl="1"/>
             <a:r>
               <a:rPr lang="en-GB" sz="2000" dirty="0"/>
-              <a:t>Scientific publication and social media</a:t>
+              <a:t>Webpage incl. blog and white papers, social media, open sourcing on </a:t>
+            </a:r>
+            <a:r>
+              <a:rPr lang="en-GB" sz="2000" dirty="0" err="1"/>
+              <a:t>github</a:t>
+            </a:r>
+            <a:r>
+              <a:rPr lang="en-GB" sz="2000" dirty="0"/>
+              <a:t> and hackathon participation</a:t>
             </a:r>
           </a:p>
           <a:p>
@@ -7865,7 +7965,15 @@
             <a:pPr lvl="1"/>
             <a:r>
               <a:rPr lang="en-GB" sz="2000" dirty="0"/>
-              <a:t>Application of results</a:t>
+              <a:t>Application of results to </a:t>
+            </a:r>
+            <a:r>
+              <a:rPr lang="en-GB" sz="2000" dirty="0">
+                <a:solidFill>
+                  <a:srgbClr val="FF0000"/>
+                </a:solidFill>
+              </a:rPr>
+              <a:t>???</a:t>
             </a:r>
           </a:p>
           <a:p>
@@ -7984,7 +8092,7 @@
             <a:pPr lvl="1"/>
             <a:r>
               <a:rPr lang="en-GB" dirty="0"/>
-              <a:t>Focused on MCP and its ancillary support</a:t>
+              <a:t>Focused on middlebox cooperation schemes and its ancillary support</a:t>
             </a:r>
           </a:p>
           <a:p>
@@ -8057,7 +8165,7 @@
             <a:pPr lvl="1"/>
             <a:r>
               <a:rPr lang="en-GB" dirty="0"/>
-              <a:t>Visual and Internet identity: Website, social networking and general promotion material</a:t>
+              <a:t>Visual and Internet identity: Website/blog, social networking, and general promotion material</a:t>
             </a:r>
           </a:p>
           <a:p>
@@ -8343,8 +8451,8 @@
           <a:lstStyle/>
           <a:p>
             <a:r>
-              <a:rPr lang="en-GB"/>
-              <a:t>Standardisation Intents</a:t>
+              <a:rPr lang="en-GB" dirty="0"/>
+              <a:t>Standardisation Efforts at a glance</a:t>
             </a:r>
           </a:p>
         </p:txBody>
@@ -8368,7 +8476,7 @@
         <p:spPr/>
         <p:txBody>
           <a:bodyPr>
-            <a:normAutofit fontScale="92500" lnSpcReduction="20000"/>
+            <a:normAutofit fontScale="85000" lnSpcReduction="20000"/>
           </a:bodyPr>
           <a:lstStyle/>
           <a:p>
@@ -8381,7 +8489,23 @@
             <a:pPr lvl="1"/>
             <a:r>
               <a:rPr lang="en-GB" dirty="0"/>
-              <a:t>QUIC WG and other related activities</a:t>
+              <a:t>QUIC WG and other related activities (e.g. IAB </a:t>
+            </a:r>
+            <a:r>
+              <a:rPr lang="en-GB" dirty="0" err="1"/>
+              <a:t>StackEvo</a:t>
+            </a:r>
+            <a:r>
+              <a:rPr lang="en-GB" dirty="0"/>
+              <a:t> </a:t>
+            </a:r>
+            <a:r>
+              <a:rPr lang="en-GB" dirty="0" err="1"/>
+              <a:t>programm</a:t>
+            </a:r>
+            <a:r>
+              <a:rPr lang="en-GB" dirty="0"/>
+              <a:t>)</a:t>
             </a:r>
           </a:p>
           <a:p>
@@ -8394,8 +8518,13 @@
             <a:pPr lvl="1"/>
             <a:r>
               <a:rPr lang="en-GB" dirty="0"/>
-              <a:t>TAPS and TSVWG</a:t>
-            </a:r>
+              <a:t>TAPS, TSVWG, </a:t>
+            </a:r>
+            <a:r>
+              <a:rPr lang="en-GB" dirty="0" err="1"/>
+              <a:t>tcpm</a:t>
+            </a:r>
+            <a:endParaRPr lang="en-GB" dirty="0"/>
           </a:p>
           <a:p>
             <a:r>
@@ -8420,7 +8549,7 @@
             <a:pPr lvl="1"/>
             <a:r>
               <a:rPr lang="en-GB" dirty="0"/>
-              <a:t>Path Awareness (PANRG), Measure and Analysis (MAPRG), NFV (NFVRG)</a:t>
+              <a:t>PANRG (Path Aware Networking), MAPRG (Measure and Analysis for Protocols), NFVRG</a:t>
             </a:r>
           </a:p>
           <a:p>
@@ -8563,7 +8692,7 @@
         <p:spPr/>
         <p:txBody>
           <a:bodyPr>
-            <a:normAutofit fontScale="92500" lnSpcReduction="10000"/>
+            <a:normAutofit fontScale="85000" lnSpcReduction="20000"/>
           </a:bodyPr>
           <a:lstStyle/>
           <a:p>
@@ -8575,54 +8704,165 @@
           <a:p>
             <a:r>
               <a:rPr lang="en-GB" dirty="0"/>
-              <a:t>QUIC applicability document</a:t>
+              <a:t>QUIC applicability document (draft-</a:t>
+            </a:r>
+            <a:r>
+              <a:rPr lang="en-GB" dirty="0" err="1"/>
+              <a:t>ietf</a:t>
+            </a:r>
+            <a:r>
+              <a:rPr lang="en-GB" dirty="0"/>
+              <a:t>-</a:t>
+            </a:r>
+            <a:r>
+              <a:rPr lang="en-GB" dirty="0" err="1"/>
+              <a:t>quic</a:t>
+            </a:r>
+            <a:r>
+              <a:rPr lang="en-GB" dirty="0"/>
+              <a:t>-applicability)</a:t>
             </a:r>
           </a:p>
           <a:p>
             <a:pPr lvl="1"/>
             <a:r>
               <a:rPr lang="en-GB" dirty="0"/>
-              <a:t>Going beyond HTTP</a:t>
-            </a:r>
-          </a:p>
-          <a:p>
-            <a:r>
-              <a:rPr lang="en-GB" dirty="0"/>
-              <a:t>QUIC manageability document</a:t>
+              <a:t>Use of QUIC going beyond HTTP</a:t>
+            </a:r>
+          </a:p>
+          <a:p>
+            <a:r>
+              <a:rPr lang="en-GB" dirty="0"/>
+              <a:t>QUIC manageability document (draft-</a:t>
+            </a:r>
+            <a:r>
+              <a:rPr lang="en-GB" dirty="0" err="1"/>
+              <a:t>ietf</a:t>
+            </a:r>
+            <a:r>
+              <a:rPr lang="en-GB" dirty="0"/>
+              <a:t>-</a:t>
+            </a:r>
+            <a:r>
+              <a:rPr lang="en-GB" dirty="0" err="1"/>
+              <a:t>quic</a:t>
+            </a:r>
+            <a:r>
+              <a:rPr lang="en-GB" dirty="0"/>
+              <a:t>-manageability)</a:t>
             </a:r>
           </a:p>
           <a:p>
             <a:pPr lvl="1"/>
             <a:r>
               <a:rPr lang="en-GB" dirty="0"/>
-              <a:t>Provide a guide to the QUIC wire image</a:t>
-            </a:r>
-          </a:p>
-          <a:p>
-            <a:r>
-              <a:rPr lang="en-GB" dirty="0"/>
-              <a:t>The spin bit controversy</a:t>
-            </a:r>
+              <a:t>Provide a guide to network operators about the QUIC wire image</a:t>
+            </a:r>
+          </a:p>
+          <a:p>
+            <a:r>
+              <a:rPr lang="en-GB" dirty="0"/>
+              <a:t>The Spin Bit (draft-</a:t>
+            </a:r>
+            <a:r>
+              <a:rPr lang="en-GB" dirty="0" err="1"/>
+              <a:t>ietf</a:t>
+            </a:r>
+            <a:r>
+              <a:rPr lang="en-GB" dirty="0"/>
+              <a:t>-</a:t>
+            </a:r>
+            <a:r>
+              <a:rPr lang="en-GB" dirty="0" err="1"/>
+              <a:t>quic</a:t>
+            </a:r>
+            <a:r>
+              <a:rPr lang="en-GB" dirty="0"/>
+              <a:t>-transport and </a:t>
+            </a:r>
+            <a:r>
+              <a:rPr lang="de-DE" dirty="0" err="1"/>
+              <a:t>draft</a:t>
+            </a:r>
+            <a:r>
+              <a:rPr lang="de-DE" dirty="0"/>
+              <a:t>-</a:t>
+            </a:r>
+            <a:r>
+              <a:rPr lang="de-DE" dirty="0" err="1"/>
+              <a:t>ietf</a:t>
+            </a:r>
+            <a:r>
+              <a:rPr lang="de-DE" dirty="0"/>
+              <a:t>-</a:t>
+            </a:r>
+            <a:r>
+              <a:rPr lang="de-DE" dirty="0" err="1"/>
+              <a:t>quic</a:t>
+            </a:r>
+            <a:r>
+              <a:rPr lang="de-DE" dirty="0"/>
+              <a:t>-spin-</a:t>
+            </a:r>
+            <a:r>
+              <a:rPr lang="de-DE" dirty="0" err="1"/>
+              <a:t>exp</a:t>
+            </a:r>
+            <a:r>
+              <a:rPr lang="de-DE" dirty="0"/>
+              <a:t>)</a:t>
+            </a:r>
+            <a:endParaRPr lang="en-GB" dirty="0"/>
           </a:p>
           <a:p>
             <a:pPr lvl="1"/>
             <a:r>
               <a:rPr lang="en-GB" dirty="0"/>
-              <a:t>Support for independent measurability of round-trip times</a:t>
+              <a:t>Support for independent measurability of round-trip times added to QUIC transport spec</a:t>
             </a:r>
           </a:p>
           <a:p>
             <a:pPr lvl="1"/>
             <a:r>
               <a:rPr lang="en-GB" dirty="0"/>
-              <a:t>Addressing concerns on privacy</a:t>
-            </a:r>
-          </a:p>
-          <a:p>
-            <a:r>
-              <a:rPr lang="en-GB" dirty="0"/>
-              <a:t>IAB document on the wire image of a protocol</a:t>
-            </a:r>
+              <a:t>Addressing concerns on privacy lead to a long discussion reaching out in other part of the IETF and </a:t>
+            </a:r>
+            <a:r>
+              <a:rPr lang="en-GB" dirty="0" err="1"/>
+              <a:t>standardistion</a:t>
+            </a:r>
+            <a:endParaRPr lang="en-GB" dirty="0"/>
+          </a:p>
+          <a:p>
+            <a:r>
+              <a:rPr lang="en-GB" dirty="0"/>
+              <a:t>IAB document on the wire image of a protocol (</a:t>
+            </a:r>
+            <a:r>
+              <a:rPr lang="de-DE" dirty="0" err="1"/>
+              <a:t>draft</a:t>
+            </a:r>
+            <a:r>
+              <a:rPr lang="de-DE" dirty="0"/>
+              <a:t>-</a:t>
+            </a:r>
+            <a:r>
+              <a:rPr lang="de-DE" dirty="0" err="1"/>
+              <a:t>iab</a:t>
+            </a:r>
+            <a:r>
+              <a:rPr lang="de-DE" dirty="0"/>
+              <a:t>-</a:t>
+            </a:r>
+            <a:r>
+              <a:rPr lang="de-DE" dirty="0" err="1"/>
+              <a:t>wire</a:t>
+            </a:r>
+            <a:r>
+              <a:rPr lang="de-DE" dirty="0"/>
+              <a:t>-image)</a:t>
+            </a:r>
+            <a:endParaRPr lang="en-GB" dirty="0"/>
           </a:p>
           <a:p>
             <a:pPr lvl="1"/>
@@ -8747,7 +8987,7 @@
         <p:spPr/>
         <p:txBody>
           <a:bodyPr>
-            <a:normAutofit lnSpcReduction="10000"/>
+            <a:normAutofit fontScale="92500" lnSpcReduction="10000"/>
           </a:bodyPr>
           <a:lstStyle/>
           <a:p>
@@ -8760,21 +9000,53 @@
             <a:pPr lvl="1"/>
             <a:r>
               <a:rPr lang="en-GB" dirty="0"/>
-              <a:t>Service architecture</a:t>
+              <a:t>Service architecture (draft-</a:t>
+            </a:r>
+            <a:r>
+              <a:rPr lang="en-GB" dirty="0" err="1"/>
+              <a:t>ietf</a:t>
+            </a:r>
+            <a:r>
+              <a:rPr lang="en-GB" dirty="0"/>
+              <a:t>-taps-arch)</a:t>
             </a:r>
           </a:p>
           <a:p>
             <a:pPr lvl="1"/>
             <a:r>
               <a:rPr lang="en-GB" dirty="0"/>
-              <a:t>Abstract interface to the transport layer services</a:t>
+              <a:t>Abstract interface to the transport layer services (draft-</a:t>
+            </a:r>
+            <a:r>
+              <a:rPr lang="en-GB" dirty="0" err="1"/>
+              <a:t>ietf</a:t>
+            </a:r>
+            <a:r>
+              <a:rPr lang="en-GB" dirty="0"/>
+              <a:t>-taps-interface)</a:t>
             </a:r>
           </a:p>
           <a:p>
             <a:pPr lvl="1"/>
             <a:r>
               <a:rPr lang="en-GB" dirty="0"/>
-              <a:t>An implementation of this interface</a:t>
+              <a:t>An implementation guidance of this interface and underlying mechanisms (draft-</a:t>
+            </a:r>
+            <a:r>
+              <a:rPr lang="en-GB" dirty="0" err="1"/>
+              <a:t>ietf</a:t>
+            </a:r>
+            <a:r>
+              <a:rPr lang="en-GB" dirty="0"/>
+              <a:t>-taps-</a:t>
+            </a:r>
+            <a:r>
+              <a:rPr lang="en-GB" dirty="0" err="1"/>
+              <a:t>impl</a:t>
+            </a:r>
+            <a:r>
+              <a:rPr lang="en-GB" dirty="0"/>
+              <a:t>)</a:t>
             </a:r>
           </a:p>
           <a:p>
@@ -8794,21 +9066,85 @@
             <a:pPr lvl="1"/>
             <a:r>
               <a:rPr lang="en-GB" dirty="0"/>
-              <a:t>Transport encryption analysis</a:t>
+              <a:t>Transport encryption analysis (draft-</a:t>
+            </a:r>
+            <a:r>
+              <a:rPr lang="en-GB" dirty="0" err="1"/>
+              <a:t>ietf</a:t>
+            </a:r>
+            <a:r>
+              <a:rPr lang="en-GB" dirty="0"/>
+              <a:t>-</a:t>
+            </a:r>
+            <a:r>
+              <a:rPr lang="en-GB" dirty="0" err="1"/>
+              <a:t>tsvwg</a:t>
+            </a:r>
+            <a:r>
+              <a:rPr lang="en-GB" dirty="0"/>
+              <a:t>-transport-encrypt)</a:t>
             </a:r>
           </a:p>
           <a:p>
             <a:pPr lvl="1"/>
             <a:r>
               <a:rPr lang="en-GB" dirty="0"/>
-              <a:t>MTU discovery</a:t>
+              <a:t>MTU discovery (draft-</a:t>
+            </a:r>
+            <a:r>
+              <a:rPr lang="en-GB" dirty="0" err="1"/>
+              <a:t>ietf</a:t>
+            </a:r>
+            <a:r>
+              <a:rPr lang="en-GB" dirty="0"/>
+              <a:t>-</a:t>
+            </a:r>
+            <a:r>
+              <a:rPr lang="en-GB" dirty="0" err="1"/>
+              <a:t>tsvwg</a:t>
+            </a:r>
+            <a:r>
+              <a:rPr lang="en-GB" dirty="0"/>
+              <a:t>-datagram-</a:t>
+            </a:r>
+            <a:r>
+              <a:rPr lang="en-GB" dirty="0" err="1"/>
+              <a:t>plpmtud</a:t>
+            </a:r>
+            <a:r>
+              <a:rPr lang="en-GB" dirty="0"/>
+              <a:t>)</a:t>
             </a:r>
           </a:p>
           <a:p>
             <a:pPr lvl="1"/>
             <a:r>
               <a:rPr lang="en-GB" dirty="0"/>
-              <a:t>UDP options</a:t>
+              <a:t>UDP options (draft-</a:t>
+            </a:r>
+            <a:r>
+              <a:rPr lang="en-GB" dirty="0" err="1"/>
+              <a:t>fairhurst</a:t>
+            </a:r>
+            <a:r>
+              <a:rPr lang="en-GB" dirty="0"/>
+              <a:t>-</a:t>
+            </a:r>
+            <a:r>
+              <a:rPr lang="en-GB" dirty="0" err="1"/>
+              <a:t>udp</a:t>
+            </a:r>
+            <a:r>
+              <a:rPr lang="en-GB" dirty="0"/>
+              <a:t>-options-</a:t>
+            </a:r>
+            <a:r>
+              <a:rPr lang="en-GB" dirty="0" err="1"/>
+              <a:t>cco</a:t>
+            </a:r>
+            <a:r>
+              <a:rPr lang="en-GB" dirty="0"/>
+              <a:t>)</a:t>
             </a:r>
           </a:p>
           <a:p>
@@ -8823,7 +9159,23 @@
             </a:r>
             <a:r>
               <a:rPr lang="en-GB" dirty="0"/>
-              <a:t> issues</a:t>
+              <a:t> issues (draft-</a:t>
+            </a:r>
+            <a:r>
+              <a:rPr lang="en-GB" dirty="0" err="1"/>
+              <a:t>fossati</a:t>
+            </a:r>
+            <a:r>
+              <a:rPr lang="en-GB" dirty="0"/>
+              <a:t>-</a:t>
+            </a:r>
+            <a:r>
+              <a:rPr lang="en-GB" dirty="0" err="1"/>
+              <a:t>tsvwg-lola</a:t>
+            </a:r>
+            <a:r>
+              <a:rPr lang="en-GB" dirty="0"/>
+              <a:t>)</a:t>
             </a:r>
           </a:p>
           <a:p>
@@ -8940,73 +9292,91 @@
         <p:spPr/>
         <p:txBody>
           <a:bodyPr>
-            <a:normAutofit lnSpcReduction="10000"/>
+            <a:normAutofit/>
           </a:bodyPr>
           <a:lstStyle/>
           <a:p>
             <a:r>
-              <a:rPr lang="en-GB"/>
-              <a:t>The STAR protocol</a:t>
+              <a:rPr lang="en-GB" dirty="0"/>
+              <a:t>The STAR protocol (draft-</a:t>
+            </a:r>
+            <a:r>
+              <a:rPr lang="en-GB" dirty="0" err="1"/>
+              <a:t>ietf</a:t>
+            </a:r>
+            <a:r>
+              <a:rPr lang="en-GB" dirty="0"/>
+              <a:t>-acme-star)</a:t>
             </a:r>
           </a:p>
           <a:p>
             <a:pPr lvl="1"/>
             <a:r>
-              <a:rPr lang="en-GB"/>
+              <a:rPr lang="en-GB" dirty="0"/>
               <a:t>Extension to ACME certificate management mechanisms</a:t>
             </a:r>
           </a:p>
           <a:p>
             <a:pPr lvl="1"/>
             <a:r>
-              <a:rPr lang="en-GB"/>
+              <a:rPr lang="en-GB" dirty="0"/>
               <a:t>Supporting trust link delegation to unattended devices</a:t>
             </a:r>
           </a:p>
           <a:p>
             <a:pPr lvl="1"/>
             <a:r>
-              <a:rPr lang="en-GB"/>
+              <a:rPr lang="en-GB" dirty="0"/>
               <a:t>Full control by the delegating entity</a:t>
             </a:r>
           </a:p>
           <a:p>
             <a:r>
-              <a:rPr lang="en-GB"/>
-              <a:t>DTLS connection id</a:t>
+              <a:rPr lang="en-GB" dirty="0"/>
+              <a:t>DTLS connection id (draft-</a:t>
+            </a:r>
+            <a:r>
+              <a:rPr lang="en-GB" dirty="0" err="1"/>
+              <a:t>ietf</a:t>
+            </a:r>
+            <a:r>
+              <a:rPr lang="en-GB" dirty="0"/>
+              <a:t>-</a:t>
+            </a:r>
+            <a:r>
+              <a:rPr lang="en-GB" dirty="0" err="1"/>
+              <a:t>tls</a:t>
+            </a:r>
+            <a:r>
+              <a:rPr lang="en-GB" dirty="0"/>
+              <a:t>-</a:t>
+            </a:r>
+            <a:r>
+              <a:rPr lang="en-GB" dirty="0" err="1"/>
+              <a:t>dtls</a:t>
+            </a:r>
+            <a:r>
+              <a:rPr lang="en-GB" dirty="0"/>
+              <a:t>-connection-id)</a:t>
             </a:r>
           </a:p>
           <a:p>
             <a:pPr lvl="1"/>
             <a:r>
-              <a:rPr lang="en-GB"/>
+              <a:rPr lang="en-GB" dirty="0"/>
               <a:t>Improve security association selection</a:t>
             </a:r>
           </a:p>
           <a:p>
             <a:r>
-              <a:rPr lang="en-GB"/>
-              <a:t>The efforts for a ”middlebox security protocol”</a:t>
-            </a:r>
-          </a:p>
-          <a:p>
-            <a:pPr lvl="1"/>
-            <a:r>
-              <a:rPr lang="en-GB"/>
-              <a:t>ETSI TC-CYBER-0027-x</a:t>
-            </a:r>
-          </a:p>
-          <a:p>
-            <a:r>
-              <a:rPr lang="en-GB"/>
-              <a:t>Encrypted traffic inspection</a:t>
-            </a:r>
-          </a:p>
-          <a:p>
-            <a:pPr lvl="1"/>
-            <a:r>
-              <a:rPr lang="en-GB"/>
-              <a:t>IEEE ETI</a:t>
+              <a:rPr lang="en-GB" dirty="0"/>
+              <a:t>The efforts for a ”middlebox security protocol” (ETSI TC-CYBER-0027-x)</a:t>
+            </a:r>
+          </a:p>
+          <a:p>
+            <a:r>
+              <a:rPr lang="en-GB" dirty="0"/>
+              <a:t>Encrypted traffic inspection (IEEE ETI)</a:t>
             </a:r>
           </a:p>
         </p:txBody>
@@ -9157,7 +9527,7 @@
             <a:pPr lvl="1"/>
             <a:r>
               <a:rPr lang="en-GB" dirty="0"/>
-              <a:t>Trust links</a:t>
+              <a:t>Trusting links</a:t>
             </a:r>
           </a:p>
           <a:p>

</xml_diff>

<commit_message>
Align with Mirja's comments
</commit_message>
<xml_diff>
--- a/review3-brussels/WP4-ReviewFinal.pptx
+++ b/review3-brussels/WP4-ReviewFinal.pptx
@@ -20,12 +20,12 @@
     <p:sldId id="318" r:id="rId8"/>
     <p:sldId id="320" r:id="rId9"/>
     <p:sldId id="319" r:id="rId10"/>
-    <p:sldId id="308" r:id="rId11"/>
-    <p:sldId id="321" r:id="rId12"/>
-    <p:sldId id="310" r:id="rId13"/>
-    <p:sldId id="322" r:id="rId14"/>
-    <p:sldId id="312" r:id="rId15"/>
-    <p:sldId id="311" r:id="rId16"/>
+    <p:sldId id="321" r:id="rId11"/>
+    <p:sldId id="310" r:id="rId12"/>
+    <p:sldId id="322" r:id="rId13"/>
+    <p:sldId id="312" r:id="rId14"/>
+    <p:sldId id="308" r:id="rId15"/>
+    <p:sldId id="323" r:id="rId16"/>
     <p:sldId id="313" r:id="rId17"/>
     <p:sldId id="301" r:id="rId18"/>
   </p:sldIdLst>
@@ -340,7 +340,7 @@
           <a:p>
             <a:fld id="{AB7FCD5B-4957-4027-8017-EFFEE2DC5C01}" type="slidenum">
               <a:rPr lang="de-CH" smtClean="0"/>
-              <a:t>‹Nr.›</a:t>
+              <a:t>‹#›</a:t>
             </a:fld>
             <a:endParaRPr lang="de-CH"/>
           </a:p>
@@ -1413,7 +1413,7 @@
             <a:fld id="{CA36C8A0-BAEB-42C3-A2D9-B1F0D6FD294D}" type="slidenum">
               <a:rPr lang="de-CH" smtClean="0"/>
               <a:pPr/>
-              <a:t>‹Nr.›</a:t>
+              <a:t>‹#›</a:t>
             </a:fld>
             <a:endParaRPr lang="de-CH" dirty="0"/>
           </a:p>
@@ -2576,7 +2576,7 @@
             <a:fld id="{CA36C8A0-BAEB-42C3-A2D9-B1F0D6FD294D}" type="slidenum">
               <a:rPr lang="de-CH" smtClean="0"/>
               <a:pPr/>
-              <a:t>‹Nr.›</a:t>
+              <a:t>‹#›</a:t>
             </a:fld>
             <a:endParaRPr lang="de-CH" dirty="0"/>
           </a:p>
@@ -2988,7 +2988,7 @@
             <a:fld id="{CA36C8A0-BAEB-42C3-A2D9-B1F0D6FD294D}" type="slidenum">
               <a:rPr lang="de-CH" smtClean="0"/>
               <a:pPr/>
-              <a:t>‹Nr.›</a:t>
+              <a:t>‹#›</a:t>
             </a:fld>
             <a:endParaRPr lang="de-CH" dirty="0"/>
           </a:p>
@@ -3400,7 +3400,7 @@
             <a:fld id="{CA36C8A0-BAEB-42C3-A2D9-B1F0D6FD294D}" type="slidenum">
               <a:rPr lang="de-CH" smtClean="0"/>
               <a:pPr/>
-              <a:t>‹Nr.›</a:t>
+              <a:t>‹#›</a:t>
             </a:fld>
             <a:endParaRPr lang="de-CH" dirty="0"/>
           </a:p>
@@ -5077,7 +5077,7 @@
             <a:fld id="{CA36C8A0-BAEB-42C3-A2D9-B1F0D6FD294D}" type="slidenum">
               <a:rPr lang="de-CH" smtClean="0"/>
               <a:pPr/>
-              <a:t>‹Nr.›</a:t>
+              <a:t>‹#›</a:t>
             </a:fld>
             <a:endParaRPr lang="de-CH" dirty="0"/>
           </a:p>
@@ -5712,8 +5712,8 @@
           <a:lstStyle/>
           <a:p>
             <a:r>
-              <a:rPr lang="en-GB"/>
-              <a:t>Publications and Workshops </a:t>
+              <a:rPr lang="en-US" dirty="0"/>
+              <a:t>Direct Industrial Applications</a:t>
             </a:r>
           </a:p>
         </p:txBody>
@@ -5728,153 +5728,114 @@
             <p:ph type="body" sz="quarter" idx="13"/>
           </p:nvPr>
         </p:nvSpPr>
-        <p:spPr>
-          <a:xfrm>
-            <a:off x="460587" y="2750973"/>
-            <a:ext cx="12052881" cy="6230283"/>
-          </a:xfrm>
-        </p:spPr>
+        <p:spPr/>
         <p:txBody>
           <a:bodyPr>
-            <a:normAutofit fontScale="92500" lnSpcReduction="10000"/>
+            <a:normAutofit fontScale="92500"/>
           </a:bodyPr>
           <a:lstStyle/>
           <a:p>
             <a:r>
-              <a:rPr lang="en-GB" sz="2400" dirty="0"/>
-              <a:t>Sixteen different publications and conference participations</a:t>
+              <a:rPr lang="en-GB" dirty="0"/>
+              <a:t>Application of path-awareness principles</a:t>
             </a:r>
           </a:p>
           <a:p>
             <a:pPr lvl="1"/>
             <a:r>
-              <a:rPr lang="en-GB" sz="2000" dirty="0"/>
-              <a:t>IEEE Communications, INFOCOM, Internet Measurement Conference, </a:t>
-            </a:r>
-            <a:r>
-              <a:rPr lang="en-GB" sz="2000" dirty="0" err="1"/>
-              <a:t>Mobicom</a:t>
-            </a:r>
-            <a:r>
-              <a:rPr lang="en-GB" sz="2000" dirty="0"/>
-              <a:t>, ACM </a:t>
-            </a:r>
-            <a:r>
-              <a:rPr lang="en-GB" sz="2000" dirty="0" err="1"/>
-              <a:t>CoNEXT</a:t>
-            </a:r>
-            <a:r>
-              <a:rPr lang="en-GB" sz="2000" dirty="0"/>
-              <a:t> EPIQ, USENIX NSDI, GSMA Packet…</a:t>
-            </a:r>
-          </a:p>
-          <a:p>
-            <a:r>
-              <a:rPr lang="en-GB" sz="2400" dirty="0"/>
-              <a:t>The MAMI Management and Measurement Summit</a:t>
+              <a:rPr lang="en-GB" dirty="0"/>
+              <a:t>Enhanced cooperation with the mobile network in the </a:t>
+            </a:r>
+            <a:r>
+              <a:rPr lang="en-GB" dirty="0" err="1"/>
+              <a:t>Velocix</a:t>
+            </a:r>
+            <a:r>
+              <a:rPr lang="en-GB" dirty="0"/>
+              <a:t> product line</a:t>
+            </a:r>
+          </a:p>
+          <a:p>
+            <a:pPr lvl="2"/>
+            <a:r>
+              <a:rPr lang="en-GB" dirty="0"/>
+              <a:t>Better </a:t>
+            </a:r>
+            <a:r>
+              <a:rPr lang="en-GB" dirty="0" err="1"/>
+              <a:t>QoE</a:t>
+            </a:r>
+            <a:endParaRPr lang="en-GB" dirty="0"/>
+          </a:p>
+          <a:p>
+            <a:pPr lvl="2"/>
+            <a:r>
+              <a:rPr lang="en-GB" dirty="0"/>
+              <a:t>Expand the number of adaptation/personalisation functionality for OTT video delivery</a:t>
             </a:r>
           </a:p>
           <a:p>
             <a:pPr lvl="1"/>
             <a:r>
-              <a:rPr lang="en-GB" sz="2000" dirty="0"/>
-              <a:t>Different stakeholders: researchers, engineers, operators, OS and middlebox venders</a:t>
+              <a:rPr lang="en-GB" dirty="0"/>
+              <a:t>Deployment of NFV-enabled middleboxes</a:t>
+            </a:r>
+          </a:p>
+          <a:p>
+            <a:pPr lvl="2"/>
+            <a:r>
+              <a:rPr lang="en-GB" dirty="0"/>
+              <a:t>Home environments</a:t>
+            </a:r>
+          </a:p>
+          <a:p>
+            <a:pPr lvl="2"/>
+            <a:r>
+              <a:rPr lang="en-GB" dirty="0" err="1"/>
+              <a:t>vCPE</a:t>
+            </a:r>
+            <a:r>
+              <a:rPr lang="en-GB" dirty="0"/>
+              <a:t> and </a:t>
+            </a:r>
+            <a:r>
+              <a:rPr lang="en-GB" dirty="0" err="1"/>
+              <a:t>uCPE</a:t>
+            </a:r>
+            <a:r>
+              <a:rPr lang="en-GB" dirty="0"/>
+              <a:t> services</a:t>
+            </a:r>
+          </a:p>
+          <a:p>
+            <a:r>
+              <a:rPr lang="en-GB" dirty="0"/>
+              <a:t>Applications of the MAMI PTO and measurement data </a:t>
             </a:r>
           </a:p>
           <a:p>
             <a:pPr lvl="1"/>
             <a:r>
-              <a:rPr lang="en-GB" sz="2000" dirty="0"/>
-              <a:t>Challenges to network measurement and management by strong encryption, in breadth and depth</a:t>
-            </a:r>
-          </a:p>
-          <a:p>
-            <a:r>
-              <a:rPr lang="en-GB" sz="2400" dirty="0"/>
-              <a:t>The MAMI Summer School on Internet Path Transparency Measurements </a:t>
+              <a:rPr lang="en-GB" dirty="0"/>
+              <a:t>Trustworthy data sources to evaluate the impact of pervasive encryption</a:t>
             </a:r>
           </a:p>
           <a:p>
             <a:pPr lvl="1"/>
             <a:r>
-              <a:rPr lang="en-GB" sz="2000" dirty="0"/>
-              <a:t>Focused on the project tools: </a:t>
-            </a:r>
-            <a:r>
-              <a:rPr lang="en-GB" sz="2000" dirty="0" err="1"/>
-              <a:t>Tracebox</a:t>
-            </a:r>
-            <a:r>
-              <a:rPr lang="en-GB" sz="2000" dirty="0"/>
-              <a:t>, </a:t>
-            </a:r>
-            <a:r>
-              <a:rPr lang="en-GB" sz="2000" dirty="0" err="1"/>
-              <a:t>PATHspider</a:t>
-            </a:r>
-            <a:r>
-              <a:rPr lang="en-GB" sz="2000" dirty="0"/>
-              <a:t> and the PTO </a:t>
-            </a:r>
-          </a:p>
-          <a:p>
-            <a:r>
-              <a:rPr lang="en-GB" sz="2400" dirty="0"/>
-              <a:t>Second edition of the joint workshop with MONROE on Mobile Network Measurements </a:t>
+              <a:rPr lang="en-GB" dirty="0"/>
+              <a:t>Collaboration with the MONROE project for mobile Internet evidences</a:t>
             </a:r>
           </a:p>
           <a:p>
             <a:pPr lvl="1"/>
             <a:r>
-              <a:rPr lang="en-GB" sz="2000" dirty="0"/>
-              <a:t>WebRTC measurements, network QoS and mobile coverage, multipath and application performance </a:t>
-            </a:r>
-          </a:p>
-          <a:p>
-            <a:r>
-              <a:rPr lang="en-GB" sz="2400" dirty="0"/>
-              <a:t>Tutorial on Repeatability and Comparability in Measurement (RCM) </a:t>
-            </a:r>
-          </a:p>
-          <a:p>
-            <a:pPr lvl="1"/>
-            <a:r>
-              <a:rPr lang="en-GB" sz="2000" dirty="0"/>
-              <a:t>At SIGCOMM 2018 introducing MAMI tools (</a:t>
-            </a:r>
-            <a:r>
-              <a:rPr lang="en-GB" sz="2000" dirty="0" err="1"/>
-              <a:t>Tracebox</a:t>
-            </a:r>
-            <a:r>
-              <a:rPr lang="en-GB" sz="2000" dirty="0"/>
-              <a:t>, </a:t>
-            </a:r>
-            <a:r>
-              <a:rPr lang="en-GB" sz="2000" dirty="0" err="1"/>
-              <a:t>PATHspider</a:t>
-            </a:r>
-            <a:r>
-              <a:rPr lang="en-GB" sz="2000" dirty="0"/>
-              <a:t> and the PTO)</a:t>
-            </a:r>
-          </a:p>
-          <a:p>
-            <a:r>
-              <a:rPr lang="en-GB" sz="2400" dirty="0" err="1"/>
-              <a:t>PATHspider</a:t>
-            </a:r>
-            <a:r>
-              <a:rPr lang="en-GB" sz="2400" dirty="0"/>
-              <a:t> hackathon</a:t>
-            </a:r>
-          </a:p>
-          <a:p>
-            <a:pPr lvl="1"/>
-            <a:r>
-              <a:rPr lang="en-GB" sz="2000" dirty="0"/>
-              <a:t>Jointly with the OONI (Open Observatory of Network Interference) project</a:t>
-            </a:r>
+              <a:rPr lang="en-GB" dirty="0"/>
+              <a:t>Application of the QUIC spin bit to measurement systems</a:t>
+            </a:r>
+          </a:p>
+          <a:p>
+            <a:endParaRPr lang="en-GB" dirty="0"/>
           </a:p>
         </p:txBody>
       </p:sp>
@@ -5894,18 +5855,18 @@
           <a:lstStyle/>
           <a:p>
             <a:fld id="{CA36C8A0-BAEB-42C3-A2D9-B1F0D6FD294D}" type="slidenum">
-              <a:rPr lang="en-GB" smtClean="0"/>
+              <a:rPr lang="en-US" smtClean="0"/>
               <a:pPr/>
               <a:t>10</a:t>
             </a:fld>
-            <a:endParaRPr lang="en-GB" dirty="0"/>
+            <a:endParaRPr lang="en-US"/>
           </a:p>
         </p:txBody>
       </p:sp>
     </p:spTree>
     <p:extLst>
       <p:ext uri="{BB962C8B-B14F-4D97-AF65-F5344CB8AC3E}">
-        <p14:creationId xmlns:p14="http://schemas.microsoft.com/office/powerpoint/2010/main" val="1690679360"/>
+        <p14:creationId xmlns:p14="http://schemas.microsoft.com/office/powerpoint/2010/main" val="4104428027"/>
       </p:ext>
     </p:extLst>
   </p:cSld>
@@ -5949,8 +5910,8 @@
           <a:lstStyle/>
           <a:p>
             <a:r>
-              <a:rPr lang="en-US" dirty="0"/>
-              <a:t>Direct Industrial Applications</a:t>
+              <a:rPr lang="en-GB" dirty="0"/>
+              <a:t>Additional Industrial Applications</a:t>
             </a:r>
           </a:p>
         </p:txBody>
@@ -5973,106 +5934,83 @@
           <a:lstStyle/>
           <a:p>
             <a:r>
-              <a:rPr lang="en-GB" dirty="0"/>
-              <a:t>Application of path-awareness principles</a:t>
+              <a:rPr lang="en-US" dirty="0"/>
+              <a:t>STAR-based trust link management</a:t>
             </a:r>
           </a:p>
           <a:p>
             <a:pPr lvl="1"/>
             <a:r>
-              <a:rPr lang="en-GB" dirty="0"/>
-              <a:t>Enhanced cooperation with the mobile network in the </a:t>
-            </a:r>
-            <a:r>
-              <a:rPr lang="en-GB" dirty="0" err="1"/>
-              <a:t>Velocix</a:t>
-            </a:r>
-            <a:r>
-              <a:rPr lang="en-GB" dirty="0"/>
-              <a:t> product line</a:t>
-            </a:r>
-          </a:p>
-          <a:p>
-            <a:pPr lvl="2"/>
-            <a:r>
-              <a:rPr lang="en-GB" dirty="0"/>
-              <a:t>Better </a:t>
-            </a:r>
-            <a:r>
-              <a:rPr lang="en-GB" dirty="0" err="1"/>
-              <a:t>QoE</a:t>
+              <a:rPr lang="en-US" dirty="0"/>
+              <a:t>Encrypted traffic negotiation at edge locations in CDN and </a:t>
+            </a:r>
+            <a:r>
+              <a:rPr lang="en-US" dirty="0" err="1"/>
+              <a:t>mABR</a:t>
+            </a:r>
+            <a:r>
+              <a:rPr lang="en-US" dirty="0"/>
+              <a:t> systems </a:t>
+            </a:r>
+          </a:p>
+          <a:p>
+            <a:pPr lvl="1"/>
+            <a:r>
+              <a:rPr lang="en-US" dirty="0"/>
+              <a:t>Secure browsing</a:t>
+            </a:r>
+          </a:p>
+          <a:p>
+            <a:pPr lvl="1"/>
+            <a:r>
+              <a:rPr lang="en-US" dirty="0"/>
+              <a:t>NFV deployments</a:t>
+            </a:r>
+          </a:p>
+          <a:p>
+            <a:r>
+              <a:rPr lang="en-US" dirty="0"/>
+              <a:t>DTLS connection identifier</a:t>
+            </a:r>
+          </a:p>
+          <a:p>
+            <a:pPr lvl="1"/>
+            <a:r>
+              <a:rPr lang="en-US" dirty="0"/>
+              <a:t>IMPACT IoT product line</a:t>
+            </a:r>
+          </a:p>
+          <a:p>
+            <a:r>
+              <a:rPr lang="en-US" dirty="0"/>
+              <a:t>NFV-enabled experimentation </a:t>
+            </a:r>
+          </a:p>
+          <a:p>
+            <a:pPr lvl="1"/>
+            <a:r>
+              <a:rPr lang="en-US" dirty="0"/>
+              <a:t>Repeatability for evaluation and demonstration purposes</a:t>
+            </a:r>
+          </a:p>
+          <a:p>
+            <a:pPr lvl="1"/>
+            <a:r>
+              <a:rPr lang="en-US" dirty="0"/>
+              <a:t>Application of the </a:t>
+            </a:r>
+            <a:r>
+              <a:rPr lang="en-US" i="1" dirty="0" err="1"/>
+              <a:t>Trafic</a:t>
+            </a:r>
+            <a:r>
+              <a:rPr lang="en-US" dirty="0"/>
+              <a:t> tool, leveraging 5TONIC and the 5GINFIRE project</a:t>
             </a:r>
             <a:endParaRPr lang="en-GB" dirty="0"/>
           </a:p>
           <a:p>
-            <a:pPr lvl="2"/>
-            <a:r>
-              <a:rPr lang="en-GB" dirty="0"/>
-              <a:t>Expand the number of adaptation/personalisation functionality for OTT video delivery</a:t>
-            </a:r>
-          </a:p>
-          <a:p>
-            <a:pPr lvl="1"/>
-            <a:r>
-              <a:rPr lang="en-GB" dirty="0"/>
-              <a:t>Deployment of NFV-enabled middleboxes</a:t>
-            </a:r>
-          </a:p>
-          <a:p>
-            <a:pPr lvl="2"/>
-            <a:r>
-              <a:rPr lang="en-GB" dirty="0"/>
-              <a:t>Home environments</a:t>
-            </a:r>
-          </a:p>
-          <a:p>
-            <a:pPr lvl="2"/>
-            <a:r>
-              <a:rPr lang="en-GB" dirty="0" err="1"/>
-              <a:t>vCPE</a:t>
-            </a:r>
-            <a:r>
-              <a:rPr lang="en-GB" dirty="0"/>
-              <a:t> and </a:t>
-            </a:r>
-            <a:r>
-              <a:rPr lang="en-GB" dirty="0" err="1"/>
-              <a:t>uCPE</a:t>
-            </a:r>
-            <a:r>
-              <a:rPr lang="en-GB" dirty="0"/>
-              <a:t> services</a:t>
-            </a:r>
-          </a:p>
-          <a:p>
-            <a:r>
-              <a:rPr lang="en-GB" dirty="0"/>
-              <a:t>Applications of the MAMI PTO and measurement data </a:t>
-            </a:r>
-          </a:p>
-          <a:p>
-            <a:pPr lvl="1"/>
-            <a:r>
-              <a:rPr lang="en-GB" dirty="0"/>
-              <a:t>Trustworthy data sources to evaluate the impact of pervasive encryption</a:t>
-            </a:r>
-          </a:p>
-          <a:p>
-            <a:pPr lvl="1"/>
-            <a:r>
-              <a:rPr lang="en-GB" dirty="0"/>
-              <a:t>Collaboration with the MONROE project for mobile Internet evidences</a:t>
-            </a:r>
-          </a:p>
-          <a:p>
-            <a:pPr lvl="1"/>
-            <a:r>
-              <a:rPr lang="en-GB" dirty="0"/>
-              <a:t>Application of the QUIC spin bit to measurement systems</a:t>
-            </a:r>
-          </a:p>
-          <a:p>
-            <a:endParaRPr lang="en-GB" dirty="0"/>
+            <a:endParaRPr lang="en-US" dirty="0"/>
           </a:p>
         </p:txBody>
       </p:sp>
@@ -6092,184 +6030,9 @@
           <a:lstStyle/>
           <a:p>
             <a:fld id="{CA36C8A0-BAEB-42C3-A2D9-B1F0D6FD294D}" type="slidenum">
-              <a:rPr lang="en-US" smtClean="0"/>
+              <a:rPr lang="en-GB" smtClean="0"/>
               <a:pPr/>
               <a:t>11</a:t>
-            </a:fld>
-            <a:endParaRPr lang="en-US"/>
-          </a:p>
-        </p:txBody>
-      </p:sp>
-    </p:spTree>
-    <p:extLst>
-      <p:ext uri="{BB962C8B-B14F-4D97-AF65-F5344CB8AC3E}">
-        <p14:creationId xmlns:p14="http://schemas.microsoft.com/office/powerpoint/2010/main" val="4104428027"/>
-      </p:ext>
-    </p:extLst>
-  </p:cSld>
-  <p:clrMapOvr>
-    <a:masterClrMapping/>
-  </p:clrMapOvr>
-  <p:transition spd="med"/>
-</p:sld>
-</file>
-
-<file path=ppt/slides/slide12.xml><?xml version="1.0" encoding="utf-8"?>
-<p:sld xmlns:a="http://schemas.openxmlformats.org/drawingml/2006/main" xmlns:r="http://schemas.openxmlformats.org/officeDocument/2006/relationships" xmlns:p="http://schemas.openxmlformats.org/presentationml/2006/main">
-  <p:cSld>
-    <p:spTree>
-      <p:nvGrpSpPr>
-        <p:cNvPr id="1" name=""/>
-        <p:cNvGrpSpPr/>
-        <p:nvPr/>
-      </p:nvGrpSpPr>
-      <p:grpSpPr>
-        <a:xfrm>
-          <a:off x="0" y="0"/>
-          <a:ext cx="0" cy="0"/>
-          <a:chOff x="0" y="0"/>
-          <a:chExt cx="0" cy="0"/>
-        </a:xfrm>
-      </p:grpSpPr>
-      <p:sp>
-        <p:nvSpPr>
-          <p:cNvPr id="7" name="Titel 6"/>
-          <p:cNvSpPr>
-            <a:spLocks noGrp="1"/>
-          </p:cNvSpPr>
-          <p:nvPr>
-            <p:ph type="title"/>
-          </p:nvPr>
-        </p:nvSpPr>
-        <p:spPr/>
-        <p:txBody>
-          <a:bodyPr/>
-          <a:lstStyle/>
-          <a:p>
-            <a:r>
-              <a:rPr lang="en-GB" dirty="0"/>
-              <a:t>Additional Industrial Applications</a:t>
-            </a:r>
-          </a:p>
-        </p:txBody>
-      </p:sp>
-      <p:sp>
-        <p:nvSpPr>
-          <p:cNvPr id="8" name="Textplatzhalter 7"/>
-          <p:cNvSpPr>
-            <a:spLocks noGrp="1"/>
-          </p:cNvSpPr>
-          <p:nvPr>
-            <p:ph type="body" sz="quarter" idx="13"/>
-          </p:nvPr>
-        </p:nvSpPr>
-        <p:spPr/>
-        <p:txBody>
-          <a:bodyPr>
-            <a:normAutofit fontScale="92500"/>
-          </a:bodyPr>
-          <a:lstStyle/>
-          <a:p>
-            <a:r>
-              <a:rPr lang="en-US" dirty="0"/>
-              <a:t>STAR-based trust link management</a:t>
-            </a:r>
-          </a:p>
-          <a:p>
-            <a:pPr lvl="1"/>
-            <a:r>
-              <a:rPr lang="en-US" dirty="0"/>
-              <a:t>Encrypted traffic negotiation at edge locations in CDN and </a:t>
-            </a:r>
-            <a:r>
-              <a:rPr lang="en-US" dirty="0" err="1"/>
-              <a:t>mABR</a:t>
-            </a:r>
-            <a:r>
-              <a:rPr lang="en-US" dirty="0"/>
-              <a:t> systems </a:t>
-            </a:r>
-          </a:p>
-          <a:p>
-            <a:pPr lvl="1"/>
-            <a:r>
-              <a:rPr lang="en-US" dirty="0"/>
-              <a:t>Secure browsing</a:t>
-            </a:r>
-          </a:p>
-          <a:p>
-            <a:pPr lvl="1"/>
-            <a:r>
-              <a:rPr lang="en-US" dirty="0"/>
-              <a:t>NFV deployments</a:t>
-            </a:r>
-          </a:p>
-          <a:p>
-            <a:r>
-              <a:rPr lang="en-US" dirty="0"/>
-              <a:t>DTLS connection identifier</a:t>
-            </a:r>
-          </a:p>
-          <a:p>
-            <a:pPr lvl="1"/>
-            <a:r>
-              <a:rPr lang="en-US" dirty="0"/>
-              <a:t>IMPACT IoT product line</a:t>
-            </a:r>
-          </a:p>
-          <a:p>
-            <a:r>
-              <a:rPr lang="en-US" dirty="0"/>
-              <a:t>NFV-enabled experimentation </a:t>
-            </a:r>
-          </a:p>
-          <a:p>
-            <a:pPr lvl="1"/>
-            <a:r>
-              <a:rPr lang="en-US" dirty="0"/>
-              <a:t>Repeatability for evaluation and demonstration purposes</a:t>
-            </a:r>
-          </a:p>
-          <a:p>
-            <a:pPr lvl="1"/>
-            <a:r>
-              <a:rPr lang="en-US" dirty="0"/>
-              <a:t>Application of the </a:t>
-            </a:r>
-            <a:r>
-              <a:rPr lang="en-US" i="1" dirty="0" err="1"/>
-              <a:t>Trafic</a:t>
-            </a:r>
-            <a:r>
-              <a:rPr lang="en-US" dirty="0"/>
-              <a:t> tool, leveraging 5TONIC and the 5GINFIRE project</a:t>
-            </a:r>
-            <a:endParaRPr lang="en-GB" dirty="0"/>
-          </a:p>
-          <a:p>
-            <a:endParaRPr lang="en-US" dirty="0"/>
-          </a:p>
-        </p:txBody>
-      </p:sp>
-      <p:sp>
-        <p:nvSpPr>
-          <p:cNvPr id="5" name="Foliennummernplatzhalter 4"/>
-          <p:cNvSpPr>
-            <a:spLocks noGrp="1"/>
-          </p:cNvSpPr>
-          <p:nvPr>
-            <p:ph type="sldNum" sz="quarter" idx="16"/>
-          </p:nvPr>
-        </p:nvSpPr>
-        <p:spPr/>
-        <p:txBody>
-          <a:bodyPr/>
-          <a:lstStyle/>
-          <a:p>
-            <a:fld id="{CA36C8A0-BAEB-42C3-A2D9-B1F0D6FD294D}" type="slidenum">
-              <a:rPr lang="en-GB" smtClean="0"/>
-              <a:pPr/>
-              <a:t>12</a:t>
             </a:fld>
             <a:endParaRPr lang="en-GB" dirty="0"/>
           </a:p>
@@ -6289,7 +6052,7 @@
 </p:sld>
 </file>
 
-<file path=ppt/slides/slide13.xml><?xml version="1.0" encoding="utf-8"?>
+<file path=ppt/slides/slide12.xml><?xml version="1.0" encoding="utf-8"?>
 <p:sld xmlns:a="http://schemas.openxmlformats.org/drawingml/2006/main" xmlns:r="http://schemas.openxmlformats.org/officeDocument/2006/relationships" xmlns:p="http://schemas.openxmlformats.org/presentationml/2006/main">
   <p:cSld>
     <p:spTree>
@@ -6353,7 +6116,7 @@
         <p:spPr/>
         <p:txBody>
           <a:bodyPr>
-            <a:normAutofit fontScale="92500" lnSpcReduction="10000"/>
+            <a:normAutofit fontScale="85000" lnSpcReduction="10000"/>
           </a:bodyPr>
           <a:lstStyle/>
           <a:p>
@@ -6383,51 +6146,40 @@
             </a:r>
           </a:p>
           <a:p>
-            <a:pPr lvl="1"/>
             <a:r>
               <a:rPr lang="en-GB" i="1" dirty="0"/>
               <a:t>Challenges in Network Management of Encrypted Traffic</a:t>
             </a:r>
           </a:p>
           <a:p>
-            <a:pPr lvl="2"/>
+            <a:pPr lvl="1"/>
             <a:r>
               <a:rPr lang="en-GB" dirty="0"/>
               <a:t>Conclusion of the Management and Measurement Summit</a:t>
             </a:r>
           </a:p>
           <a:p>
-            <a:pPr lvl="1"/>
             <a:r>
               <a:rPr lang="en-GB" i="1" dirty="0"/>
               <a:t>Analysis and Consideration on Management of Encrypted Traffic </a:t>
             </a:r>
           </a:p>
           <a:p>
-            <a:pPr lvl="2"/>
+            <a:pPr lvl="1"/>
             <a:r>
               <a:rPr lang="en-GB" dirty="0"/>
-              <a:t>Advocating the application of path-aware networking as a way for a more open and sustainable Internet </a:t>
-            </a:r>
-            <a:r>
-              <a:rPr lang="en-GB" dirty="0" err="1"/>
-              <a:t>environmen</a:t>
-            </a:r>
-            <a:r>
-              <a:rPr lang="en-GB" dirty="0"/>
-              <a:t> </a:t>
+              <a:t>Advocating the application of path-aware networking as a way for a more open and sustainable Internet environment </a:t>
             </a:r>
             <a:endParaRPr lang="en-GB" i="1" dirty="0"/>
           </a:p>
           <a:p>
-            <a:pPr lvl="1"/>
             <a:r>
               <a:rPr lang="en-GB" i="1" dirty="0"/>
               <a:t>Security and Privacy Implications of Middlebox Cooperation Protocols </a:t>
             </a:r>
           </a:p>
           <a:p>
-            <a:pPr lvl="2"/>
+            <a:pPr lvl="1"/>
             <a:r>
               <a:rPr lang="en-GB" dirty="0"/>
               <a:t>Middlebox cooperation can make a passive adversary's job easier, but it does not enable entirely new attacks.</a:t>
@@ -6459,7 +6211,7 @@
             <a:fld id="{CA36C8A0-BAEB-42C3-A2D9-B1F0D6FD294D}" type="slidenum">
               <a:rPr lang="de-CH" smtClean="0"/>
               <a:pPr/>
-              <a:t>13</a:t>
+              <a:t>12</a:t>
             </a:fld>
             <a:endParaRPr lang="de-CH" dirty="0"/>
           </a:p>
@@ -6479,7 +6231,7 @@
 </p:sld>
 </file>
 
-<file path=ppt/slides/slide14.xml><?xml version="1.0" encoding="utf-8"?>
+<file path=ppt/slides/slide13.xml><?xml version="1.0" encoding="utf-8"?>
 <p:sld xmlns:a="http://schemas.openxmlformats.org/drawingml/2006/main" xmlns:r="http://schemas.openxmlformats.org/officeDocument/2006/relationships" xmlns:p="http://schemas.openxmlformats.org/presentationml/2006/main">
   <p:cSld>
     <p:spTree>
@@ -6536,139 +6288,107 @@
           <a:lstStyle/>
           <a:p>
             <a:r>
-              <a:rPr lang="en-GB" dirty="0"/>
-              <a:t>MAMI organization hosted on </a:t>
-            </a:r>
-            <a:r>
-              <a:rPr lang="en-GB" dirty="0" err="1"/>
-              <a:t>github.com</a:t>
-            </a:r>
-            <a:endParaRPr lang="en-GB" dirty="0"/>
+              <a:rPr lang="en-GB"/>
+              <a:t>MAMI organization hosted on github.com</a:t>
+            </a:r>
           </a:p>
           <a:p>
             <a:pPr lvl="1"/>
             <a:r>
-              <a:rPr lang="en-GB" dirty="0">
+              <a:rPr lang="en-GB">
                 <a:hlinkClick r:id="rId2"/>
               </a:rPr>
               <a:t>https://github.com/mamiproject</a:t>
             </a:r>
-            <a:endParaRPr lang="en-GB" dirty="0"/>
+            <a:endParaRPr lang="en-GB"/>
           </a:p>
           <a:p>
             <a:pPr lvl="1"/>
             <a:r>
-              <a:rPr lang="en-GB" dirty="0"/>
+              <a:rPr lang="en-GB"/>
               <a:t>Open-source software and public information created by the project</a:t>
             </a:r>
           </a:p>
           <a:p>
             <a:pPr lvl="1"/>
             <a:r>
-              <a:rPr lang="en-GB" dirty="0"/>
+              <a:rPr lang="en-GB"/>
               <a:t>45 active during this last period</a:t>
             </a:r>
           </a:p>
           <a:p>
             <a:pPr lvl="1"/>
             <a:r>
-              <a:rPr lang="en-GB" dirty="0"/>
+              <a:rPr lang="en-GB"/>
               <a:t>Several of them at </a:t>
             </a:r>
             <a:r>
-              <a:rPr lang="en-GB" i="1" dirty="0"/>
+              <a:rPr lang="en-GB" i="1"/>
               <a:t>wide external use </a:t>
             </a:r>
             <a:r>
-              <a:rPr lang="en-GB" dirty="0"/>
+              <a:rPr lang="en-GB"/>
               <a:t>(or more mature) level</a:t>
             </a:r>
           </a:p>
           <a:p>
             <a:r>
-              <a:rPr lang="en-GB" dirty="0" err="1"/>
-              <a:t>PATHspider</a:t>
-            </a:r>
-            <a:r>
-              <a:rPr lang="en-GB" dirty="0"/>
-              <a:t> releases already made available through software distribution systems</a:t>
+              <a:rPr lang="en-GB"/>
+              <a:t>PATHspider releases already made available through software distribution systems</a:t>
             </a:r>
           </a:p>
           <a:p>
             <a:pPr lvl="1"/>
             <a:r>
-              <a:rPr lang="en-GB" dirty="0" err="1"/>
-              <a:t>PATHspider</a:t>
-            </a:r>
-            <a:r>
-              <a:rPr lang="en-GB" dirty="0"/>
-              <a:t> releases up to the current 2.0.1 are available for installation from </a:t>
-            </a:r>
-            <a:r>
-              <a:rPr lang="en-GB" dirty="0" err="1"/>
-              <a:t>PyPI</a:t>
-            </a:r>
-            <a:endParaRPr lang="en-GB" dirty="0"/>
+              <a:rPr lang="en-GB"/>
+              <a:t>PATHspider releases up to the current 2.0.1 are available for installation from PyPI</a:t>
+            </a:r>
           </a:p>
           <a:p>
             <a:pPr lvl="1"/>
             <a:r>
-              <a:rPr lang="en-GB" dirty="0" err="1"/>
-              <a:t>PATHspider</a:t>
-            </a:r>
-            <a:r>
-              <a:rPr lang="en-GB" dirty="0"/>
-              <a:t> 1.0.1-1 is included in the latest stable version of the Debian operating system </a:t>
+              <a:rPr lang="en-GB"/>
+              <a:t>PATHspider 1.0.1-1 is included in the latest stable version of the Debian operating system </a:t>
             </a:r>
           </a:p>
           <a:p>
             <a:pPr lvl="1"/>
             <a:r>
-              <a:rPr lang="en-GB" dirty="0"/>
-              <a:t>Packages were published to the Debian Operating System with MAMI acknowledgement:</a:t>
+              <a:rPr lang="en-GB"/>
+              <a:t>These packages were published to the Debian Operating System with MAMI acknowledgement:</a:t>
             </a:r>
           </a:p>
           <a:p>
             <a:pPr lvl="2"/>
             <a:r>
-              <a:rPr lang="en-GB" dirty="0"/>
-              <a:t>python-</a:t>
-            </a:r>
-            <a:r>
-              <a:rPr lang="en-GB" dirty="0" err="1"/>
-              <a:t>libtrace</a:t>
-            </a:r>
-            <a:endParaRPr lang="en-GB" dirty="0"/>
+              <a:rPr lang="en-GB"/>
+              <a:t>python-libtrace </a:t>
+            </a:r>
           </a:p>
           <a:p>
             <a:pPr lvl="2"/>
             <a:r>
-              <a:rPr lang="en-GB" dirty="0"/>
+              <a:rPr lang="en-GB"/>
               <a:t>scapy3k </a:t>
             </a:r>
           </a:p>
           <a:p>
             <a:pPr lvl="2"/>
             <a:r>
-              <a:rPr lang="en-GB" dirty="0" err="1"/>
+              <a:rPr lang="en-GB"/>
               <a:t>scapy</a:t>
             </a:r>
-            <a:endParaRPr lang="en-GB" dirty="0"/>
           </a:p>
           <a:p>
             <a:pPr lvl="2"/>
             <a:r>
-              <a:rPr lang="en-GB" dirty="0" err="1"/>
-              <a:t>pycurl</a:t>
-            </a:r>
-            <a:r>
-              <a:rPr lang="en-GB" dirty="0"/>
-              <a:t> </a:t>
-            </a:r>
-          </a:p>
-          <a:p>
-            <a:r>
-              <a:rPr lang="en-GB" dirty="0"/>
+              <a:rPr lang="en-GB"/>
+              <a:t>pycurl </a:t>
+            </a:r>
+          </a:p>
+          <a:p>
+            <a:r>
+              <a:rPr lang="en-GB"/>
               <a:t>Regular participation in IETF Hackathons to socialise ideas and code related to MAMI activities</a:t>
             </a:r>
           </a:p>
@@ -6692,7 +6412,7 @@
             <a:fld id="{CA36C8A0-BAEB-42C3-A2D9-B1F0D6FD294D}" type="slidenum">
               <a:rPr lang="de-CH" smtClean="0"/>
               <a:pPr/>
-              <a:t>14</a:t>
+              <a:t>13</a:t>
             </a:fld>
             <a:endParaRPr lang="de-CH" dirty="0"/>
           </a:p>
@@ -6702,6 +6422,234 @@
     <p:extLst>
       <p:ext uri="{BB962C8B-B14F-4D97-AF65-F5344CB8AC3E}">
         <p14:creationId xmlns:p14="http://schemas.microsoft.com/office/powerpoint/2010/main" val="1082874663"/>
+      </p:ext>
+    </p:extLst>
+  </p:cSld>
+  <p:clrMapOvr>
+    <a:masterClrMapping/>
+  </p:clrMapOvr>
+  <p:transition spd="med"/>
+</p:sld>
+</file>
+
+<file path=ppt/slides/slide14.xml><?xml version="1.0" encoding="utf-8"?>
+<p:sld xmlns:a="http://schemas.openxmlformats.org/drawingml/2006/main" xmlns:r="http://schemas.openxmlformats.org/officeDocument/2006/relationships" xmlns:p="http://schemas.openxmlformats.org/presentationml/2006/main">
+  <p:cSld>
+    <p:spTree>
+      <p:nvGrpSpPr>
+        <p:cNvPr id="1" name=""/>
+        <p:cNvGrpSpPr/>
+        <p:nvPr/>
+      </p:nvGrpSpPr>
+      <p:grpSpPr>
+        <a:xfrm>
+          <a:off x="0" y="0"/>
+          <a:ext cx="0" cy="0"/>
+          <a:chOff x="0" y="0"/>
+          <a:chExt cx="0" cy="0"/>
+        </a:xfrm>
+      </p:grpSpPr>
+      <p:sp>
+        <p:nvSpPr>
+          <p:cNvPr id="7" name="Titel 6"/>
+          <p:cNvSpPr>
+            <a:spLocks noGrp="1"/>
+          </p:cNvSpPr>
+          <p:nvPr>
+            <p:ph type="title"/>
+          </p:nvPr>
+        </p:nvSpPr>
+        <p:spPr/>
+        <p:txBody>
+          <a:bodyPr/>
+          <a:lstStyle/>
+          <a:p>
+            <a:r>
+              <a:rPr lang="en-GB"/>
+              <a:t>Publications and Workshops </a:t>
+            </a:r>
+          </a:p>
+        </p:txBody>
+      </p:sp>
+      <p:sp>
+        <p:nvSpPr>
+          <p:cNvPr id="8" name="Textplatzhalter 7"/>
+          <p:cNvSpPr>
+            <a:spLocks noGrp="1"/>
+          </p:cNvSpPr>
+          <p:nvPr>
+            <p:ph type="body" sz="quarter" idx="13"/>
+          </p:nvPr>
+        </p:nvSpPr>
+        <p:spPr>
+          <a:xfrm>
+            <a:off x="460587" y="2750973"/>
+            <a:ext cx="12052881" cy="6230283"/>
+          </a:xfrm>
+        </p:spPr>
+        <p:txBody>
+          <a:bodyPr>
+            <a:normAutofit fontScale="92500" lnSpcReduction="20000"/>
+          </a:bodyPr>
+          <a:lstStyle/>
+          <a:p>
+            <a:r>
+              <a:rPr lang="en-GB" sz="2400" dirty="0"/>
+              <a:t>Sixteen different publications and conference participations</a:t>
+            </a:r>
+          </a:p>
+          <a:p>
+            <a:pPr lvl="1"/>
+            <a:r>
+              <a:rPr lang="en-GB" sz="2000" dirty="0"/>
+              <a:t>IEEE Communications, INFOCOM, Internet Measurement Conference, </a:t>
+            </a:r>
+            <a:r>
+              <a:rPr lang="en-GB" sz="2000" dirty="0" err="1"/>
+              <a:t>Mobicom</a:t>
+            </a:r>
+            <a:r>
+              <a:rPr lang="en-GB" sz="2000" dirty="0"/>
+              <a:t>, ACM </a:t>
+            </a:r>
+            <a:r>
+              <a:rPr lang="en-GB" sz="2000" dirty="0" err="1"/>
+              <a:t>CoNEXT</a:t>
+            </a:r>
+            <a:r>
+              <a:rPr lang="en-GB" sz="2000" dirty="0"/>
+              <a:t> EPIQ, USENIX NSDI, GSMA Packet…</a:t>
+            </a:r>
+          </a:p>
+          <a:p>
+            <a:r>
+              <a:rPr lang="en-GB" sz="2400" dirty="0"/>
+              <a:t>The MAMI Management and Measurement Summit</a:t>
+            </a:r>
+          </a:p>
+          <a:p>
+            <a:pPr lvl="1"/>
+            <a:r>
+              <a:rPr lang="en-GB" sz="2000" dirty="0"/>
+              <a:t>Different stakeholders: researchers, engineers</a:t>
+            </a:r>
+          </a:p>
+          <a:p>
+            <a:pPr lvl="1"/>
+            <a:r>
+              <a:rPr lang="en-GB" sz="2000" dirty="0"/>
+              <a:t>Challenges to network measurement and management by strong encryption, in breadth and depth</a:t>
+            </a:r>
+          </a:p>
+          <a:p>
+            <a:r>
+              <a:rPr lang="en-GB" sz="2400" dirty="0"/>
+              <a:t>The MAMI Summer School on Internet Path Transparency Measurements </a:t>
+            </a:r>
+          </a:p>
+          <a:p>
+            <a:pPr lvl="1"/>
+            <a:r>
+              <a:rPr lang="en-GB" sz="2000" dirty="0"/>
+              <a:t>Focused on the project tools: </a:t>
+            </a:r>
+            <a:r>
+              <a:rPr lang="en-GB" sz="2000" dirty="0" err="1"/>
+              <a:t>Tracebox</a:t>
+            </a:r>
+            <a:r>
+              <a:rPr lang="en-GB" sz="2000" dirty="0"/>
+              <a:t>, </a:t>
+            </a:r>
+            <a:r>
+              <a:rPr lang="en-GB" sz="2000" dirty="0" err="1"/>
+              <a:t>PATHspider</a:t>
+            </a:r>
+            <a:r>
+              <a:rPr lang="en-GB" sz="2000" dirty="0"/>
+              <a:t> and the PTO </a:t>
+            </a:r>
+          </a:p>
+          <a:p>
+            <a:r>
+              <a:rPr lang="en-GB" sz="2400" dirty="0"/>
+              <a:t>Second edition of the joint workshop with MONROE on Mobile Network Measurements </a:t>
+            </a:r>
+          </a:p>
+          <a:p>
+            <a:pPr lvl="1"/>
+            <a:r>
+              <a:rPr lang="en-GB" sz="2000" dirty="0"/>
+              <a:t>WebRTC measurements, network QoS and mobile coverage, multipath and application performance </a:t>
+            </a:r>
+          </a:p>
+          <a:p>
+            <a:r>
+              <a:rPr lang="en-GB" sz="2400" dirty="0"/>
+              <a:t>Tutorial on Repeatability and Comparability in Measurement (RCM) </a:t>
+            </a:r>
+          </a:p>
+          <a:p>
+            <a:pPr lvl="1"/>
+            <a:r>
+              <a:rPr lang="en-GB" sz="2000" dirty="0"/>
+              <a:t>At SIGCOMM 2018</a:t>
+            </a:r>
+          </a:p>
+          <a:p>
+            <a:pPr lvl="1"/>
+            <a:r>
+              <a:rPr lang="en-GB" sz="2000" dirty="0"/>
+              <a:t>Introducing MAMI tools</a:t>
+            </a:r>
+          </a:p>
+          <a:p>
+            <a:r>
+              <a:rPr lang="en-GB" sz="2400" dirty="0" err="1"/>
+              <a:t>PATHspider</a:t>
+            </a:r>
+            <a:r>
+              <a:rPr lang="en-GB" sz="2400" dirty="0"/>
+              <a:t> hackathon</a:t>
+            </a:r>
+          </a:p>
+          <a:p>
+            <a:pPr lvl="1"/>
+            <a:r>
+              <a:rPr lang="en-GB" sz="2000" dirty="0"/>
+              <a:t>Jointly with the OONI (Open Observatory of Network Interference) project</a:t>
+            </a:r>
+          </a:p>
+        </p:txBody>
+      </p:sp>
+      <p:sp>
+        <p:nvSpPr>
+          <p:cNvPr id="5" name="Foliennummernplatzhalter 4"/>
+          <p:cNvSpPr>
+            <a:spLocks noGrp="1"/>
+          </p:cNvSpPr>
+          <p:nvPr>
+            <p:ph type="sldNum" sz="quarter" idx="16"/>
+          </p:nvPr>
+        </p:nvSpPr>
+        <p:spPr/>
+        <p:txBody>
+          <a:bodyPr/>
+          <a:lstStyle/>
+          <a:p>
+            <a:fld id="{CA36C8A0-BAEB-42C3-A2D9-B1F0D6FD294D}" type="slidenum">
+              <a:rPr lang="en-GB" smtClean="0"/>
+              <a:pPr/>
+              <a:t>14</a:t>
+            </a:fld>
+            <a:endParaRPr lang="en-GB" dirty="0"/>
+          </a:p>
+        </p:txBody>
+      </p:sp>
+    </p:spTree>
+    <p:extLst>
+      <p:ext uri="{BB962C8B-B14F-4D97-AF65-F5344CB8AC3E}">
+        <p14:creationId xmlns:p14="http://schemas.microsoft.com/office/powerpoint/2010/main" val="1690679360"/>
       </p:ext>
     </p:extLst>
   </p:cSld>
@@ -6761,130 +6709,83 @@
             <p:ph type="body" sz="quarter" idx="13"/>
           </p:nvPr>
         </p:nvSpPr>
-        <p:spPr/>
+        <p:spPr>
+          <a:xfrm>
+            <a:off x="165697" y="2500537"/>
+            <a:ext cx="5832648" cy="6374233"/>
+          </a:xfrm>
+        </p:spPr>
         <p:txBody>
           <a:bodyPr>
-            <a:normAutofit fontScale="92500"/>
+            <a:normAutofit lnSpcReduction="10000"/>
           </a:bodyPr>
           <a:lstStyle/>
           <a:p>
             <a:r>
-              <a:rPr lang="en-GB" sz="1600"/>
+              <a:rPr lang="en-GB" sz="1800" dirty="0"/>
               <a:t>ETH Zurich</a:t>
             </a:r>
           </a:p>
           <a:p>
             <a:pPr lvl="1"/>
             <a:r>
-              <a:rPr lang="en-GB" sz="1400"/>
-              <a:t>Four student projects performed, supporting the development of PATHspider, the PTO, and passive measurability for QUIC</a:t>
+              <a:rPr lang="en-GB" sz="1600" dirty="0"/>
+              <a:t>Four student projects performed, supporting the development of </a:t>
+            </a:r>
+            <a:r>
+              <a:rPr lang="en-GB" sz="1600" dirty="0" err="1"/>
+              <a:t>PATHspider</a:t>
+            </a:r>
+            <a:r>
+              <a:rPr lang="en-GB" sz="1600" dirty="0"/>
+              <a:t>, the PTO, and passive measurability for QUIC</a:t>
             </a:r>
           </a:p>
           <a:p>
             <a:pPr lvl="1"/>
             <a:r>
-              <a:rPr lang="en-GB" sz="1400"/>
+              <a:rPr lang="en-GB" sz="1600" dirty="0"/>
               <a:t>Work in. passive network measurement contributed to the research performed for an on-going PhD thesis</a:t>
             </a:r>
           </a:p>
           <a:p>
             <a:r>
-              <a:rPr lang="en-GB" sz="1600"/>
+              <a:rPr lang="en-GB" sz="1800" dirty="0"/>
               <a:t>ZHAW </a:t>
             </a:r>
           </a:p>
           <a:p>
             <a:pPr lvl="1"/>
             <a:r>
-              <a:rPr lang="en-GB" sz="1400"/>
+              <a:rPr lang="en-GB" sz="1600" dirty="0"/>
               <a:t>One master student involved in the project, resulting in a master thesis on how to fuzz shim-layer protocols in general.</a:t>
             </a:r>
           </a:p>
           <a:p>
             <a:pPr lvl="1"/>
             <a:r>
-              <a:rPr lang="en-GB" sz="1400"/>
+              <a:rPr lang="en-GB" sz="1600" dirty="0"/>
               <a:t>ZHAW will operate the PTO after the end of the project.  </a:t>
             </a:r>
           </a:p>
           <a:p>
             <a:r>
-              <a:rPr lang="en-GB" sz="1600"/>
+              <a:rPr lang="en-GB" sz="1800" dirty="0"/>
               <a:t>University of Aberdeen</a:t>
             </a:r>
           </a:p>
           <a:p>
             <a:pPr lvl="1"/>
             <a:r>
-              <a:rPr lang="en-GB" sz="1400"/>
+              <a:rPr lang="en-GB" sz="1600" dirty="0"/>
               <a:t>Will continue to explore important lines of research developed in MAMI, which will form the basis of new research proposals. </a:t>
             </a:r>
           </a:p>
           <a:p>
             <a:pPr lvl="1"/>
             <a:r>
-              <a:rPr lang="en-GB" sz="1400"/>
+              <a:rPr lang="en-GB" sz="1600" dirty="0"/>
               <a:t>MAMI research will continue to be used in advanced undergraduate teaching and to support the work of postgraduate students. </a:t>
-            </a:r>
-          </a:p>
-          <a:p>
-            <a:r>
-              <a:rPr lang="en-GB" sz="1600"/>
-              <a:t>Simula Research Laboratory </a:t>
-            </a:r>
-          </a:p>
-          <a:p>
-            <a:pPr lvl="1"/>
-            <a:r>
-              <a:rPr lang="en-GB" sz="1400"/>
-              <a:t>Will apply MAMI results when developing future project proposals and for its graduate education activities. </a:t>
-            </a:r>
-          </a:p>
-          <a:p>
-            <a:pPr lvl="1"/>
-            <a:r>
-              <a:rPr lang="en-GB" sz="1400"/>
-              <a:t>MAMI results are being, fully integrated in MONROE, to be supported by the new MONROE alliance</a:t>
-            </a:r>
-          </a:p>
-          <a:p>
-            <a:r>
-              <a:rPr lang="en-GB" sz="1600"/>
-              <a:t>University of Liege </a:t>
-            </a:r>
-          </a:p>
-          <a:p>
-            <a:pPr lvl="1"/>
-            <a:r>
-              <a:rPr lang="en-GB" sz="1400"/>
-              <a:t>Will use MAMI project results in follow-up research activities and for teaching purposes</a:t>
-            </a:r>
-          </a:p>
-          <a:p>
-            <a:pPr lvl="1"/>
-            <a:r>
-              <a:rPr lang="en-GB" sz="1400"/>
-              <a:t>The middlebox simulator is at the heart of a course on traffic engineering, and will be used labs in Computer Security</a:t>
-            </a:r>
-          </a:p>
-          <a:p>
-            <a:r>
-              <a:rPr lang="en-GB" sz="1600"/>
-              <a:t>UC3M</a:t>
-            </a:r>
-          </a:p>
-          <a:p>
-            <a:pPr lvl="1"/>
-            <a:r>
-              <a:rPr lang="en-GB" sz="1400"/>
-              <a:t>Tools (Trafic, NEMO compiler, VPP QUIC…) transferred to the 5TONIC labs at IMDEA Research, to be used in the context of 5G research projects. </a:t>
-            </a:r>
-          </a:p>
-          <a:p>
-            <a:pPr lvl="1"/>
-            <a:r>
-              <a:rPr lang="en-GB" sz="1400"/>
-              <a:t>Resultswill be reflected in different Bachelor and Master theses</a:t>
             </a:r>
           </a:p>
         </p:txBody>
@@ -6913,10 +6814,308 @@
           </a:p>
         </p:txBody>
       </p:sp>
+      <p:sp>
+        <p:nvSpPr>
+          <p:cNvPr id="5" name="Text Placeholder 2">
+            <a:extLst>
+              <a:ext uri="{FF2B5EF4-FFF2-40B4-BE49-F238E27FC236}">
+                <a16:creationId xmlns:a16="http://schemas.microsoft.com/office/drawing/2014/main" id="{3622DC05-8DEB-5C49-8066-C1E04029763C}"/>
+              </a:ext>
+            </a:extLst>
+          </p:cNvPr>
+          <p:cNvSpPr txBox="1">
+            <a:spLocks/>
+          </p:cNvSpPr>
+          <p:nvPr/>
+        </p:nvSpPr>
+        <p:spPr>
+          <a:xfrm>
+            <a:off x="6430392" y="2500536"/>
+            <a:ext cx="6336704" cy="6158077"/>
+          </a:xfrm>
+          <a:prstGeom prst="rect">
+            <a:avLst/>
+          </a:prstGeom>
+        </p:spPr>
+        <p:txBody>
+          <a:bodyPr vert="horz" lIns="91440" tIns="45720" rIns="91440" bIns="45720" rtlCol="0">
+            <a:normAutofit/>
+          </a:bodyPr>
+          <a:lstStyle>
+            <a:lvl1pPr marL="361950" indent="-361950" defTabSz="361950" eaLnBrk="1" hangingPunct="1">
+              <a:lnSpc>
+                <a:spcPct val="120000"/>
+              </a:lnSpc>
+              <a:spcBef>
+                <a:spcPts val="700"/>
+              </a:spcBef>
+              <a:buClr>
+                <a:schemeClr val="tx1"/>
+              </a:buClr>
+              <a:buSzPct val="130000"/>
+              <a:buFontTx/>
+              <a:buChar char="•"/>
+              <a:defRPr sz="3200">
+                <a:uFill>
+                  <a:solidFill/>
+                </a:uFill>
+                <a:latin typeface="+mn-lt"/>
+                <a:ea typeface="+mn-ea"/>
+                <a:cs typeface="+mn-cs"/>
+                <a:sym typeface="Helvetica Neue"/>
+              </a:defRPr>
+            </a:lvl1pPr>
+            <a:lvl2pPr marL="803275" indent="-352425" defTabSz="361950" eaLnBrk="1" hangingPunct="1">
+              <a:lnSpc>
+                <a:spcPct val="120000"/>
+              </a:lnSpc>
+              <a:spcBef>
+                <a:spcPts val="700"/>
+              </a:spcBef>
+              <a:buClr>
+                <a:schemeClr val="tx1"/>
+              </a:buClr>
+              <a:buSzPct val="130000"/>
+              <a:buFontTx/>
+              <a:buChar char="•"/>
+              <a:defRPr sz="2800">
+                <a:uFill>
+                  <a:solidFill/>
+                </a:uFill>
+                <a:latin typeface="+mn-lt"/>
+                <a:ea typeface="+mn-ea"/>
+                <a:cs typeface="+mn-cs"/>
+                <a:sym typeface="Helvetica Neue"/>
+              </a:defRPr>
+            </a:lvl2pPr>
+            <a:lvl3pPr marL="1162050" indent="-358775" defTabSz="371475" eaLnBrk="1" hangingPunct="1">
+              <a:lnSpc>
+                <a:spcPct val="120000"/>
+              </a:lnSpc>
+              <a:spcBef>
+                <a:spcPts val="700"/>
+              </a:spcBef>
+              <a:buClr>
+                <a:schemeClr val="tx1"/>
+              </a:buClr>
+              <a:buSzPct val="130000"/>
+              <a:buFontTx/>
+              <a:buChar char="•"/>
+              <a:defRPr sz="2400">
+                <a:uFill>
+                  <a:solidFill/>
+                </a:uFill>
+                <a:latin typeface="+mn-lt"/>
+                <a:ea typeface="+mn-ea"/>
+                <a:cs typeface="+mn-cs"/>
+                <a:sym typeface="Helvetica Neue"/>
+              </a:defRPr>
+            </a:lvl3pPr>
+            <a:lvl4pPr marL="1433513" indent="-252413" defTabSz="361950" eaLnBrk="1" hangingPunct="1">
+              <a:lnSpc>
+                <a:spcPct val="120000"/>
+              </a:lnSpc>
+              <a:spcBef>
+                <a:spcPts val="700"/>
+              </a:spcBef>
+              <a:buClr>
+                <a:schemeClr val="tx1"/>
+              </a:buClr>
+              <a:buSzPct val="130000"/>
+              <a:buFontTx/>
+              <a:buChar char="•"/>
+              <a:defRPr sz="2000">
+                <a:uFill>
+                  <a:solidFill/>
+                </a:uFill>
+                <a:latin typeface="+mn-lt"/>
+                <a:ea typeface="+mn-ea"/>
+                <a:cs typeface="+mn-cs"/>
+                <a:sym typeface="Helvetica Neue"/>
+              </a:defRPr>
+            </a:lvl4pPr>
+            <a:lvl5pPr marL="1704975" indent="-180975" defTabSz="358775" eaLnBrk="1" hangingPunct="1">
+              <a:lnSpc>
+                <a:spcPct val="120000"/>
+              </a:lnSpc>
+              <a:spcBef>
+                <a:spcPts val="700"/>
+              </a:spcBef>
+              <a:buClr>
+                <a:schemeClr val="tx1"/>
+              </a:buClr>
+              <a:buSzPct val="130000"/>
+              <a:buFontTx/>
+              <a:buChar char="•"/>
+              <a:defRPr sz="1800">
+                <a:uFill>
+                  <a:solidFill/>
+                </a:uFill>
+                <a:latin typeface="+mn-lt"/>
+                <a:ea typeface="+mn-ea"/>
+                <a:cs typeface="+mn-cs"/>
+                <a:sym typeface="Helvetica Neue"/>
+              </a:defRPr>
+            </a:lvl5pPr>
+            <a:lvl6pPr marL="2990850" indent="-539750" defTabSz="1295400" eaLnBrk="1" hangingPunct="1">
+              <a:spcBef>
+                <a:spcPts val="700"/>
+              </a:spcBef>
+              <a:buClr>
+                <a:srgbClr val="64AD65"/>
+              </a:buClr>
+              <a:buSzPct val="171000"/>
+              <a:buFont typeface="Wingdings"/>
+              <a:buChar char="•"/>
+              <a:defRPr sz="3400">
+                <a:uFill>
+                  <a:solidFill/>
+                </a:uFill>
+                <a:latin typeface="+mn-lt"/>
+                <a:ea typeface="+mn-ea"/>
+                <a:cs typeface="+mn-cs"/>
+                <a:sym typeface="Helvetica Neue"/>
+              </a:defRPr>
+            </a:lvl6pPr>
+            <a:lvl7pPr marL="3346450" indent="-539750" defTabSz="1295400" eaLnBrk="1" hangingPunct="1">
+              <a:spcBef>
+                <a:spcPts val="700"/>
+              </a:spcBef>
+              <a:buClr>
+                <a:srgbClr val="64AD65"/>
+              </a:buClr>
+              <a:buSzPct val="171000"/>
+              <a:buFont typeface="Wingdings"/>
+              <a:buChar char="•"/>
+              <a:defRPr sz="3400">
+                <a:uFill>
+                  <a:solidFill/>
+                </a:uFill>
+                <a:latin typeface="+mn-lt"/>
+                <a:ea typeface="+mn-ea"/>
+                <a:cs typeface="+mn-cs"/>
+                <a:sym typeface="Helvetica Neue"/>
+              </a:defRPr>
+            </a:lvl7pPr>
+            <a:lvl8pPr marL="3702050" indent="-539750" defTabSz="1295400" eaLnBrk="1" hangingPunct="1">
+              <a:spcBef>
+                <a:spcPts val="700"/>
+              </a:spcBef>
+              <a:buClr>
+                <a:srgbClr val="64AD65"/>
+              </a:buClr>
+              <a:buSzPct val="171000"/>
+              <a:buFont typeface="Wingdings"/>
+              <a:buChar char="•"/>
+              <a:defRPr sz="3400">
+                <a:uFill>
+                  <a:solidFill/>
+                </a:uFill>
+                <a:latin typeface="+mn-lt"/>
+                <a:ea typeface="+mn-ea"/>
+                <a:cs typeface="+mn-cs"/>
+                <a:sym typeface="Helvetica Neue"/>
+              </a:defRPr>
+            </a:lvl8pPr>
+            <a:lvl9pPr marL="4057650" indent="-539750" defTabSz="1295400" eaLnBrk="1" hangingPunct="1">
+              <a:spcBef>
+                <a:spcPts val="700"/>
+              </a:spcBef>
+              <a:buClr>
+                <a:srgbClr val="64AD65"/>
+              </a:buClr>
+              <a:buSzPct val="171000"/>
+              <a:buFont typeface="Wingdings"/>
+              <a:buChar char="•"/>
+              <a:defRPr sz="3400">
+                <a:uFill>
+                  <a:solidFill/>
+                </a:uFill>
+                <a:latin typeface="+mn-lt"/>
+                <a:ea typeface="+mn-ea"/>
+                <a:cs typeface="+mn-cs"/>
+                <a:sym typeface="Helvetica Neue"/>
+              </a:defRPr>
+            </a:lvl9pPr>
+          </a:lstStyle>
+          <a:p>
+            <a:r>
+              <a:rPr lang="en-GB" sz="1800" dirty="0" err="1"/>
+              <a:t>Simula</a:t>
+            </a:r>
+            <a:r>
+              <a:rPr lang="en-GB" sz="1800" dirty="0"/>
+              <a:t> Research Laboratory </a:t>
+            </a:r>
+          </a:p>
+          <a:p>
+            <a:pPr lvl="1"/>
+            <a:r>
+              <a:rPr lang="en-GB" sz="1600" dirty="0"/>
+              <a:t>Will apply MAMI results when developing future project proposals and for its graduate education activities. </a:t>
+            </a:r>
+          </a:p>
+          <a:p>
+            <a:pPr lvl="1"/>
+            <a:r>
+              <a:rPr lang="en-GB" sz="1600" dirty="0"/>
+              <a:t>MAMI results are being, fully integrated in MONROE, to be supported by the new MONROE alliance</a:t>
+            </a:r>
+          </a:p>
+          <a:p>
+            <a:r>
+              <a:rPr lang="en-GB" sz="1800" dirty="0"/>
+              <a:t>University of Liege </a:t>
+            </a:r>
+          </a:p>
+          <a:p>
+            <a:pPr lvl="1"/>
+            <a:r>
+              <a:rPr lang="en-GB" sz="1600" dirty="0"/>
+              <a:t>Will use MAMI project results in follow-up research activities and for teaching purposes</a:t>
+            </a:r>
+          </a:p>
+          <a:p>
+            <a:pPr lvl="1"/>
+            <a:r>
+              <a:rPr lang="en-GB" sz="1600" dirty="0"/>
+              <a:t>The middlebox simulator is at the heart of a course on traffic engineering, and will be used labs in Computer Security</a:t>
+            </a:r>
+          </a:p>
+          <a:p>
+            <a:r>
+              <a:rPr lang="en-GB" sz="1800" dirty="0"/>
+              <a:t>UC3M</a:t>
+            </a:r>
+          </a:p>
+          <a:p>
+            <a:pPr lvl="1"/>
+            <a:r>
+              <a:rPr lang="en-GB" sz="1600" dirty="0"/>
+              <a:t>Tools (</a:t>
+            </a:r>
+            <a:r>
+              <a:rPr lang="en-GB" sz="1600" dirty="0" err="1"/>
+              <a:t>Trafic</a:t>
+            </a:r>
+            <a:r>
+              <a:rPr lang="en-GB" sz="1600" dirty="0"/>
+              <a:t>, NEMO compiler, VPP QUIC…) transferred to the 5TONIC labs at IMDEA Research, to be used in the context of 5G research projects. </a:t>
+            </a:r>
+          </a:p>
+          <a:p>
+            <a:pPr lvl="1"/>
+            <a:r>
+              <a:rPr lang="en-GB" sz="1600" dirty="0"/>
+              <a:t>Results will be reflected in different Bachelor and Master theses</a:t>
+            </a:r>
+          </a:p>
+        </p:txBody>
+      </p:sp>
     </p:spTree>
     <p:extLst>
       <p:ext uri="{BB962C8B-B14F-4D97-AF65-F5344CB8AC3E}">
-        <p14:creationId xmlns:p14="http://schemas.microsoft.com/office/powerpoint/2010/main" val="1162416946"/>
+        <p14:creationId xmlns:p14="http://schemas.microsoft.com/office/powerpoint/2010/main" val="409702569"/>
       </p:ext>
     </p:extLst>
   </p:cSld>
@@ -7830,43 +8029,27 @@
         <p:spPr/>
         <p:txBody>
           <a:bodyPr>
-            <a:normAutofit fontScale="92500" lnSpcReduction="20000"/>
+            <a:normAutofit lnSpcReduction="10000"/>
           </a:bodyPr>
           <a:lstStyle/>
           <a:p>
             <a:r>
               <a:rPr lang="en-GB" sz="2400" dirty="0"/>
-              <a:t>Measurements of Path Transparency</a:t>
+              <a:t>Applicability of the PTO</a:t>
             </a:r>
           </a:p>
           <a:p>
             <a:pPr lvl="1"/>
             <a:r>
               <a:rPr lang="en-GB" sz="2000" dirty="0"/>
-              <a:t>Measurement collection in the PTO supports data-enabled analyses by researcher and operators</a:t>
+              <a:t>Measurement collection</a:t>
             </a:r>
           </a:p>
           <a:p>
             <a:pPr lvl="1"/>
             <a:r>
               <a:rPr lang="en-GB" sz="2000" dirty="0"/>
-              <a:t>Open source tools such as </a:t>
-            </a:r>
-            <a:r>
-              <a:rPr lang="en-GB" sz="2000" dirty="0" err="1"/>
-              <a:t>PATHspider</a:t>
-            </a:r>
-            <a:r>
-              <a:rPr lang="en-GB" sz="2000" dirty="0"/>
-              <a:t> and </a:t>
-            </a:r>
-            <a:r>
-              <a:rPr lang="en-GB" sz="2000" dirty="0" err="1"/>
-              <a:t>tracebox</a:t>
-            </a:r>
-            <a:r>
-              <a:rPr lang="en-GB" sz="2000" dirty="0"/>
-              <a:t> available to research community beyond end of project</a:t>
+              <a:t>Support data-enabled analyses</a:t>
             </a:r>
           </a:p>
           <a:p>
@@ -7879,38 +8062,14 @@
             <a:pPr lvl="1"/>
             <a:r>
               <a:rPr lang="en-GB" sz="2000" dirty="0"/>
-              <a:t>Essentially within the IETF, e.g. QUIC, </a:t>
-            </a:r>
-            <a:r>
-              <a:rPr lang="en-GB" sz="2000" dirty="0" err="1"/>
-              <a:t>tsvwg</a:t>
-            </a:r>
+              <a:t>Essentially within the IETF</a:t>
+            </a:r>
+          </a:p>
+          <a:p>
+            <a:pPr lvl="1"/>
             <a:r>
               <a:rPr lang="en-GB" sz="2000" dirty="0"/>
-              <a:t>, taps, </a:t>
-            </a:r>
-            <a:r>
-              <a:rPr lang="en-GB" sz="2000" dirty="0" err="1"/>
-              <a:t>tcpm</a:t>
-            </a:r>
-            <a:r>
-              <a:rPr lang="en-GB" sz="2000" dirty="0"/>
-              <a:t>, 6man, acme, </a:t>
-            </a:r>
-            <a:r>
-              <a:rPr lang="en-GB" sz="2000" dirty="0" err="1"/>
-              <a:t>tls</a:t>
-            </a:r>
-            <a:r>
-              <a:rPr lang="en-GB" sz="2000" dirty="0"/>
-              <a:t>, …</a:t>
-            </a:r>
-          </a:p>
-          <a:p>
-            <a:pPr lvl="1"/>
-            <a:r>
-              <a:rPr lang="en-GB" sz="2000" dirty="0"/>
-              <a:t>And beyond (GSMA, ETSI, ...)</a:t>
+              <a:t>And beyond</a:t>
             </a:r>
           </a:p>
           <a:p>
@@ -7923,29 +8082,21 @@
             <a:pPr lvl="1"/>
             <a:r>
               <a:rPr lang="en-GB" sz="2000" dirty="0"/>
-              <a:t>Scientific publications and organization of academic events, e.g. SIGCOMM RCM tutorial, MNM workshops, and MAMI summer school</a:t>
+              <a:t>Independent measurements, experiment repeatability, impairment analysis…</a:t>
             </a:r>
           </a:p>
           <a:p>
             <a:pPr lvl="1"/>
             <a:r>
               <a:rPr lang="en-GB" sz="2000" dirty="0"/>
-              <a:t>Focus on standardization as well as participation and organization of industry events, e.g. M3S</a:t>
+              <a:t>Open source availability</a:t>
             </a:r>
           </a:p>
           <a:p>
             <a:pPr lvl="1"/>
             <a:r>
               <a:rPr lang="en-GB" sz="2000" dirty="0"/>
-              <a:t>Webpage incl. blog and white papers, social media, open sourcing on </a:t>
-            </a:r>
-            <a:r>
-              <a:rPr lang="en-GB" sz="2000" dirty="0" err="1"/>
-              <a:t>github</a:t>
-            </a:r>
-            <a:r>
-              <a:rPr lang="en-GB" sz="2000" dirty="0"/>
-              <a:t> and hackathon participation</a:t>
+              <a:t>Scientific publication and social media</a:t>
             </a:r>
           </a:p>
           <a:p>
@@ -7965,15 +8116,7 @@
             <a:pPr lvl="1"/>
             <a:r>
               <a:rPr lang="en-GB" sz="2000" dirty="0"/>
-              <a:t>Application of results to </a:t>
-            </a:r>
-            <a:r>
-              <a:rPr lang="en-GB" sz="2000" dirty="0">
-                <a:solidFill>
-                  <a:srgbClr val="FF0000"/>
-                </a:solidFill>
-              </a:rPr>
-              <a:t>???</a:t>
+              <a:t>Application of results in network gear, services and experimentation and testing frameworks</a:t>
             </a:r>
           </a:p>
           <a:p>
@@ -8092,7 +8235,7 @@
             <a:pPr lvl="1"/>
             <a:r>
               <a:rPr lang="en-GB" dirty="0"/>
-              <a:t>Focused on middlebox cooperation schemes and its ancillary support</a:t>
+              <a:t>Focused on MCP and its ancillary support</a:t>
             </a:r>
           </a:p>
           <a:p>
@@ -8165,7 +8308,7 @@
             <a:pPr lvl="1"/>
             <a:r>
               <a:rPr lang="en-GB" dirty="0"/>
-              <a:t>Visual and Internet identity: Website/blog, social networking, and general promotion material</a:t>
+              <a:t>Visual and Internet identity: Website, social networking and general promotion material</a:t>
             </a:r>
           </a:p>
           <a:p>
@@ -8451,8 +8594,8 @@
           <a:lstStyle/>
           <a:p>
             <a:r>
-              <a:rPr lang="en-GB" dirty="0"/>
-              <a:t>Standardisation Efforts at a glance</a:t>
+              <a:rPr lang="en-GB"/>
+              <a:t>Standardisation Intents</a:t>
             </a:r>
           </a:p>
         </p:txBody>
@@ -8476,7 +8619,7 @@
         <p:spPr/>
         <p:txBody>
           <a:bodyPr>
-            <a:normAutofit fontScale="85000" lnSpcReduction="20000"/>
+            <a:normAutofit fontScale="92500" lnSpcReduction="20000"/>
           </a:bodyPr>
           <a:lstStyle/>
           <a:p>
@@ -8489,23 +8632,7 @@
             <a:pPr lvl="1"/>
             <a:r>
               <a:rPr lang="en-GB" dirty="0"/>
-              <a:t>QUIC WG and other related activities (e.g. IAB </a:t>
-            </a:r>
-            <a:r>
-              <a:rPr lang="en-GB" dirty="0" err="1"/>
-              <a:t>StackEvo</a:t>
-            </a:r>
-            <a:r>
-              <a:rPr lang="en-GB" dirty="0"/>
-              <a:t> </a:t>
-            </a:r>
-            <a:r>
-              <a:rPr lang="en-GB" dirty="0" err="1"/>
-              <a:t>programm</a:t>
-            </a:r>
-            <a:r>
-              <a:rPr lang="en-GB" dirty="0"/>
-              <a:t>)</a:t>
+              <a:t>QUIC WG and other related activities</a:t>
             </a:r>
           </a:p>
           <a:p>
@@ -8518,13 +8645,8 @@
             <a:pPr lvl="1"/>
             <a:r>
               <a:rPr lang="en-GB" dirty="0"/>
-              <a:t>TAPS, TSVWG, </a:t>
-            </a:r>
-            <a:r>
-              <a:rPr lang="en-GB" dirty="0" err="1"/>
-              <a:t>tcpm</a:t>
-            </a:r>
-            <a:endParaRPr lang="en-GB" dirty="0"/>
+              <a:t>TAPS and TSVWG</a:t>
+            </a:r>
           </a:p>
           <a:p>
             <a:r>
@@ -8549,7 +8671,7 @@
             <a:pPr lvl="1"/>
             <a:r>
               <a:rPr lang="en-GB" dirty="0"/>
-              <a:t>PANRG (Path Aware Networking), MAPRG (Measure and Analysis for Protocols), NFVRG</a:t>
+              <a:t>Path Awareness (PANRG), Measure and Analysis (MAPRG), NFV (NFVRG)</a:t>
             </a:r>
           </a:p>
           <a:p>
@@ -8692,7 +8814,7 @@
         <p:spPr/>
         <p:txBody>
           <a:bodyPr>
-            <a:normAutofit fontScale="85000" lnSpcReduction="20000"/>
+            <a:normAutofit fontScale="92500" lnSpcReduction="10000"/>
           </a:bodyPr>
           <a:lstStyle/>
           <a:p>
@@ -8704,165 +8826,54 @@
           <a:p>
             <a:r>
               <a:rPr lang="en-GB" dirty="0"/>
-              <a:t>QUIC applicability document (draft-</a:t>
-            </a:r>
-            <a:r>
-              <a:rPr lang="en-GB" dirty="0" err="1"/>
-              <a:t>ietf</a:t>
-            </a:r>
+              <a:t>QUIC applicability document</a:t>
+            </a:r>
+          </a:p>
+          <a:p>
+            <a:pPr lvl="1"/>
             <a:r>
               <a:rPr lang="en-GB" dirty="0"/>
-              <a:t>-</a:t>
-            </a:r>
-            <a:r>
-              <a:rPr lang="en-GB" dirty="0" err="1"/>
-              <a:t>quic</a:t>
-            </a:r>
+              <a:t>Going beyond HTTP</a:t>
+            </a:r>
+          </a:p>
+          <a:p>
             <a:r>
               <a:rPr lang="en-GB" dirty="0"/>
-              <a:t>-applicability)</a:t>
+              <a:t>QUIC manageability document</a:t>
             </a:r>
           </a:p>
           <a:p>
             <a:pPr lvl="1"/>
             <a:r>
               <a:rPr lang="en-GB" dirty="0"/>
-              <a:t>Use of QUIC going beyond HTTP</a:t>
+              <a:t>Provide a guide to the QUIC wire image</a:t>
             </a:r>
           </a:p>
           <a:p>
             <a:r>
               <a:rPr lang="en-GB" dirty="0"/>
-              <a:t>QUIC manageability document (draft-</a:t>
-            </a:r>
-            <a:r>
-              <a:rPr lang="en-GB" dirty="0" err="1"/>
-              <a:t>ietf</a:t>
-            </a:r>
+              <a:t>The spin bit controversy</a:t>
+            </a:r>
+          </a:p>
+          <a:p>
+            <a:pPr lvl="1"/>
             <a:r>
               <a:rPr lang="en-GB" dirty="0"/>
-              <a:t>-</a:t>
-            </a:r>
-            <a:r>
-              <a:rPr lang="en-GB" dirty="0" err="1"/>
-              <a:t>quic</a:t>
-            </a:r>
+              <a:t>Support for independent measurability of round-trip times</a:t>
+            </a:r>
+          </a:p>
+          <a:p>
+            <a:pPr lvl="1"/>
             <a:r>
               <a:rPr lang="en-GB" dirty="0"/>
-              <a:t>-manageability)</a:t>
-            </a:r>
-          </a:p>
-          <a:p>
-            <a:pPr lvl="1"/>
+              <a:t>Addressing concerns on privacy</a:t>
+            </a:r>
+          </a:p>
+          <a:p>
             <a:r>
               <a:rPr lang="en-GB" dirty="0"/>
-              <a:t>Provide a guide to network operators about the QUIC wire image</a:t>
-            </a:r>
-          </a:p>
-          <a:p>
-            <a:r>
-              <a:rPr lang="en-GB" dirty="0"/>
-              <a:t>The Spin Bit (draft-</a:t>
-            </a:r>
-            <a:r>
-              <a:rPr lang="en-GB" dirty="0" err="1"/>
-              <a:t>ietf</a:t>
-            </a:r>
-            <a:r>
-              <a:rPr lang="en-GB" dirty="0"/>
-              <a:t>-</a:t>
-            </a:r>
-            <a:r>
-              <a:rPr lang="en-GB" dirty="0" err="1"/>
-              <a:t>quic</a:t>
-            </a:r>
-            <a:r>
-              <a:rPr lang="en-GB" dirty="0"/>
-              <a:t>-transport and </a:t>
-            </a:r>
-            <a:r>
-              <a:rPr lang="de-DE" dirty="0" err="1"/>
-              <a:t>draft</a:t>
-            </a:r>
-            <a:r>
-              <a:rPr lang="de-DE" dirty="0"/>
-              <a:t>-</a:t>
-            </a:r>
-            <a:r>
-              <a:rPr lang="de-DE" dirty="0" err="1"/>
-              <a:t>ietf</a:t>
-            </a:r>
-            <a:r>
-              <a:rPr lang="de-DE" dirty="0"/>
-              <a:t>-</a:t>
-            </a:r>
-            <a:r>
-              <a:rPr lang="de-DE" dirty="0" err="1"/>
-              <a:t>quic</a:t>
-            </a:r>
-            <a:r>
-              <a:rPr lang="de-DE" dirty="0"/>
-              <a:t>-spin-</a:t>
-            </a:r>
-            <a:r>
-              <a:rPr lang="de-DE" dirty="0" err="1"/>
-              <a:t>exp</a:t>
-            </a:r>
-            <a:r>
-              <a:rPr lang="de-DE" dirty="0"/>
-              <a:t>)</a:t>
-            </a:r>
-            <a:endParaRPr lang="en-GB" dirty="0"/>
-          </a:p>
-          <a:p>
-            <a:pPr lvl="1"/>
-            <a:r>
-              <a:rPr lang="en-GB" dirty="0"/>
-              <a:t>Support for independent measurability of round-trip times added to QUIC transport spec</a:t>
-            </a:r>
-          </a:p>
-          <a:p>
-            <a:pPr lvl="1"/>
-            <a:r>
-              <a:rPr lang="en-GB" dirty="0"/>
-              <a:t>Addressing concerns on privacy lead to a long discussion reaching out in other part of the IETF and </a:t>
-            </a:r>
-            <a:r>
-              <a:rPr lang="en-GB" dirty="0" err="1"/>
-              <a:t>standardistion</a:t>
-            </a:r>
-            <a:endParaRPr lang="en-GB" dirty="0"/>
-          </a:p>
-          <a:p>
-            <a:r>
-              <a:rPr lang="en-GB" dirty="0"/>
-              <a:t>IAB document on the wire image of a protocol (</a:t>
-            </a:r>
-            <a:r>
-              <a:rPr lang="de-DE" dirty="0" err="1"/>
-              <a:t>draft</a:t>
-            </a:r>
-            <a:r>
-              <a:rPr lang="de-DE" dirty="0"/>
-              <a:t>-</a:t>
-            </a:r>
-            <a:r>
-              <a:rPr lang="de-DE" dirty="0" err="1"/>
-              <a:t>iab</a:t>
-            </a:r>
-            <a:r>
-              <a:rPr lang="de-DE" dirty="0"/>
-              <a:t>-</a:t>
-            </a:r>
-            <a:r>
-              <a:rPr lang="de-DE" dirty="0" err="1"/>
-              <a:t>wire</a:t>
-            </a:r>
-            <a:r>
-              <a:rPr lang="de-DE" dirty="0"/>
-              <a:t>-image)</a:t>
-            </a:r>
-            <a:endParaRPr lang="en-GB" dirty="0"/>
+              <a:t>IAB document on the wire image of a protocol</a:t>
+            </a:r>
           </a:p>
           <a:p>
             <a:pPr lvl="1"/>
@@ -8987,7 +8998,7 @@
         <p:spPr/>
         <p:txBody>
           <a:bodyPr>
-            <a:normAutofit fontScale="92500" lnSpcReduction="10000"/>
+            <a:normAutofit lnSpcReduction="10000"/>
           </a:bodyPr>
           <a:lstStyle/>
           <a:p>
@@ -9000,53 +9011,21 @@
             <a:pPr lvl="1"/>
             <a:r>
               <a:rPr lang="en-GB" dirty="0"/>
-              <a:t>Service architecture (draft-</a:t>
-            </a:r>
-            <a:r>
-              <a:rPr lang="en-GB" dirty="0" err="1"/>
-              <a:t>ietf</a:t>
-            </a:r>
+              <a:t>Service architecture</a:t>
+            </a:r>
+          </a:p>
+          <a:p>
+            <a:pPr lvl="1"/>
             <a:r>
               <a:rPr lang="en-GB" dirty="0"/>
-              <a:t>-taps-arch)</a:t>
+              <a:t>Abstract interface to the transport layer services</a:t>
             </a:r>
           </a:p>
           <a:p>
             <a:pPr lvl="1"/>
             <a:r>
               <a:rPr lang="en-GB" dirty="0"/>
-              <a:t>Abstract interface to the transport layer services (draft-</a:t>
-            </a:r>
-            <a:r>
-              <a:rPr lang="en-GB" dirty="0" err="1"/>
-              <a:t>ietf</a:t>
-            </a:r>
-            <a:r>
-              <a:rPr lang="en-GB" dirty="0"/>
-              <a:t>-taps-interface)</a:t>
-            </a:r>
-          </a:p>
-          <a:p>
-            <a:pPr lvl="1"/>
-            <a:r>
-              <a:rPr lang="en-GB" dirty="0"/>
-              <a:t>An implementation guidance of this interface and underlying mechanisms (draft-</a:t>
-            </a:r>
-            <a:r>
-              <a:rPr lang="en-GB" dirty="0" err="1"/>
-              <a:t>ietf</a:t>
-            </a:r>
-            <a:r>
-              <a:rPr lang="en-GB" dirty="0"/>
-              <a:t>-taps-</a:t>
-            </a:r>
-            <a:r>
-              <a:rPr lang="en-GB" dirty="0" err="1"/>
-              <a:t>impl</a:t>
-            </a:r>
-            <a:r>
-              <a:rPr lang="en-GB" dirty="0"/>
-              <a:t>)</a:t>
+              <a:t>An implementation of this interface</a:t>
             </a:r>
           </a:p>
           <a:p>
@@ -9066,85 +9045,21 @@
             <a:pPr lvl="1"/>
             <a:r>
               <a:rPr lang="en-GB" dirty="0"/>
-              <a:t>Transport encryption analysis (draft-</a:t>
-            </a:r>
-            <a:r>
-              <a:rPr lang="en-GB" dirty="0" err="1"/>
-              <a:t>ietf</a:t>
-            </a:r>
+              <a:t>Transport encryption analysis</a:t>
+            </a:r>
+          </a:p>
+          <a:p>
+            <a:pPr lvl="1"/>
             <a:r>
               <a:rPr lang="en-GB" dirty="0"/>
-              <a:t>-</a:t>
-            </a:r>
-            <a:r>
-              <a:rPr lang="en-GB" dirty="0" err="1"/>
-              <a:t>tsvwg</a:t>
-            </a:r>
+              <a:t>MTU discovery</a:t>
+            </a:r>
+          </a:p>
+          <a:p>
+            <a:pPr lvl="1"/>
             <a:r>
               <a:rPr lang="en-GB" dirty="0"/>
-              <a:t>-transport-encrypt)</a:t>
-            </a:r>
-          </a:p>
-          <a:p>
-            <a:pPr lvl="1"/>
-            <a:r>
-              <a:rPr lang="en-GB" dirty="0"/>
-              <a:t>MTU discovery (draft-</a:t>
-            </a:r>
-            <a:r>
-              <a:rPr lang="en-GB" dirty="0" err="1"/>
-              <a:t>ietf</a:t>
-            </a:r>
-            <a:r>
-              <a:rPr lang="en-GB" dirty="0"/>
-              <a:t>-</a:t>
-            </a:r>
-            <a:r>
-              <a:rPr lang="en-GB" dirty="0" err="1"/>
-              <a:t>tsvwg</a:t>
-            </a:r>
-            <a:r>
-              <a:rPr lang="en-GB" dirty="0"/>
-              <a:t>-datagram-</a:t>
-            </a:r>
-            <a:r>
-              <a:rPr lang="en-GB" dirty="0" err="1"/>
-              <a:t>plpmtud</a:t>
-            </a:r>
-            <a:r>
-              <a:rPr lang="en-GB" dirty="0"/>
-              <a:t>)</a:t>
-            </a:r>
-          </a:p>
-          <a:p>
-            <a:pPr lvl="1"/>
-            <a:r>
-              <a:rPr lang="en-GB" dirty="0"/>
-              <a:t>UDP options (draft-</a:t>
-            </a:r>
-            <a:r>
-              <a:rPr lang="en-GB" dirty="0" err="1"/>
-              <a:t>fairhurst</a:t>
-            </a:r>
-            <a:r>
-              <a:rPr lang="en-GB" dirty="0"/>
-              <a:t>-</a:t>
-            </a:r>
-            <a:r>
-              <a:rPr lang="en-GB" dirty="0" err="1"/>
-              <a:t>udp</a:t>
-            </a:r>
-            <a:r>
-              <a:rPr lang="en-GB" dirty="0"/>
-              <a:t>-options-</a:t>
-            </a:r>
-            <a:r>
-              <a:rPr lang="en-GB" dirty="0" err="1"/>
-              <a:t>cco</a:t>
-            </a:r>
-            <a:r>
-              <a:rPr lang="en-GB" dirty="0"/>
-              <a:t>)</a:t>
+              <a:t>UDP options</a:t>
             </a:r>
           </a:p>
           <a:p>
@@ -9159,23 +9074,7 @@
             </a:r>
             <a:r>
               <a:rPr lang="en-GB" dirty="0"/>
-              <a:t> issues (draft-</a:t>
-            </a:r>
-            <a:r>
-              <a:rPr lang="en-GB" dirty="0" err="1"/>
-              <a:t>fossati</a:t>
-            </a:r>
-            <a:r>
-              <a:rPr lang="en-GB" dirty="0"/>
-              <a:t>-</a:t>
-            </a:r>
-            <a:r>
-              <a:rPr lang="en-GB" dirty="0" err="1"/>
-              <a:t>tsvwg-lola</a:t>
-            </a:r>
-            <a:r>
-              <a:rPr lang="en-GB" dirty="0"/>
-              <a:t>)</a:t>
+              <a:t> issues</a:t>
             </a:r>
           </a:p>
           <a:p>
@@ -9292,91 +9191,73 @@
         <p:spPr/>
         <p:txBody>
           <a:bodyPr>
-            <a:normAutofit/>
+            <a:normAutofit lnSpcReduction="10000"/>
           </a:bodyPr>
           <a:lstStyle/>
           <a:p>
             <a:r>
-              <a:rPr lang="en-GB" dirty="0"/>
-              <a:t>The STAR protocol (draft-</a:t>
-            </a:r>
-            <a:r>
-              <a:rPr lang="en-GB" dirty="0" err="1"/>
-              <a:t>ietf</a:t>
-            </a:r>
-            <a:r>
-              <a:rPr lang="en-GB" dirty="0"/>
-              <a:t>-acme-star)</a:t>
+              <a:rPr lang="en-GB"/>
+              <a:t>The STAR protocol</a:t>
             </a:r>
           </a:p>
           <a:p>
             <a:pPr lvl="1"/>
             <a:r>
-              <a:rPr lang="en-GB" dirty="0"/>
+              <a:rPr lang="en-GB"/>
               <a:t>Extension to ACME certificate management mechanisms</a:t>
             </a:r>
           </a:p>
           <a:p>
             <a:pPr lvl="1"/>
             <a:r>
-              <a:rPr lang="en-GB" dirty="0"/>
+              <a:rPr lang="en-GB"/>
               <a:t>Supporting trust link delegation to unattended devices</a:t>
             </a:r>
           </a:p>
           <a:p>
             <a:pPr lvl="1"/>
             <a:r>
-              <a:rPr lang="en-GB" dirty="0"/>
+              <a:rPr lang="en-GB"/>
               <a:t>Full control by the delegating entity</a:t>
             </a:r>
           </a:p>
           <a:p>
             <a:r>
-              <a:rPr lang="en-GB" dirty="0"/>
-              <a:t>DTLS connection id (draft-</a:t>
-            </a:r>
-            <a:r>
-              <a:rPr lang="en-GB" dirty="0" err="1"/>
-              <a:t>ietf</a:t>
-            </a:r>
-            <a:r>
-              <a:rPr lang="en-GB" dirty="0"/>
-              <a:t>-</a:t>
-            </a:r>
-            <a:r>
-              <a:rPr lang="en-GB" dirty="0" err="1"/>
-              <a:t>tls</a:t>
-            </a:r>
-            <a:r>
-              <a:rPr lang="en-GB" dirty="0"/>
-              <a:t>-</a:t>
-            </a:r>
-            <a:r>
-              <a:rPr lang="en-GB" dirty="0" err="1"/>
-              <a:t>dtls</a:t>
-            </a:r>
-            <a:r>
-              <a:rPr lang="en-GB" dirty="0"/>
-              <a:t>-connection-id)</a:t>
+              <a:rPr lang="en-GB"/>
+              <a:t>DTLS connection id</a:t>
             </a:r>
           </a:p>
           <a:p>
             <a:pPr lvl="1"/>
             <a:r>
-              <a:rPr lang="en-GB" dirty="0"/>
+              <a:rPr lang="en-GB"/>
               <a:t>Improve security association selection</a:t>
             </a:r>
           </a:p>
           <a:p>
             <a:r>
-              <a:rPr lang="en-GB" dirty="0"/>
-              <a:t>The efforts for a ”middlebox security protocol” (ETSI TC-CYBER-0027-x)</a:t>
-            </a:r>
-          </a:p>
-          <a:p>
-            <a:r>
-              <a:rPr lang="en-GB" dirty="0"/>
-              <a:t>Encrypted traffic inspection (IEEE ETI)</a:t>
+              <a:rPr lang="en-GB"/>
+              <a:t>The efforts for a ”middlebox security protocol”</a:t>
+            </a:r>
+          </a:p>
+          <a:p>
+            <a:pPr lvl="1"/>
+            <a:r>
+              <a:rPr lang="en-GB"/>
+              <a:t>ETSI TC-CYBER-0027-x</a:t>
+            </a:r>
+          </a:p>
+          <a:p>
+            <a:r>
+              <a:rPr lang="en-GB"/>
+              <a:t>Encrypted traffic inspection</a:t>
+            </a:r>
+          </a:p>
+          <a:p>
+            <a:pPr lvl="1"/>
+            <a:r>
+              <a:rPr lang="en-GB"/>
+              <a:t>IEEE ETI</a:t>
             </a:r>
           </a:p>
         </p:txBody>
@@ -9527,7 +9408,7 @@
             <a:pPr lvl="1"/>
             <a:r>
               <a:rPr lang="en-GB" dirty="0"/>
-              <a:t>Trusting links</a:t>
+              <a:t>Trust links</a:t>
             </a:r>
           </a:p>
           <a:p>

</xml_diff>

<commit_message>
Address comments from the pre-review rehearsal
</commit_message>
<xml_diff>
--- a/review3-brussels/WP4-ReviewFinal.pptx
+++ b/review3-brussels/WP4-ReviewFinal.pptx
@@ -14,20 +14,20 @@
     <p:sldId id="298" r:id="rId2"/>
     <p:sldId id="300" r:id="rId3"/>
     <p:sldId id="302" r:id="rId4"/>
-    <p:sldId id="299" r:id="rId5"/>
-    <p:sldId id="316" r:id="rId6"/>
-    <p:sldId id="317" r:id="rId7"/>
-    <p:sldId id="318" r:id="rId8"/>
-    <p:sldId id="320" r:id="rId9"/>
-    <p:sldId id="319" r:id="rId10"/>
-    <p:sldId id="321" r:id="rId11"/>
-    <p:sldId id="310" r:id="rId12"/>
-    <p:sldId id="322" r:id="rId13"/>
-    <p:sldId id="312" r:id="rId14"/>
-    <p:sldId id="308" r:id="rId15"/>
-    <p:sldId id="323" r:id="rId16"/>
-    <p:sldId id="313" r:id="rId17"/>
-    <p:sldId id="301" r:id="rId18"/>
+    <p:sldId id="316" r:id="rId5"/>
+    <p:sldId id="317" r:id="rId6"/>
+    <p:sldId id="318" r:id="rId7"/>
+    <p:sldId id="320" r:id="rId8"/>
+    <p:sldId id="319" r:id="rId9"/>
+    <p:sldId id="321" r:id="rId10"/>
+    <p:sldId id="310" r:id="rId11"/>
+    <p:sldId id="322" r:id="rId12"/>
+    <p:sldId id="312" r:id="rId13"/>
+    <p:sldId id="308" r:id="rId14"/>
+    <p:sldId id="323" r:id="rId15"/>
+    <p:sldId id="313" r:id="rId16"/>
+    <p:sldId id="301" r:id="rId17"/>
+    <p:sldId id="299" r:id="rId18"/>
   </p:sldIdLst>
   <p:sldSz cx="13004800" cy="9753600"/>
   <p:notesSz cx="6858000" cy="9144000"/>
@@ -274,7 +274,7 @@
           <a:p>
             <a:fld id="{38AEA946-BE12-485E-8CED-EB49F79C0D9F}" type="datetimeFigureOut">
               <a:rPr lang="de-CH" smtClean="0"/>
-              <a:t>23.01.19</a:t>
+              <a:t>29.01.19</a:t>
             </a:fld>
             <a:endParaRPr lang="de-CH"/>
           </a:p>
@@ -5712,8 +5712,8 @@
           <a:lstStyle/>
           <a:p>
             <a:r>
-              <a:rPr lang="en-US" dirty="0"/>
-              <a:t>Direct Industrial Applications</a:t>
+              <a:rPr lang="en-GB" dirty="0"/>
+              <a:t>Additional Industrial Applications</a:t>
             </a:r>
           </a:p>
         </p:txBody>
@@ -5736,106 +5736,83 @@
           <a:lstStyle/>
           <a:p>
             <a:r>
-              <a:rPr lang="en-GB" dirty="0"/>
-              <a:t>Application of path-awareness principles</a:t>
+              <a:rPr lang="en-US" dirty="0"/>
+              <a:t>STAR-based trust link management</a:t>
             </a:r>
           </a:p>
           <a:p>
             <a:pPr lvl="1"/>
             <a:r>
-              <a:rPr lang="en-GB" dirty="0"/>
-              <a:t>Enhanced cooperation with the mobile network in the </a:t>
-            </a:r>
-            <a:r>
-              <a:rPr lang="en-GB" dirty="0" err="1"/>
-              <a:t>Velocix</a:t>
-            </a:r>
-            <a:r>
-              <a:rPr lang="en-GB" dirty="0"/>
-              <a:t> product line</a:t>
-            </a:r>
-          </a:p>
-          <a:p>
-            <a:pPr lvl="2"/>
-            <a:r>
-              <a:rPr lang="en-GB" dirty="0"/>
-              <a:t>Better </a:t>
-            </a:r>
-            <a:r>
-              <a:rPr lang="en-GB" dirty="0" err="1"/>
-              <a:t>QoE</a:t>
+              <a:rPr lang="en-US" dirty="0"/>
+              <a:t>Encrypted traffic negotiation at edge locations in CDN and </a:t>
+            </a:r>
+            <a:r>
+              <a:rPr lang="en-US" dirty="0" err="1"/>
+              <a:t>mABR</a:t>
+            </a:r>
+            <a:r>
+              <a:rPr lang="en-US" dirty="0"/>
+              <a:t> systems </a:t>
+            </a:r>
+          </a:p>
+          <a:p>
+            <a:pPr lvl="1"/>
+            <a:r>
+              <a:rPr lang="en-US" dirty="0"/>
+              <a:t>Secure browsing</a:t>
+            </a:r>
+          </a:p>
+          <a:p>
+            <a:pPr lvl="1"/>
+            <a:r>
+              <a:rPr lang="en-US" dirty="0"/>
+              <a:t>NFV deployments</a:t>
+            </a:r>
+          </a:p>
+          <a:p>
+            <a:r>
+              <a:rPr lang="en-US" dirty="0"/>
+              <a:t>DTLS connection identifier</a:t>
+            </a:r>
+          </a:p>
+          <a:p>
+            <a:pPr lvl="1"/>
+            <a:r>
+              <a:rPr lang="en-US" dirty="0"/>
+              <a:t>IMPACT IoT product line</a:t>
+            </a:r>
+          </a:p>
+          <a:p>
+            <a:r>
+              <a:rPr lang="en-US" dirty="0"/>
+              <a:t>NFV-enabled experimentation </a:t>
+            </a:r>
+          </a:p>
+          <a:p>
+            <a:pPr lvl="1"/>
+            <a:r>
+              <a:rPr lang="en-US" dirty="0"/>
+              <a:t>Repeatability for evaluation and demonstration purposes</a:t>
+            </a:r>
+          </a:p>
+          <a:p>
+            <a:pPr lvl="1"/>
+            <a:r>
+              <a:rPr lang="en-US" dirty="0"/>
+              <a:t>Application of the </a:t>
+            </a:r>
+            <a:r>
+              <a:rPr lang="en-US" i="1" dirty="0" err="1"/>
+              <a:t>Trafic</a:t>
+            </a:r>
+            <a:r>
+              <a:rPr lang="en-US" dirty="0"/>
+              <a:t> tool, leveraging 5TONIC and the 5GINFIRE project</a:t>
             </a:r>
             <a:endParaRPr lang="en-GB" dirty="0"/>
           </a:p>
           <a:p>
-            <a:pPr lvl="2"/>
-            <a:r>
-              <a:rPr lang="en-GB" dirty="0"/>
-              <a:t>Expand the number of adaptation/personalisation functionality for OTT video delivery</a:t>
-            </a:r>
-          </a:p>
-          <a:p>
-            <a:pPr lvl="1"/>
-            <a:r>
-              <a:rPr lang="en-GB" dirty="0"/>
-              <a:t>Deployment of NFV-enabled middleboxes</a:t>
-            </a:r>
-          </a:p>
-          <a:p>
-            <a:pPr lvl="2"/>
-            <a:r>
-              <a:rPr lang="en-GB" dirty="0"/>
-              <a:t>Home environments</a:t>
-            </a:r>
-          </a:p>
-          <a:p>
-            <a:pPr lvl="2"/>
-            <a:r>
-              <a:rPr lang="en-GB" dirty="0" err="1"/>
-              <a:t>vCPE</a:t>
-            </a:r>
-            <a:r>
-              <a:rPr lang="en-GB" dirty="0"/>
-              <a:t> and </a:t>
-            </a:r>
-            <a:r>
-              <a:rPr lang="en-GB" dirty="0" err="1"/>
-              <a:t>uCPE</a:t>
-            </a:r>
-            <a:r>
-              <a:rPr lang="en-GB" dirty="0"/>
-              <a:t> services</a:t>
-            </a:r>
-          </a:p>
-          <a:p>
-            <a:r>
-              <a:rPr lang="en-GB" dirty="0"/>
-              <a:t>Applications of the MAMI PTO and measurement data </a:t>
-            </a:r>
-          </a:p>
-          <a:p>
-            <a:pPr lvl="1"/>
-            <a:r>
-              <a:rPr lang="en-GB" dirty="0"/>
-              <a:t>Trustworthy data sources to evaluate the impact of pervasive encryption</a:t>
-            </a:r>
-          </a:p>
-          <a:p>
-            <a:pPr lvl="1"/>
-            <a:r>
-              <a:rPr lang="en-GB" dirty="0"/>
-              <a:t>Collaboration with the MONROE project for mobile Internet evidences</a:t>
-            </a:r>
-          </a:p>
-          <a:p>
-            <a:pPr lvl="1"/>
-            <a:r>
-              <a:rPr lang="en-GB" dirty="0"/>
-              <a:t>Application of the QUIC spin bit to measurement systems</a:t>
-            </a:r>
-          </a:p>
-          <a:p>
-            <a:endParaRPr lang="en-GB" dirty="0"/>
+            <a:endParaRPr lang="en-US" dirty="0"/>
           </a:p>
         </p:txBody>
       </p:sp>
@@ -5855,184 +5832,9 @@
           <a:lstStyle/>
           <a:p>
             <a:fld id="{CA36C8A0-BAEB-42C3-A2D9-B1F0D6FD294D}" type="slidenum">
-              <a:rPr lang="en-US" smtClean="0"/>
+              <a:rPr lang="en-GB" smtClean="0"/>
               <a:pPr/>
               <a:t>10</a:t>
-            </a:fld>
-            <a:endParaRPr lang="en-US"/>
-          </a:p>
-        </p:txBody>
-      </p:sp>
-    </p:spTree>
-    <p:extLst>
-      <p:ext uri="{BB962C8B-B14F-4D97-AF65-F5344CB8AC3E}">
-        <p14:creationId xmlns:p14="http://schemas.microsoft.com/office/powerpoint/2010/main" val="4104428027"/>
-      </p:ext>
-    </p:extLst>
-  </p:cSld>
-  <p:clrMapOvr>
-    <a:masterClrMapping/>
-  </p:clrMapOvr>
-  <p:transition spd="med"/>
-</p:sld>
-</file>
-
-<file path=ppt/slides/slide11.xml><?xml version="1.0" encoding="utf-8"?>
-<p:sld xmlns:a="http://schemas.openxmlformats.org/drawingml/2006/main" xmlns:r="http://schemas.openxmlformats.org/officeDocument/2006/relationships" xmlns:p="http://schemas.openxmlformats.org/presentationml/2006/main">
-  <p:cSld>
-    <p:spTree>
-      <p:nvGrpSpPr>
-        <p:cNvPr id="1" name=""/>
-        <p:cNvGrpSpPr/>
-        <p:nvPr/>
-      </p:nvGrpSpPr>
-      <p:grpSpPr>
-        <a:xfrm>
-          <a:off x="0" y="0"/>
-          <a:ext cx="0" cy="0"/>
-          <a:chOff x="0" y="0"/>
-          <a:chExt cx="0" cy="0"/>
-        </a:xfrm>
-      </p:grpSpPr>
-      <p:sp>
-        <p:nvSpPr>
-          <p:cNvPr id="7" name="Titel 6"/>
-          <p:cNvSpPr>
-            <a:spLocks noGrp="1"/>
-          </p:cNvSpPr>
-          <p:nvPr>
-            <p:ph type="title"/>
-          </p:nvPr>
-        </p:nvSpPr>
-        <p:spPr/>
-        <p:txBody>
-          <a:bodyPr/>
-          <a:lstStyle/>
-          <a:p>
-            <a:r>
-              <a:rPr lang="en-GB" dirty="0"/>
-              <a:t>Additional Industrial Applications</a:t>
-            </a:r>
-          </a:p>
-        </p:txBody>
-      </p:sp>
-      <p:sp>
-        <p:nvSpPr>
-          <p:cNvPr id="8" name="Textplatzhalter 7"/>
-          <p:cNvSpPr>
-            <a:spLocks noGrp="1"/>
-          </p:cNvSpPr>
-          <p:nvPr>
-            <p:ph type="body" sz="quarter" idx="13"/>
-          </p:nvPr>
-        </p:nvSpPr>
-        <p:spPr/>
-        <p:txBody>
-          <a:bodyPr>
-            <a:normAutofit fontScale="92500"/>
-          </a:bodyPr>
-          <a:lstStyle/>
-          <a:p>
-            <a:r>
-              <a:rPr lang="en-US" dirty="0"/>
-              <a:t>STAR-based trust link management</a:t>
-            </a:r>
-          </a:p>
-          <a:p>
-            <a:pPr lvl="1"/>
-            <a:r>
-              <a:rPr lang="en-US" dirty="0"/>
-              <a:t>Encrypted traffic negotiation at edge locations in CDN and </a:t>
-            </a:r>
-            <a:r>
-              <a:rPr lang="en-US" dirty="0" err="1"/>
-              <a:t>mABR</a:t>
-            </a:r>
-            <a:r>
-              <a:rPr lang="en-US" dirty="0"/>
-              <a:t> systems </a:t>
-            </a:r>
-          </a:p>
-          <a:p>
-            <a:pPr lvl="1"/>
-            <a:r>
-              <a:rPr lang="en-US" dirty="0"/>
-              <a:t>Secure browsing</a:t>
-            </a:r>
-          </a:p>
-          <a:p>
-            <a:pPr lvl="1"/>
-            <a:r>
-              <a:rPr lang="en-US" dirty="0"/>
-              <a:t>NFV deployments</a:t>
-            </a:r>
-          </a:p>
-          <a:p>
-            <a:r>
-              <a:rPr lang="en-US" dirty="0"/>
-              <a:t>DTLS connection identifier</a:t>
-            </a:r>
-          </a:p>
-          <a:p>
-            <a:pPr lvl="1"/>
-            <a:r>
-              <a:rPr lang="en-US" dirty="0"/>
-              <a:t>IMPACT IoT product line</a:t>
-            </a:r>
-          </a:p>
-          <a:p>
-            <a:r>
-              <a:rPr lang="en-US" dirty="0"/>
-              <a:t>NFV-enabled experimentation </a:t>
-            </a:r>
-          </a:p>
-          <a:p>
-            <a:pPr lvl="1"/>
-            <a:r>
-              <a:rPr lang="en-US" dirty="0"/>
-              <a:t>Repeatability for evaluation and demonstration purposes</a:t>
-            </a:r>
-          </a:p>
-          <a:p>
-            <a:pPr lvl="1"/>
-            <a:r>
-              <a:rPr lang="en-US" dirty="0"/>
-              <a:t>Application of the </a:t>
-            </a:r>
-            <a:r>
-              <a:rPr lang="en-US" i="1" dirty="0" err="1"/>
-              <a:t>Trafic</a:t>
-            </a:r>
-            <a:r>
-              <a:rPr lang="en-US" dirty="0"/>
-              <a:t> tool, leveraging 5TONIC and the 5GINFIRE project</a:t>
-            </a:r>
-            <a:endParaRPr lang="en-GB" dirty="0"/>
-          </a:p>
-          <a:p>
-            <a:endParaRPr lang="en-US" dirty="0"/>
-          </a:p>
-        </p:txBody>
-      </p:sp>
-      <p:sp>
-        <p:nvSpPr>
-          <p:cNvPr id="5" name="Foliennummernplatzhalter 4"/>
-          <p:cNvSpPr>
-            <a:spLocks noGrp="1"/>
-          </p:cNvSpPr>
-          <p:nvPr>
-            <p:ph type="sldNum" sz="quarter" idx="16"/>
-          </p:nvPr>
-        </p:nvSpPr>
-        <p:spPr/>
-        <p:txBody>
-          <a:bodyPr/>
-          <a:lstStyle/>
-          <a:p>
-            <a:fld id="{CA36C8A0-BAEB-42C3-A2D9-B1F0D6FD294D}" type="slidenum">
-              <a:rPr lang="en-GB" smtClean="0"/>
-              <a:pPr/>
-              <a:t>11</a:t>
             </a:fld>
             <a:endParaRPr lang="en-GB" dirty="0"/>
           </a:p>
@@ -6052,7 +5854,7 @@
 </p:sld>
 </file>
 
-<file path=ppt/slides/slide12.xml><?xml version="1.0" encoding="utf-8"?>
+<file path=ppt/slides/slide11.xml><?xml version="1.0" encoding="utf-8"?>
 <p:sld xmlns:a="http://schemas.openxmlformats.org/drawingml/2006/main" xmlns:r="http://schemas.openxmlformats.org/officeDocument/2006/relationships" xmlns:p="http://schemas.openxmlformats.org/presentationml/2006/main">
   <p:cSld>
     <p:spTree>
@@ -6155,7 +5957,7 @@
             <a:pPr lvl="1"/>
             <a:r>
               <a:rPr lang="en-GB" dirty="0"/>
-              <a:t>Conclusion of the Management and Measurement Summit</a:t>
+              <a:t>Conclusion of the MAMI Management and Measurement Summit</a:t>
             </a:r>
           </a:p>
           <a:p>
@@ -6211,7 +6013,7 @@
             <a:fld id="{CA36C8A0-BAEB-42C3-A2D9-B1F0D6FD294D}" type="slidenum">
               <a:rPr lang="de-CH" smtClean="0"/>
               <a:pPr/>
-              <a:t>12</a:t>
+              <a:t>11</a:t>
             </a:fld>
             <a:endParaRPr lang="de-CH" dirty="0"/>
           </a:p>
@@ -6231,7 +6033,7 @@
 </p:sld>
 </file>
 
-<file path=ppt/slides/slide13.xml><?xml version="1.0" encoding="utf-8"?>
+<file path=ppt/slides/slide12.xml><?xml version="1.0" encoding="utf-8"?>
 <p:sld xmlns:a="http://schemas.openxmlformats.org/drawingml/2006/main" xmlns:r="http://schemas.openxmlformats.org/officeDocument/2006/relationships" xmlns:p="http://schemas.openxmlformats.org/presentationml/2006/main">
   <p:cSld>
     <p:spTree>
@@ -6412,7 +6214,7 @@
             <a:fld id="{CA36C8A0-BAEB-42C3-A2D9-B1F0D6FD294D}" type="slidenum">
               <a:rPr lang="de-CH" smtClean="0"/>
               <a:pPr/>
-              <a:t>13</a:t>
+              <a:t>12</a:t>
             </a:fld>
             <a:endParaRPr lang="de-CH" dirty="0"/>
           </a:p>
@@ -6432,7 +6234,7 @@
 </p:sld>
 </file>
 
-<file path=ppt/slides/slide14.xml><?xml version="1.0" encoding="utf-8"?>
+<file path=ppt/slides/slide13.xml><?xml version="1.0" encoding="utf-8"?>
 <p:sld xmlns:a="http://schemas.openxmlformats.org/drawingml/2006/main" xmlns:r="http://schemas.openxmlformats.org/officeDocument/2006/relationships" xmlns:p="http://schemas.openxmlformats.org/presentationml/2006/main">
   <p:cSld>
     <p:spTree>
@@ -6640,7 +6442,7 @@
             <a:fld id="{CA36C8A0-BAEB-42C3-A2D9-B1F0D6FD294D}" type="slidenum">
               <a:rPr lang="en-GB" smtClean="0"/>
               <a:pPr/>
-              <a:t>14</a:t>
+              <a:t>13</a:t>
             </a:fld>
             <a:endParaRPr lang="en-GB" dirty="0"/>
           </a:p>
@@ -6660,7 +6462,7 @@
 </p:sld>
 </file>
 
-<file path=ppt/slides/slide15.xml><?xml version="1.0" encoding="utf-8"?>
+<file path=ppt/slides/slide14.xml><?xml version="1.0" encoding="utf-8"?>
 <p:sld xmlns:a="http://schemas.openxmlformats.org/drawingml/2006/main" xmlns:r="http://schemas.openxmlformats.org/officeDocument/2006/relationships" xmlns:p="http://schemas.openxmlformats.org/presentationml/2006/main">
   <p:cSld>
     <p:spTree>
@@ -6693,7 +6495,7 @@
           <a:lstStyle/>
           <a:p>
             <a:r>
-              <a:rPr lang="en-GB"/>
+              <a:rPr lang="en-GB" dirty="0"/>
               <a:t>Academic Exploitation</a:t>
             </a:r>
           </a:p>
@@ -6808,7 +6610,7 @@
             <a:fld id="{CA36C8A0-BAEB-42C3-A2D9-B1F0D6FD294D}" type="slidenum">
               <a:rPr lang="de-CH" smtClean="0"/>
               <a:pPr/>
-              <a:t>15</a:t>
+              <a:t>14</a:t>
             </a:fld>
             <a:endParaRPr lang="de-CH" dirty="0"/>
           </a:p>
@@ -7126,6 +6928,219 @@
 </p:sld>
 </file>
 
+<file path=ppt/slides/slide15.xml><?xml version="1.0" encoding="utf-8"?>
+<p:sld xmlns:a="http://schemas.openxmlformats.org/drawingml/2006/main" xmlns:r="http://schemas.openxmlformats.org/officeDocument/2006/relationships" xmlns:p="http://schemas.openxmlformats.org/presentationml/2006/main">
+  <p:cSld>
+    <p:spTree>
+      <p:nvGrpSpPr>
+        <p:cNvPr id="1" name=""/>
+        <p:cNvGrpSpPr/>
+        <p:nvPr/>
+      </p:nvGrpSpPr>
+      <p:grpSpPr>
+        <a:xfrm>
+          <a:off x="0" y="0"/>
+          <a:ext cx="0" cy="0"/>
+          <a:chOff x="0" y="0"/>
+          <a:chExt cx="0" cy="0"/>
+        </a:xfrm>
+      </p:grpSpPr>
+      <p:sp>
+        <p:nvSpPr>
+          <p:cNvPr id="2" name="Title 1"/>
+          <p:cNvSpPr>
+            <a:spLocks noGrp="1"/>
+          </p:cNvSpPr>
+          <p:nvPr>
+            <p:ph type="title"/>
+          </p:nvPr>
+        </p:nvSpPr>
+        <p:spPr/>
+        <p:txBody>
+          <a:bodyPr/>
+          <a:lstStyle/>
+          <a:p>
+            <a:r>
+              <a:rPr lang="en-US" dirty="0"/>
+              <a:t>Online Presence</a:t>
+            </a:r>
+          </a:p>
+        </p:txBody>
+      </p:sp>
+      <p:sp>
+        <p:nvSpPr>
+          <p:cNvPr id="3" name="Text Placeholder 2"/>
+          <p:cNvSpPr>
+            <a:spLocks noGrp="1"/>
+          </p:cNvSpPr>
+          <p:nvPr>
+            <p:ph type="body" sz="quarter" idx="13"/>
+          </p:nvPr>
+        </p:nvSpPr>
+        <p:spPr/>
+        <p:txBody>
+          <a:bodyPr>
+            <a:normAutofit fontScale="92500" lnSpcReduction="10000"/>
+          </a:bodyPr>
+          <a:lstStyle/>
+          <a:p>
+            <a:r>
+              <a:rPr lang="en-GB" dirty="0"/>
+              <a:t>The MAMI domains and website </a:t>
+            </a:r>
+          </a:p>
+          <a:p>
+            <a:pPr lvl="1"/>
+            <a:r>
+              <a:rPr lang="en-GB" dirty="0">
+                <a:hlinkClick r:id="rId2"/>
+              </a:rPr>
+              <a:t>https://mami-project.eu/</a:t>
+            </a:r>
+            <a:r>
+              <a:rPr lang="en-GB" dirty="0"/>
+              <a:t> is updated with information on publications, standardisation efforts, events, and a lively blog used to disseminate MAMI research results and activities. </a:t>
+            </a:r>
+          </a:p>
+          <a:p>
+            <a:pPr lvl="1"/>
+            <a:r>
+              <a:rPr lang="en-GB" dirty="0">
+                <a:hlinkClick r:id="rId3"/>
+              </a:rPr>
+              <a:t>https://observatory.mami-project.eu/</a:t>
+            </a:r>
+            <a:r>
+              <a:rPr lang="en-GB" dirty="0"/>
+              <a:t> (the MAMI PTO)</a:t>
+            </a:r>
+          </a:p>
+          <a:p>
+            <a:pPr lvl="1"/>
+            <a:r>
+              <a:rPr lang="en-GB" dirty="0"/>
+              <a:t>Other related websites (</a:t>
+            </a:r>
+            <a:r>
+              <a:rPr lang="en-GB" dirty="0" err="1"/>
+              <a:t>PATHspider</a:t>
+            </a:r>
+            <a:r>
+              <a:rPr lang="en-GB" dirty="0"/>
+              <a:t>, </a:t>
+            </a:r>
+            <a:r>
+              <a:rPr lang="en-GB" dirty="0" err="1"/>
+              <a:t>Tracebox</a:t>
+            </a:r>
+            <a:r>
+              <a:rPr lang="en-GB" dirty="0"/>
+              <a:t>, </a:t>
+            </a:r>
+            <a:r>
+              <a:rPr lang="en-GB" dirty="0" err="1"/>
+              <a:t>Eyeorg</a:t>
+            </a:r>
+            <a:r>
+              <a:rPr lang="en-GB" dirty="0"/>
+              <a:t>, HTTP2 Dashboard) at </a:t>
+            </a:r>
+            <a:r>
+              <a:rPr lang="en-GB" dirty="0">
+                <a:hlinkClick r:id="rId4"/>
+              </a:rPr>
+              <a:t>https://mami-project.eu/index.php/weblinks/</a:t>
+            </a:r>
+            <a:r>
+              <a:rPr lang="en-GB" dirty="0"/>
+              <a:t> </a:t>
+            </a:r>
+          </a:p>
+          <a:p>
+            <a:r>
+              <a:rPr lang="en-GB" dirty="0"/>
+              <a:t>The MAMI Twitter account</a:t>
+            </a:r>
+          </a:p>
+          <a:p>
+            <a:pPr lvl="1"/>
+            <a:r>
+              <a:rPr lang="en-GB" dirty="0"/>
+              <a:t>@</a:t>
+            </a:r>
+            <a:r>
+              <a:rPr lang="en-GB" dirty="0" err="1"/>
+              <a:t>mamiproject</a:t>
+            </a:r>
+            <a:r>
+              <a:rPr lang="en-GB" dirty="0"/>
+              <a:t> was created in March 2015</a:t>
+            </a:r>
+          </a:p>
+          <a:p>
+            <a:pPr lvl="1"/>
+            <a:r>
+              <a:rPr lang="en-GB" dirty="0"/>
+              <a:t>Cumulated stats by 20 December 2018</a:t>
+            </a:r>
+          </a:p>
+          <a:p>
+            <a:pPr lvl="2"/>
+            <a:r>
+              <a:rPr lang="en-GB" dirty="0"/>
+              <a:t>244 followers</a:t>
+            </a:r>
+          </a:p>
+          <a:p>
+            <a:pPr lvl="2"/>
+            <a:r>
+              <a:rPr lang="en-GB" dirty="0"/>
+              <a:t>3686 tweets</a:t>
+            </a:r>
+          </a:p>
+          <a:p>
+            <a:endParaRPr lang="en-GB" dirty="0"/>
+          </a:p>
+        </p:txBody>
+      </p:sp>
+      <p:sp>
+        <p:nvSpPr>
+          <p:cNvPr id="4" name="Slide Number Placeholder 3"/>
+          <p:cNvSpPr>
+            <a:spLocks noGrp="1"/>
+          </p:cNvSpPr>
+          <p:nvPr>
+            <p:ph type="sldNum" sz="quarter" idx="16"/>
+          </p:nvPr>
+        </p:nvSpPr>
+        <p:spPr/>
+        <p:txBody>
+          <a:bodyPr/>
+          <a:lstStyle/>
+          <a:p>
+            <a:fld id="{CA36C8A0-BAEB-42C3-A2D9-B1F0D6FD294D}" type="slidenum">
+              <a:rPr lang="de-CH" smtClean="0"/>
+              <a:pPr/>
+              <a:t>15</a:t>
+            </a:fld>
+            <a:endParaRPr lang="de-CH" dirty="0"/>
+          </a:p>
+        </p:txBody>
+      </p:sp>
+    </p:spTree>
+    <p:extLst>
+      <p:ext uri="{BB962C8B-B14F-4D97-AF65-F5344CB8AC3E}">
+        <p14:creationId xmlns:p14="http://schemas.microsoft.com/office/powerpoint/2010/main" val="2098036363"/>
+      </p:ext>
+    </p:extLst>
+  </p:cSld>
+  <p:clrMapOvr>
+    <a:masterClrMapping/>
+  </p:clrMapOvr>
+  <p:transition spd="med"/>
+</p:sld>
+</file>
+
 <file path=ppt/slides/slide16.xml><?xml version="1.0" encoding="utf-8"?>
 <p:sld xmlns:a="http://schemas.openxmlformats.org/drawingml/2006/main" xmlns:r="http://schemas.openxmlformats.org/officeDocument/2006/relationships" xmlns:p="http://schemas.openxmlformats.org/presentationml/2006/main">
   <p:cSld>
@@ -7160,144 +7175,8 @@
           <a:p>
             <a:r>
               <a:rPr lang="en-US" dirty="0"/>
-              <a:t>Online Presence</a:t>
-            </a:r>
-          </a:p>
-        </p:txBody>
-      </p:sp>
-      <p:sp>
-        <p:nvSpPr>
-          <p:cNvPr id="3" name="Text Placeholder 2"/>
-          <p:cNvSpPr>
-            <a:spLocks noGrp="1"/>
-          </p:cNvSpPr>
-          <p:nvPr>
-            <p:ph type="body" sz="quarter" idx="13"/>
-          </p:nvPr>
-        </p:nvSpPr>
-        <p:spPr/>
-        <p:txBody>
-          <a:bodyPr>
-            <a:normAutofit fontScale="92500" lnSpcReduction="20000"/>
-          </a:bodyPr>
-          <a:lstStyle/>
-          <a:p>
-            <a:r>
-              <a:rPr lang="en-GB" dirty="0"/>
-              <a:t>The MAMI domains and website </a:t>
-            </a:r>
-          </a:p>
-          <a:p>
-            <a:pPr lvl="1"/>
-            <a:r>
-              <a:rPr lang="en-GB" dirty="0">
-                <a:hlinkClick r:id="rId2"/>
-              </a:rPr>
-              <a:t>https://mami-project.eu/</a:t>
-            </a:r>
-            <a:r>
-              <a:rPr lang="en-GB" dirty="0"/>
-              <a:t> is updated with information on publications, standardisation efforts, events, and a lively blog used to disseminate MAMI research results and activities. </a:t>
-            </a:r>
-          </a:p>
-          <a:p>
-            <a:pPr lvl="1"/>
-            <a:r>
-              <a:rPr lang="en-GB" dirty="0">
-                <a:hlinkClick r:id="rId3"/>
-              </a:rPr>
-              <a:t>https://observatory.mami-project.eu/</a:t>
-            </a:r>
-            <a:r>
-              <a:rPr lang="en-GB" dirty="0"/>
-              <a:t> (the MAMI PTO), available since May 2016</a:t>
-            </a:r>
-          </a:p>
-          <a:p>
-            <a:pPr lvl="1"/>
-            <a:r>
-              <a:rPr lang="en-GB" dirty="0"/>
-              <a:t>Other related websites (</a:t>
-            </a:r>
-            <a:r>
-              <a:rPr lang="en-GB" dirty="0" err="1"/>
-              <a:t>PATHspider</a:t>
-            </a:r>
-            <a:r>
-              <a:rPr lang="en-GB" dirty="0"/>
-              <a:t>, </a:t>
-            </a:r>
-            <a:r>
-              <a:rPr lang="en-GB" dirty="0" err="1"/>
-              <a:t>Tracebox</a:t>
-            </a:r>
-            <a:r>
-              <a:rPr lang="en-GB" dirty="0"/>
-              <a:t>, </a:t>
-            </a:r>
-            <a:r>
-              <a:rPr lang="en-GB" dirty="0" err="1"/>
-              <a:t>Eyeorg</a:t>
-            </a:r>
-            <a:r>
-              <a:rPr lang="en-GB" dirty="0"/>
-              <a:t>, HTTP2 Dashboard) at </a:t>
-            </a:r>
-            <a:r>
-              <a:rPr lang="en-GB" dirty="0">
-                <a:hlinkClick r:id="rId4"/>
-              </a:rPr>
-              <a:t>https://mami-project.eu/index.php/weblinks/</a:t>
-            </a:r>
-            <a:r>
-              <a:rPr lang="en-GB" dirty="0"/>
-              <a:t> </a:t>
-            </a:r>
-          </a:p>
-          <a:p>
-            <a:r>
-              <a:rPr lang="en-GB" dirty="0"/>
-              <a:t>The MAMI Twitter account</a:t>
-            </a:r>
-          </a:p>
-          <a:p>
-            <a:pPr lvl="1"/>
-            <a:r>
-              <a:rPr lang="en-GB" dirty="0"/>
-              <a:t>@</a:t>
-            </a:r>
-            <a:r>
-              <a:rPr lang="en-GB" dirty="0" err="1"/>
-              <a:t>mamiproject</a:t>
-            </a:r>
-            <a:r>
-              <a:rPr lang="en-GB" dirty="0"/>
-              <a:t> was created in March 2015</a:t>
-            </a:r>
-          </a:p>
-          <a:p>
-            <a:pPr lvl="1"/>
-            <a:r>
-              <a:rPr lang="en-GB" dirty="0"/>
-              <a:t>Cumulated stats by 20 December 2018</a:t>
-            </a:r>
-          </a:p>
-          <a:p>
-            <a:pPr lvl="2"/>
-            <a:r>
-              <a:rPr lang="en-GB" dirty="0"/>
-              <a:t>244 followers</a:t>
-            </a:r>
-          </a:p>
-          <a:p>
-            <a:pPr lvl="2"/>
-            <a:r>
-              <a:rPr lang="en-GB" dirty="0"/>
-              <a:t>3686 tweets</a:t>
-            </a:r>
-          </a:p>
-          <a:p>
-            <a:endParaRPr lang="en-GB" dirty="0"/>
+              <a:t>WP4 in Numbers</a:t>
+            </a:r>
           </a:p>
         </p:txBody>
       </p:sp>
@@ -7320,83 +7199,6 @@
               <a:rPr lang="de-CH" smtClean="0"/>
               <a:pPr/>
               <a:t>16</a:t>
-            </a:fld>
-            <a:endParaRPr lang="de-CH" dirty="0"/>
-          </a:p>
-        </p:txBody>
-      </p:sp>
-    </p:spTree>
-    <p:extLst>
-      <p:ext uri="{BB962C8B-B14F-4D97-AF65-F5344CB8AC3E}">
-        <p14:creationId xmlns:p14="http://schemas.microsoft.com/office/powerpoint/2010/main" val="2098036363"/>
-      </p:ext>
-    </p:extLst>
-  </p:cSld>
-  <p:clrMapOvr>
-    <a:masterClrMapping/>
-  </p:clrMapOvr>
-  <p:transition spd="med"/>
-</p:sld>
-</file>
-
-<file path=ppt/slides/slide17.xml><?xml version="1.0" encoding="utf-8"?>
-<p:sld xmlns:a="http://schemas.openxmlformats.org/drawingml/2006/main" xmlns:r="http://schemas.openxmlformats.org/officeDocument/2006/relationships" xmlns:p="http://schemas.openxmlformats.org/presentationml/2006/main">
-  <p:cSld>
-    <p:spTree>
-      <p:nvGrpSpPr>
-        <p:cNvPr id="1" name=""/>
-        <p:cNvGrpSpPr/>
-        <p:nvPr/>
-      </p:nvGrpSpPr>
-      <p:grpSpPr>
-        <a:xfrm>
-          <a:off x="0" y="0"/>
-          <a:ext cx="0" cy="0"/>
-          <a:chOff x="0" y="0"/>
-          <a:chExt cx="0" cy="0"/>
-        </a:xfrm>
-      </p:grpSpPr>
-      <p:sp>
-        <p:nvSpPr>
-          <p:cNvPr id="2" name="Title 1"/>
-          <p:cNvSpPr>
-            <a:spLocks noGrp="1"/>
-          </p:cNvSpPr>
-          <p:nvPr>
-            <p:ph type="title"/>
-          </p:nvPr>
-        </p:nvSpPr>
-        <p:spPr/>
-        <p:txBody>
-          <a:bodyPr/>
-          <a:lstStyle/>
-          <a:p>
-            <a:r>
-              <a:rPr lang="en-US" dirty="0"/>
-              <a:t>WP4 in Numbers</a:t>
-            </a:r>
-          </a:p>
-        </p:txBody>
-      </p:sp>
-      <p:sp>
-        <p:nvSpPr>
-          <p:cNvPr id="4" name="Slide Number Placeholder 3"/>
-          <p:cNvSpPr>
-            <a:spLocks noGrp="1"/>
-          </p:cNvSpPr>
-          <p:nvPr>
-            <p:ph type="sldNum" sz="quarter" idx="16"/>
-          </p:nvPr>
-        </p:nvSpPr>
-        <p:spPr/>
-        <p:txBody>
-          <a:bodyPr/>
-          <a:lstStyle/>
-          <a:p>
-            <a:fld id="{CA36C8A0-BAEB-42C3-A2D9-B1F0D6FD294D}" type="slidenum">
-              <a:rPr lang="de-CH" smtClean="0"/>
-              <a:pPr/>
-              <a:t>17</a:t>
             </a:fld>
             <a:endParaRPr lang="de-CH" dirty="0"/>
           </a:p>
@@ -7417,7 +7219,7 @@
           <p:nvPr>
             <p:extLst>
               <p:ext uri="{D42A27DB-BD31-4B8C-83A1-F6EECF244321}">
-                <p14:modId xmlns:p14="http://schemas.microsoft.com/office/powerpoint/2010/main" val="2969087429"/>
+                <p14:modId xmlns:p14="http://schemas.microsoft.com/office/powerpoint/2010/main" val="2623508231"/>
               </p:ext>
             </p:extLst>
           </p:nvPr>
@@ -7572,7 +7374,7 @@
                       <a:pPr algn="ctr"/>
                       <a:r>
                         <a:rPr lang="en-US" sz="2400" dirty="0"/>
-                        <a:t>37 (2 final)</a:t>
+                        <a:t>37 (2 final, 11 adopted)</a:t>
                       </a:r>
                     </a:p>
                   </a:txBody>
@@ -7687,7 +7489,7 @@
                       <a:pPr algn="ctr"/>
                       <a:r>
                         <a:rPr lang="en-US" sz="2400" dirty="0"/>
-                        <a:t>49</a:t>
+                        <a:t>45</a:t>
                       </a:r>
                     </a:p>
                   </a:txBody>
@@ -7977,6 +7779,195 @@
 </p:sld>
 </file>
 
+<file path=ppt/slides/slide17.xml><?xml version="1.0" encoding="utf-8"?>
+<p:sld xmlns:a="http://schemas.openxmlformats.org/drawingml/2006/main" xmlns:r="http://schemas.openxmlformats.org/officeDocument/2006/relationships" xmlns:p="http://schemas.openxmlformats.org/presentationml/2006/main">
+  <p:cSld>
+    <p:spTree>
+      <p:nvGrpSpPr>
+        <p:cNvPr id="1" name=""/>
+        <p:cNvGrpSpPr/>
+        <p:nvPr/>
+      </p:nvGrpSpPr>
+      <p:grpSpPr>
+        <a:xfrm>
+          <a:off x="0" y="0"/>
+          <a:ext cx="0" cy="0"/>
+          <a:chOff x="0" y="0"/>
+          <a:chExt cx="0" cy="0"/>
+        </a:xfrm>
+      </p:grpSpPr>
+      <p:sp>
+        <p:nvSpPr>
+          <p:cNvPr id="2" name="Title 1"/>
+          <p:cNvSpPr>
+            <a:spLocks noGrp="1"/>
+          </p:cNvSpPr>
+          <p:nvPr>
+            <p:ph type="title"/>
+          </p:nvPr>
+        </p:nvSpPr>
+        <p:spPr/>
+        <p:txBody>
+          <a:bodyPr/>
+          <a:lstStyle/>
+          <a:p>
+            <a:r>
+              <a:rPr lang="en-US" dirty="0"/>
+              <a:t>As a </a:t>
+            </a:r>
+            <a:r>
+              <a:rPr lang="en-US" dirty="0" err="1"/>
+              <a:t>Conclusiom</a:t>
+            </a:r>
+            <a:endParaRPr lang="en-US" dirty="0"/>
+          </a:p>
+        </p:txBody>
+      </p:sp>
+      <p:sp>
+        <p:nvSpPr>
+          <p:cNvPr id="3" name="Text Placeholder 2"/>
+          <p:cNvSpPr>
+            <a:spLocks noGrp="1"/>
+          </p:cNvSpPr>
+          <p:nvPr>
+            <p:ph type="body" sz="quarter" idx="13"/>
+          </p:nvPr>
+        </p:nvSpPr>
+        <p:spPr/>
+        <p:txBody>
+          <a:bodyPr>
+            <a:normAutofit fontScale="77500" lnSpcReduction="20000"/>
+          </a:bodyPr>
+          <a:lstStyle/>
+          <a:p>
+            <a:r>
+              <a:rPr lang="en-GB" dirty="0"/>
+              <a:t>Standardisation</a:t>
+            </a:r>
+          </a:p>
+          <a:p>
+            <a:pPr lvl="1"/>
+            <a:r>
+              <a:rPr lang="en-GB" dirty="0"/>
+              <a:t>Key aspect, taking into account project technical goals</a:t>
+            </a:r>
+          </a:p>
+          <a:p>
+            <a:pPr lvl="1"/>
+            <a:r>
+              <a:rPr lang="en-GB" dirty="0"/>
+              <a:t>Significant results from all the other WPs</a:t>
+            </a:r>
+          </a:p>
+          <a:p>
+            <a:r>
+              <a:rPr lang="en-GB" dirty="0"/>
+              <a:t>Publications, Workshop and Conference Activities</a:t>
+            </a:r>
+          </a:p>
+          <a:p>
+            <a:pPr lvl="1"/>
+            <a:r>
+              <a:rPr lang="en-GB" dirty="0"/>
+              <a:t>Supported by previous encouraging results</a:t>
+            </a:r>
+          </a:p>
+          <a:p>
+            <a:r>
+              <a:rPr lang="en-GB" dirty="0"/>
+              <a:t>Exploitation and Innovation Management</a:t>
+            </a:r>
+          </a:p>
+          <a:p>
+            <a:pPr lvl="1"/>
+            <a:r>
+              <a:rPr lang="en-GB" dirty="0"/>
+              <a:t>Connected with ongoing initiatives of the industrial partners</a:t>
+            </a:r>
+          </a:p>
+          <a:p>
+            <a:r>
+              <a:rPr lang="en-GB" dirty="0"/>
+              <a:t>Academic Exploitation</a:t>
+            </a:r>
+          </a:p>
+          <a:p>
+            <a:pPr lvl="1"/>
+            <a:r>
+              <a:rPr lang="en-GB" dirty="0"/>
+              <a:t>Activity follow-up through the project collaboration mechanisms</a:t>
+            </a:r>
+          </a:p>
+          <a:p>
+            <a:r>
+              <a:rPr lang="en-GB" dirty="0"/>
+              <a:t>Public Communication Activities</a:t>
+            </a:r>
+          </a:p>
+          <a:p>
+            <a:pPr lvl="1"/>
+            <a:r>
+              <a:rPr lang="en-GB" dirty="0"/>
+              <a:t>Steps taken even before the official start of the project</a:t>
+            </a:r>
+          </a:p>
+          <a:p>
+            <a:r>
+              <a:rPr lang="en-GB" dirty="0" err="1"/>
+              <a:t>Middlebox</a:t>
+            </a:r>
+            <a:r>
+              <a:rPr lang="en-GB" dirty="0"/>
+              <a:t> Observatory Web Site Development and Maintenance</a:t>
+            </a:r>
+          </a:p>
+          <a:p>
+            <a:pPr lvl="1"/>
+            <a:r>
+              <a:rPr lang="en-GB" dirty="0"/>
+              <a:t>Data management and accessibility</a:t>
+            </a:r>
+          </a:p>
+        </p:txBody>
+      </p:sp>
+      <p:sp>
+        <p:nvSpPr>
+          <p:cNvPr id="5" name="Slide Number Placeholder 4"/>
+          <p:cNvSpPr>
+            <a:spLocks noGrp="1"/>
+          </p:cNvSpPr>
+          <p:nvPr>
+            <p:ph type="sldNum" sz="quarter" idx="16"/>
+          </p:nvPr>
+        </p:nvSpPr>
+        <p:spPr/>
+        <p:txBody>
+          <a:bodyPr/>
+          <a:lstStyle/>
+          <a:p>
+            <a:fld id="{CA36C8A0-BAEB-42C3-A2D9-B1F0D6FD294D}" type="slidenum">
+              <a:rPr lang="de-CH" smtClean="0"/>
+              <a:pPr/>
+              <a:t>17</a:t>
+            </a:fld>
+            <a:endParaRPr lang="de-CH" dirty="0"/>
+          </a:p>
+        </p:txBody>
+      </p:sp>
+    </p:spTree>
+    <p:extLst>
+      <p:ext uri="{BB962C8B-B14F-4D97-AF65-F5344CB8AC3E}">
+        <p14:creationId xmlns:p14="http://schemas.microsoft.com/office/powerpoint/2010/main" val="1525411876"/>
+      </p:ext>
+    </p:extLst>
+  </p:cSld>
+  <p:clrMapOvr>
+    <a:masterClrMapping/>
+  </p:clrMapOvr>
+  <p:transition spd="med"/>
+</p:sld>
+</file>
+
 <file path=ppt/slides/slide2.xml><?xml version="1.0" encoding="utf-8"?>
 <p:sld xmlns:a="http://schemas.openxmlformats.org/drawingml/2006/main" xmlns:r="http://schemas.openxmlformats.org/officeDocument/2006/relationships" xmlns:p="http://schemas.openxmlformats.org/presentationml/2006/main">
   <p:cSld>
@@ -8390,190 +8381,6 @@
       </p:grpSpPr>
       <p:sp>
         <p:nvSpPr>
-          <p:cNvPr id="2" name="Title 1"/>
-          <p:cNvSpPr>
-            <a:spLocks noGrp="1"/>
-          </p:cNvSpPr>
-          <p:nvPr>
-            <p:ph type="title"/>
-          </p:nvPr>
-        </p:nvSpPr>
-        <p:spPr/>
-        <p:txBody>
-          <a:bodyPr/>
-          <a:lstStyle/>
-          <a:p>
-            <a:r>
-              <a:rPr lang="en-US" dirty="0"/>
-              <a:t>A Few Remarks on the WP4 Tasks</a:t>
-            </a:r>
-          </a:p>
-        </p:txBody>
-      </p:sp>
-      <p:sp>
-        <p:nvSpPr>
-          <p:cNvPr id="3" name="Text Placeholder 2"/>
-          <p:cNvSpPr>
-            <a:spLocks noGrp="1"/>
-          </p:cNvSpPr>
-          <p:nvPr>
-            <p:ph type="body" sz="quarter" idx="13"/>
-          </p:nvPr>
-        </p:nvSpPr>
-        <p:spPr/>
-        <p:txBody>
-          <a:bodyPr>
-            <a:normAutofit fontScale="77500" lnSpcReduction="20000"/>
-          </a:bodyPr>
-          <a:lstStyle/>
-          <a:p>
-            <a:r>
-              <a:rPr lang="en-GB" dirty="0"/>
-              <a:t>Standardisation</a:t>
-            </a:r>
-          </a:p>
-          <a:p>
-            <a:pPr lvl="1"/>
-            <a:r>
-              <a:rPr lang="en-GB" dirty="0"/>
-              <a:t>Key aspect, taking into account project technical goals</a:t>
-            </a:r>
-          </a:p>
-          <a:p>
-            <a:pPr lvl="1"/>
-            <a:r>
-              <a:rPr lang="en-GB" dirty="0"/>
-              <a:t>Significant results from all the other WPs</a:t>
-            </a:r>
-          </a:p>
-          <a:p>
-            <a:r>
-              <a:rPr lang="en-GB" dirty="0"/>
-              <a:t>Publications, Workshop and Conference Activities</a:t>
-            </a:r>
-          </a:p>
-          <a:p>
-            <a:pPr lvl="1"/>
-            <a:r>
-              <a:rPr lang="en-GB" dirty="0"/>
-              <a:t>Supported by previous encouraging results</a:t>
-            </a:r>
-          </a:p>
-          <a:p>
-            <a:r>
-              <a:rPr lang="en-GB" dirty="0"/>
-              <a:t>Exploitation and Innovation Management</a:t>
-            </a:r>
-          </a:p>
-          <a:p>
-            <a:pPr lvl="1"/>
-            <a:r>
-              <a:rPr lang="en-GB" dirty="0"/>
-              <a:t>Connected with ongoing initiatives of the industrial partners</a:t>
-            </a:r>
-          </a:p>
-          <a:p>
-            <a:r>
-              <a:rPr lang="en-GB" dirty="0"/>
-              <a:t>Academic Exploitation</a:t>
-            </a:r>
-          </a:p>
-          <a:p>
-            <a:pPr lvl="1"/>
-            <a:r>
-              <a:rPr lang="en-GB" dirty="0"/>
-              <a:t>Activity follow-up through the project collaboration mechanisms</a:t>
-            </a:r>
-          </a:p>
-          <a:p>
-            <a:r>
-              <a:rPr lang="en-GB" dirty="0"/>
-              <a:t>Public Communication Activities</a:t>
-            </a:r>
-          </a:p>
-          <a:p>
-            <a:pPr lvl="1"/>
-            <a:r>
-              <a:rPr lang="en-GB" dirty="0"/>
-              <a:t>Steps taken even before the official start of the project</a:t>
-            </a:r>
-          </a:p>
-          <a:p>
-            <a:r>
-              <a:rPr lang="en-GB" dirty="0" err="1"/>
-              <a:t>Middlebox</a:t>
-            </a:r>
-            <a:r>
-              <a:rPr lang="en-GB" dirty="0"/>
-              <a:t> Observatory Web Site Development and Maintenance</a:t>
-            </a:r>
-          </a:p>
-          <a:p>
-            <a:pPr lvl="1"/>
-            <a:r>
-              <a:rPr lang="en-GB" dirty="0"/>
-              <a:t>Data management and accessibility</a:t>
-            </a:r>
-          </a:p>
-        </p:txBody>
-      </p:sp>
-      <p:sp>
-        <p:nvSpPr>
-          <p:cNvPr id="5" name="Slide Number Placeholder 4"/>
-          <p:cNvSpPr>
-            <a:spLocks noGrp="1"/>
-          </p:cNvSpPr>
-          <p:nvPr>
-            <p:ph type="sldNum" sz="quarter" idx="16"/>
-          </p:nvPr>
-        </p:nvSpPr>
-        <p:spPr/>
-        <p:txBody>
-          <a:bodyPr/>
-          <a:lstStyle/>
-          <a:p>
-            <a:fld id="{CA36C8A0-BAEB-42C3-A2D9-B1F0D6FD294D}" type="slidenum">
-              <a:rPr lang="de-CH" smtClean="0"/>
-              <a:pPr/>
-              <a:t>4</a:t>
-            </a:fld>
-            <a:endParaRPr lang="de-CH" dirty="0"/>
-          </a:p>
-        </p:txBody>
-      </p:sp>
-    </p:spTree>
-    <p:extLst>
-      <p:ext uri="{BB962C8B-B14F-4D97-AF65-F5344CB8AC3E}">
-        <p14:creationId xmlns:p14="http://schemas.microsoft.com/office/powerpoint/2010/main" val="1525411876"/>
-      </p:ext>
-    </p:extLst>
-  </p:cSld>
-  <p:clrMapOvr>
-    <a:masterClrMapping/>
-  </p:clrMapOvr>
-  <p:transition spd="med"/>
-</p:sld>
-</file>
-
-<file path=ppt/slides/slide5.xml><?xml version="1.0" encoding="utf-8"?>
-<p:sld xmlns:a="http://schemas.openxmlformats.org/drawingml/2006/main" xmlns:r="http://schemas.openxmlformats.org/officeDocument/2006/relationships" xmlns:p="http://schemas.openxmlformats.org/presentationml/2006/main">
-  <p:cSld>
-    <p:spTree>
-      <p:nvGrpSpPr>
-        <p:cNvPr id="1" name=""/>
-        <p:cNvGrpSpPr/>
-        <p:nvPr/>
-      </p:nvGrpSpPr>
-      <p:grpSpPr>
-        <a:xfrm>
-          <a:off x="0" y="0"/>
-          <a:ext cx="0" cy="0"/>
-          <a:chOff x="0" y="0"/>
-          <a:chExt cx="0" cy="0"/>
-        </a:xfrm>
-      </p:grpSpPr>
-      <p:sp>
-        <p:nvSpPr>
           <p:cNvPr id="2" name="Title 1">
             <a:extLst>
               <a:ext uri="{FF2B5EF4-FFF2-40B4-BE49-F238E27FC236}">
@@ -8730,7 +8537,7 @@
             <a:fld id="{CA36C8A0-BAEB-42C3-A2D9-B1F0D6FD294D}" type="slidenum">
               <a:rPr lang="de-CH" smtClean="0"/>
               <a:pPr/>
-              <a:t>5</a:t>
+              <a:t>4</a:t>
             </a:fld>
             <a:endParaRPr lang="de-CH" dirty="0"/>
           </a:p>
@@ -8750,7 +8557,7 @@
 </p:sld>
 </file>
 
-<file path=ppt/slides/slide6.xml><?xml version="1.0" encoding="utf-8"?>
+<file path=ppt/slides/slide5.xml><?xml version="1.0" encoding="utf-8"?>
 <p:sld xmlns:a="http://schemas.openxmlformats.org/drawingml/2006/main" xmlns:r="http://schemas.openxmlformats.org/officeDocument/2006/relationships" xmlns:p="http://schemas.openxmlformats.org/presentationml/2006/main">
   <p:cSld>
     <p:spTree>
@@ -8814,7 +8621,7 @@
         <p:spPr/>
         <p:txBody>
           <a:bodyPr>
-            <a:normAutofit fontScale="92500" lnSpcReduction="10000"/>
+            <a:normAutofit fontScale="85000" lnSpcReduction="10000"/>
           </a:bodyPr>
           <a:lstStyle/>
           <a:p>
@@ -8826,7 +8633,15 @@
           <a:p>
             <a:r>
               <a:rPr lang="en-GB" dirty="0"/>
-              <a:t>QUIC applicability document</a:t>
+              <a:t>QUIC applicability document (</a:t>
+            </a:r>
+            <a:r>
+              <a:rPr lang="es-ES" i="1" dirty="0" err="1"/>
+              <a:t>draft-ietf-quic-applicability</a:t>
+            </a:r>
+            <a:r>
+              <a:rPr lang="en-GB" dirty="0"/>
+              <a:t>)</a:t>
             </a:r>
           </a:p>
           <a:p>
@@ -8839,7 +8654,15 @@
           <a:p>
             <a:r>
               <a:rPr lang="en-GB" dirty="0"/>
-              <a:t>QUIC manageability document</a:t>
+              <a:t>QUIC manageability document (</a:t>
+            </a:r>
+            <a:r>
+              <a:rPr lang="es-ES" i="1" dirty="0" err="1"/>
+              <a:t>draft-ietf-quic-manageability</a:t>
+            </a:r>
+            <a:r>
+              <a:rPr lang="en-GB" dirty="0"/>
+              <a:t>)</a:t>
             </a:r>
           </a:p>
           <a:p>
@@ -8852,8 +8675,41 @@
           <a:p>
             <a:r>
               <a:rPr lang="en-GB" dirty="0"/>
-              <a:t>The spin bit controversy</a:t>
-            </a:r>
+              <a:t>The spin bit controversy (</a:t>
+            </a:r>
+            <a:r>
+              <a:rPr lang="es-ES" i="1" dirty="0" err="1"/>
+              <a:t>draft</a:t>
+            </a:r>
+            <a:r>
+              <a:rPr lang="es-ES" i="1" dirty="0"/>
+              <a:t>-</a:t>
+            </a:r>
+            <a:r>
+              <a:rPr lang="es-ES" i="1" dirty="0" err="1"/>
+              <a:t>ietf</a:t>
+            </a:r>
+            <a:r>
+              <a:rPr lang="es-ES" i="1" dirty="0"/>
+              <a:t>-</a:t>
+            </a:r>
+            <a:r>
+              <a:rPr lang="es-ES" i="1" dirty="0" err="1"/>
+              <a:t>quic</a:t>
+            </a:r>
+            <a:r>
+              <a:rPr lang="es-ES" i="1" dirty="0"/>
+              <a:t>-spin-</a:t>
+            </a:r>
+            <a:r>
+              <a:rPr lang="es-ES" i="1" dirty="0" err="1"/>
+              <a:t>exp</a:t>
+            </a:r>
+            <a:r>
+              <a:rPr lang="es-ES" dirty="0"/>
+              <a:t>)</a:t>
+            </a:r>
+            <a:endParaRPr lang="en-GB" dirty="0"/>
           </a:p>
           <a:p>
             <a:pPr lvl="1"/>
@@ -8872,8 +8728,17 @@
           <a:p>
             <a:r>
               <a:rPr lang="en-GB" dirty="0"/>
-              <a:t>IAB document on the wire image of a protocol</a:t>
-            </a:r>
+              <a:t>IAB document on the wire image of a protocol (</a:t>
+            </a:r>
+            <a:r>
+              <a:rPr lang="es-ES" i="1" dirty="0" err="1"/>
+              <a:t>draft-iab-wire-image</a:t>
+            </a:r>
+            <a:r>
+              <a:rPr lang="es-ES" dirty="0"/>
+              <a:t>)</a:t>
+            </a:r>
+            <a:endParaRPr lang="en-GB" dirty="0"/>
           </a:p>
           <a:p>
             <a:pPr lvl="1"/>
@@ -8914,7 +8779,7 @@
             <a:fld id="{CA36C8A0-BAEB-42C3-A2D9-B1F0D6FD294D}" type="slidenum">
               <a:rPr lang="de-CH" smtClean="0"/>
               <a:pPr/>
-              <a:t>6</a:t>
+              <a:t>5</a:t>
             </a:fld>
             <a:endParaRPr lang="de-CH" dirty="0"/>
           </a:p>
@@ -8934,7 +8799,7 @@
 </p:sld>
 </file>
 
-<file path=ppt/slides/slide7.xml><?xml version="1.0" encoding="utf-8"?>
+<file path=ppt/slides/slide6.xml><?xml version="1.0" encoding="utf-8"?>
 <p:sld xmlns:a="http://schemas.openxmlformats.org/drawingml/2006/main" xmlns:r="http://schemas.openxmlformats.org/officeDocument/2006/relationships" xmlns:p="http://schemas.openxmlformats.org/presentationml/2006/main">
   <p:cSld>
     <p:spTree>
@@ -8998,7 +8863,7 @@
         <p:spPr/>
         <p:txBody>
           <a:bodyPr>
-            <a:normAutofit lnSpcReduction="10000"/>
+            <a:normAutofit fontScale="92500"/>
           </a:bodyPr>
           <a:lstStyle/>
           <a:p>
@@ -9011,21 +8876,65 @@
             <a:pPr lvl="1"/>
             <a:r>
               <a:rPr lang="en-GB" dirty="0"/>
-              <a:t>Service architecture</a:t>
+              <a:t>Service architecture (</a:t>
+            </a:r>
+            <a:r>
+              <a:rPr lang="es-ES" i="1" dirty="0" err="1"/>
+              <a:t>draft-ietf-taps-arch</a:t>
+            </a:r>
+            <a:r>
+              <a:rPr lang="en-GB" dirty="0"/>
+              <a:t>)</a:t>
             </a:r>
           </a:p>
           <a:p>
             <a:pPr lvl="1"/>
             <a:r>
               <a:rPr lang="en-GB" dirty="0"/>
-              <a:t>Abstract interface to the transport layer services</a:t>
+              <a:t>Abstract interface to the transport layer services (</a:t>
+            </a:r>
+            <a:r>
+              <a:rPr lang="es-ES" i="1" dirty="0" err="1"/>
+              <a:t>draft</a:t>
+            </a:r>
+            <a:r>
+              <a:rPr lang="es-ES" i="1" dirty="0"/>
+              <a:t>-</a:t>
+            </a:r>
+            <a:r>
+              <a:rPr lang="es-ES" i="1" dirty="0" err="1"/>
+              <a:t>ietf</a:t>
+            </a:r>
+            <a:r>
+              <a:rPr lang="es-ES" i="1" dirty="0"/>
+              <a:t>-</a:t>
+            </a:r>
+            <a:r>
+              <a:rPr lang="es-ES" i="1" dirty="0" err="1"/>
+              <a:t>taps</a:t>
+            </a:r>
+            <a:r>
+              <a:rPr lang="es-ES" i="1" dirty="0"/>
+              <a:t>-interface</a:t>
+            </a:r>
+            <a:r>
+              <a:rPr lang="en-GB" dirty="0"/>
+              <a:t>)</a:t>
             </a:r>
           </a:p>
           <a:p>
             <a:pPr lvl="1"/>
             <a:r>
               <a:rPr lang="en-GB" dirty="0"/>
-              <a:t>An implementation of this interface</a:t>
+              <a:t>An implementation of this interface (</a:t>
+            </a:r>
+            <a:r>
+              <a:rPr lang="es-ES" i="1" dirty="0" err="1"/>
+              <a:t>draft-ietf-taps-impl</a:t>
+            </a:r>
+            <a:r>
+              <a:rPr lang="en-GB" dirty="0"/>
+              <a:t>)</a:t>
             </a:r>
           </a:p>
           <a:p>
@@ -9045,21 +8954,45 @@
             <a:pPr lvl="1"/>
             <a:r>
               <a:rPr lang="en-GB" dirty="0"/>
-              <a:t>Transport encryption analysis</a:t>
+              <a:t>Transport encryption analysis (</a:t>
+            </a:r>
+            <a:r>
+              <a:rPr lang="es-ES" i="1" dirty="0" err="1"/>
+              <a:t>draft-ietf-tsvwg-transport-encrypt</a:t>
+            </a:r>
+            <a:r>
+              <a:rPr lang="en-GB" dirty="0"/>
+              <a:t>)</a:t>
             </a:r>
           </a:p>
           <a:p>
             <a:pPr lvl="1"/>
             <a:r>
               <a:rPr lang="en-GB" dirty="0"/>
-              <a:t>MTU discovery</a:t>
+              <a:t>MTU discovery (</a:t>
+            </a:r>
+            <a:r>
+              <a:rPr lang="es-ES" i="1" dirty="0" err="1"/>
+              <a:t>draft-ietf-tsvwg-datagram-plpmtud</a:t>
+            </a:r>
+            <a:r>
+              <a:rPr lang="en-GB" dirty="0"/>
+              <a:t>)</a:t>
             </a:r>
           </a:p>
           <a:p>
             <a:pPr lvl="1"/>
             <a:r>
               <a:rPr lang="en-GB" dirty="0"/>
-              <a:t>UDP options</a:t>
+              <a:t>UDP options (</a:t>
+            </a:r>
+            <a:r>
+              <a:rPr lang="es-ES" i="1" dirty="0" err="1"/>
+              <a:t>draft-fairhurst-udp-options-cco</a:t>
+            </a:r>
+            <a:r>
+              <a:rPr lang="en-GB" dirty="0"/>
+              <a:t>)</a:t>
             </a:r>
           </a:p>
           <a:p>
@@ -9074,8 +9007,37 @@
             </a:r>
             <a:r>
               <a:rPr lang="en-GB" dirty="0"/>
-              <a:t> issues</a:t>
-            </a:r>
+              <a:t> issues (</a:t>
+            </a:r>
+            <a:r>
+              <a:rPr lang="es-ES" i="1" dirty="0" err="1"/>
+              <a:t>draft</a:t>
+            </a:r>
+            <a:r>
+              <a:rPr lang="es-ES" i="1" dirty="0"/>
+              <a:t>-</a:t>
+            </a:r>
+            <a:r>
+              <a:rPr lang="es-ES" i="1" dirty="0" err="1"/>
+              <a:t>fossati</a:t>
+            </a:r>
+            <a:r>
+              <a:rPr lang="es-ES" i="1" dirty="0"/>
+              <a:t>-</a:t>
+            </a:r>
+            <a:r>
+              <a:rPr lang="es-ES" i="1" dirty="0" err="1"/>
+              <a:t>tsvwg</a:t>
+            </a:r>
+            <a:r>
+              <a:rPr lang="es-ES" i="1" dirty="0"/>
+              <a:t>-lola</a:t>
+            </a:r>
+            <a:r>
+              <a:rPr lang="es-ES" dirty="0"/>
+              <a:t>)</a:t>
+            </a:r>
+            <a:endParaRPr lang="en-GB" dirty="0"/>
           </a:p>
           <a:p>
             <a:pPr lvl="1"/>
@@ -9107,7 +9069,7 @@
             <a:fld id="{CA36C8A0-BAEB-42C3-A2D9-B1F0D6FD294D}" type="slidenum">
               <a:rPr lang="de-CH" smtClean="0"/>
               <a:pPr/>
-              <a:t>7</a:t>
+              <a:t>6</a:t>
             </a:fld>
             <a:endParaRPr lang="de-CH" dirty="0"/>
           </a:p>
@@ -9127,7 +9089,7 @@
 </p:sld>
 </file>
 
-<file path=ppt/slides/slide8.xml><?xml version="1.0" encoding="utf-8"?>
+<file path=ppt/slides/slide7.xml><?xml version="1.0" encoding="utf-8"?>
 <p:sld xmlns:a="http://schemas.openxmlformats.org/drawingml/2006/main" xmlns:r="http://schemas.openxmlformats.org/officeDocument/2006/relationships" xmlns:p="http://schemas.openxmlformats.org/presentationml/2006/main">
   <p:cSld>
     <p:spTree>
@@ -9196,67 +9158,132 @@
           <a:lstStyle/>
           <a:p>
             <a:r>
-              <a:rPr lang="en-GB"/>
-              <a:t>The STAR protocol</a:t>
+              <a:rPr lang="en-GB" dirty="0"/>
+              <a:t>The STAR protocol (</a:t>
+            </a:r>
+            <a:r>
+              <a:rPr lang="es-ES" i="1" dirty="0" err="1"/>
+              <a:t>draft-ietf-acme-star</a:t>
+            </a:r>
+            <a:r>
+              <a:rPr lang="en-GB" dirty="0"/>
+              <a:t>)</a:t>
             </a:r>
           </a:p>
           <a:p>
             <a:pPr lvl="1"/>
             <a:r>
-              <a:rPr lang="en-GB"/>
+              <a:rPr lang="en-GB" dirty="0"/>
               <a:t>Extension to ACME certificate management mechanisms</a:t>
             </a:r>
           </a:p>
           <a:p>
             <a:pPr lvl="1"/>
             <a:r>
-              <a:rPr lang="en-GB"/>
+              <a:rPr lang="en-GB" dirty="0"/>
               <a:t>Supporting trust link delegation to unattended devices</a:t>
             </a:r>
           </a:p>
           <a:p>
             <a:pPr lvl="1"/>
             <a:r>
-              <a:rPr lang="en-GB"/>
-              <a:t>Full control by the delegating entity</a:t>
-            </a:r>
-          </a:p>
-          <a:p>
-            <a:r>
-              <a:rPr lang="en-GB"/>
-              <a:t>DTLS connection id</a:t>
+              <a:rPr lang="en-GB" dirty="0"/>
+              <a:t>Full control by the delegating entity (</a:t>
+            </a:r>
+            <a:r>
+              <a:rPr lang="es-ES" i="1" dirty="0" err="1"/>
+              <a:t>draft-ietf-acme-star-delegation</a:t>
+            </a:r>
+            <a:r>
+              <a:rPr lang="es-ES" dirty="0"/>
+              <a:t>)</a:t>
+            </a:r>
+            <a:endParaRPr lang="en-GB" dirty="0"/>
+          </a:p>
+          <a:p>
+            <a:r>
+              <a:rPr lang="en-GB" dirty="0"/>
+              <a:t>DTLS connection id (</a:t>
+            </a:r>
+            <a:r>
+              <a:rPr lang="es-ES" i="1" dirty="0" err="1"/>
+              <a:t>draft</a:t>
+            </a:r>
+            <a:r>
+              <a:rPr lang="es-ES" i="1" dirty="0"/>
+              <a:t>-</a:t>
+            </a:r>
+            <a:r>
+              <a:rPr lang="es-ES" i="1" dirty="0" err="1"/>
+              <a:t>ietf</a:t>
+            </a:r>
+            <a:r>
+              <a:rPr lang="es-ES" i="1" dirty="0"/>
+              <a:t>-</a:t>
+            </a:r>
+            <a:r>
+              <a:rPr lang="es-ES" i="1" dirty="0" err="1"/>
+              <a:t>tls</a:t>
+            </a:r>
+            <a:r>
+              <a:rPr lang="es-ES" i="1" dirty="0"/>
+              <a:t>-</a:t>
+            </a:r>
+            <a:r>
+              <a:rPr lang="es-ES" i="1" dirty="0" err="1"/>
+              <a:t>dtls</a:t>
+            </a:r>
+            <a:r>
+              <a:rPr lang="es-ES" i="1" dirty="0"/>
+              <a:t>-</a:t>
+            </a:r>
+            <a:r>
+              <a:rPr lang="es-ES" i="1" dirty="0" err="1"/>
+              <a:t>connection</a:t>
+            </a:r>
+            <a:r>
+              <a:rPr lang="es-ES" i="1" dirty="0"/>
+              <a:t>-id</a:t>
+            </a:r>
+            <a:r>
+              <a:rPr lang="en-GB" dirty="0"/>
+              <a:t>)</a:t>
             </a:r>
           </a:p>
           <a:p>
             <a:pPr lvl="1"/>
             <a:r>
-              <a:rPr lang="en-GB"/>
+              <a:rPr lang="en-GB" dirty="0"/>
               <a:t>Improve security association selection</a:t>
             </a:r>
           </a:p>
           <a:p>
             <a:r>
-              <a:rPr lang="en-GB"/>
+              <a:rPr lang="en-GB" dirty="0"/>
               <a:t>The efforts for a ”middlebox security protocol”</a:t>
             </a:r>
           </a:p>
           <a:p>
             <a:pPr lvl="1"/>
             <a:r>
-              <a:rPr lang="en-GB"/>
-              <a:t>ETSI TC-CYBER-0027-x</a:t>
-            </a:r>
-          </a:p>
-          <a:p>
-            <a:r>
-              <a:rPr lang="en-GB"/>
+              <a:rPr lang="en-GB" dirty="0"/>
+              <a:t>ETSI </a:t>
+            </a:r>
+            <a:r>
+              <a:rPr lang="en-GB" i="1" dirty="0"/>
+              <a:t>TC-CYBER-0027-x</a:t>
+            </a:r>
+          </a:p>
+          <a:p>
+            <a:r>
+              <a:rPr lang="en-GB" dirty="0"/>
               <a:t>Encrypted traffic inspection</a:t>
             </a:r>
           </a:p>
           <a:p>
             <a:pPr lvl="1"/>
             <a:r>
-              <a:rPr lang="en-GB"/>
+              <a:rPr lang="en-GB" dirty="0"/>
               <a:t>IEEE ETI</a:t>
             </a:r>
           </a:p>
@@ -9286,7 +9313,7 @@
             <a:fld id="{CA36C8A0-BAEB-42C3-A2D9-B1F0D6FD294D}" type="slidenum">
               <a:rPr lang="de-CH" smtClean="0"/>
               <a:pPr/>
-              <a:t>8</a:t>
+              <a:t>7</a:t>
             </a:fld>
             <a:endParaRPr lang="de-CH" dirty="0"/>
           </a:p>
@@ -9306,7 +9333,7 @@
 </p:sld>
 </file>
 
-<file path=ppt/slides/slide9.xml><?xml version="1.0" encoding="utf-8"?>
+<file path=ppt/slides/slide8.xml><?xml version="1.0" encoding="utf-8"?>
 <p:sld xmlns:a="http://schemas.openxmlformats.org/drawingml/2006/main" xmlns:r="http://schemas.openxmlformats.org/officeDocument/2006/relationships" xmlns:p="http://schemas.openxmlformats.org/presentationml/2006/main">
   <p:cSld>
     <p:spTree>
@@ -9485,7 +9512,7 @@
             <a:fld id="{CA36C8A0-BAEB-42C3-A2D9-B1F0D6FD294D}" type="slidenum">
               <a:rPr lang="de-CH" smtClean="0"/>
               <a:pPr/>
-              <a:t>9</a:t>
+              <a:t>8</a:t>
             </a:fld>
             <a:endParaRPr lang="de-CH" dirty="0"/>
           </a:p>
@@ -9495,6 +9522,204 @@
     <p:extLst>
       <p:ext uri="{BB962C8B-B14F-4D97-AF65-F5344CB8AC3E}">
         <p14:creationId xmlns:p14="http://schemas.microsoft.com/office/powerpoint/2010/main" val="1474220090"/>
+      </p:ext>
+    </p:extLst>
+  </p:cSld>
+  <p:clrMapOvr>
+    <a:masterClrMapping/>
+  </p:clrMapOvr>
+  <p:transition spd="med"/>
+</p:sld>
+</file>
+
+<file path=ppt/slides/slide9.xml><?xml version="1.0" encoding="utf-8"?>
+<p:sld xmlns:a="http://schemas.openxmlformats.org/drawingml/2006/main" xmlns:r="http://schemas.openxmlformats.org/officeDocument/2006/relationships" xmlns:p="http://schemas.openxmlformats.org/presentationml/2006/main">
+  <p:cSld>
+    <p:spTree>
+      <p:nvGrpSpPr>
+        <p:cNvPr id="1" name=""/>
+        <p:cNvGrpSpPr/>
+        <p:nvPr/>
+      </p:nvGrpSpPr>
+      <p:grpSpPr>
+        <a:xfrm>
+          <a:off x="0" y="0"/>
+          <a:ext cx="0" cy="0"/>
+          <a:chOff x="0" y="0"/>
+          <a:chExt cx="0" cy="0"/>
+        </a:xfrm>
+      </p:grpSpPr>
+      <p:sp>
+        <p:nvSpPr>
+          <p:cNvPr id="7" name="Titel 6"/>
+          <p:cNvSpPr>
+            <a:spLocks noGrp="1"/>
+          </p:cNvSpPr>
+          <p:nvPr>
+            <p:ph type="title"/>
+          </p:nvPr>
+        </p:nvSpPr>
+        <p:spPr/>
+        <p:txBody>
+          <a:bodyPr/>
+          <a:lstStyle/>
+          <a:p>
+            <a:r>
+              <a:rPr lang="en-US" dirty="0"/>
+              <a:t>Direct Industrial Applications</a:t>
+            </a:r>
+          </a:p>
+        </p:txBody>
+      </p:sp>
+      <p:sp>
+        <p:nvSpPr>
+          <p:cNvPr id="8" name="Textplatzhalter 7"/>
+          <p:cNvSpPr>
+            <a:spLocks noGrp="1"/>
+          </p:cNvSpPr>
+          <p:nvPr>
+            <p:ph type="body" sz="quarter" idx="13"/>
+          </p:nvPr>
+        </p:nvSpPr>
+        <p:spPr/>
+        <p:txBody>
+          <a:bodyPr>
+            <a:normAutofit fontScale="92500"/>
+          </a:bodyPr>
+          <a:lstStyle/>
+          <a:p>
+            <a:r>
+              <a:rPr lang="en-GB" dirty="0"/>
+              <a:t>Application of path-awareness principles</a:t>
+            </a:r>
+          </a:p>
+          <a:p>
+            <a:pPr lvl="1"/>
+            <a:r>
+              <a:rPr lang="en-GB" dirty="0"/>
+              <a:t>Enhanced cooperation with the mobile network in the </a:t>
+            </a:r>
+            <a:r>
+              <a:rPr lang="en-GB" dirty="0" err="1"/>
+              <a:t>Velocix</a:t>
+            </a:r>
+            <a:r>
+              <a:rPr lang="en-GB" dirty="0"/>
+              <a:t> product line</a:t>
+            </a:r>
+          </a:p>
+          <a:p>
+            <a:pPr lvl="2"/>
+            <a:r>
+              <a:rPr lang="en-GB" dirty="0"/>
+              <a:t>Better </a:t>
+            </a:r>
+            <a:r>
+              <a:rPr lang="en-GB" dirty="0" err="1"/>
+              <a:t>QoE</a:t>
+            </a:r>
+            <a:endParaRPr lang="en-GB" dirty="0"/>
+          </a:p>
+          <a:p>
+            <a:pPr lvl="2"/>
+            <a:r>
+              <a:rPr lang="en-GB" dirty="0"/>
+              <a:t>Expand the number of adaptation/personalisation functionality for OTT video delivery</a:t>
+            </a:r>
+          </a:p>
+          <a:p>
+            <a:pPr lvl="1"/>
+            <a:r>
+              <a:rPr lang="en-GB" dirty="0"/>
+              <a:t>Deployment of NFV-enabled middleboxes</a:t>
+            </a:r>
+          </a:p>
+          <a:p>
+            <a:pPr lvl="2"/>
+            <a:r>
+              <a:rPr lang="en-GB" dirty="0"/>
+              <a:t>Home environments</a:t>
+            </a:r>
+          </a:p>
+          <a:p>
+            <a:pPr lvl="2"/>
+            <a:r>
+              <a:rPr lang="en-GB" dirty="0" err="1"/>
+              <a:t>vCPE</a:t>
+            </a:r>
+            <a:r>
+              <a:rPr lang="en-GB" dirty="0"/>
+              <a:t> and </a:t>
+            </a:r>
+            <a:r>
+              <a:rPr lang="en-GB" dirty="0" err="1"/>
+              <a:t>uCPE</a:t>
+            </a:r>
+            <a:r>
+              <a:rPr lang="en-GB" dirty="0"/>
+              <a:t> services</a:t>
+            </a:r>
+          </a:p>
+          <a:p>
+            <a:r>
+              <a:rPr lang="en-GB" dirty="0"/>
+              <a:t>Applications of MAMI measurement data </a:t>
+            </a:r>
+          </a:p>
+          <a:p>
+            <a:pPr lvl="1"/>
+            <a:r>
+              <a:rPr lang="en-GB" dirty="0"/>
+              <a:t>Trustworthy data sources to evaluate the impact of pervasive encryption</a:t>
+            </a:r>
+          </a:p>
+          <a:p>
+            <a:pPr lvl="1"/>
+            <a:r>
+              <a:rPr lang="en-GB" dirty="0"/>
+              <a:t>Collaboration with the MONROE project for mobile Internet evidences</a:t>
+            </a:r>
+          </a:p>
+          <a:p>
+            <a:pPr lvl="1"/>
+            <a:r>
+              <a:rPr lang="en-GB" dirty="0"/>
+              <a:t>Application of the QUIC spin bit to measurement systems</a:t>
+            </a:r>
+          </a:p>
+          <a:p>
+            <a:endParaRPr lang="en-GB" dirty="0"/>
+          </a:p>
+        </p:txBody>
+      </p:sp>
+      <p:sp>
+        <p:nvSpPr>
+          <p:cNvPr id="5" name="Foliennummernplatzhalter 4"/>
+          <p:cNvSpPr>
+            <a:spLocks noGrp="1"/>
+          </p:cNvSpPr>
+          <p:nvPr>
+            <p:ph type="sldNum" sz="quarter" idx="16"/>
+          </p:nvPr>
+        </p:nvSpPr>
+        <p:spPr/>
+        <p:txBody>
+          <a:bodyPr/>
+          <a:lstStyle/>
+          <a:p>
+            <a:fld id="{CA36C8A0-BAEB-42C3-A2D9-B1F0D6FD294D}" type="slidenum">
+              <a:rPr lang="en-US" smtClean="0"/>
+              <a:pPr/>
+              <a:t>9</a:t>
+            </a:fld>
+            <a:endParaRPr lang="en-US"/>
+          </a:p>
+        </p:txBody>
+      </p:sp>
+    </p:spTree>
+    <p:extLst>
+      <p:ext uri="{BB962C8B-B14F-4D97-AF65-F5344CB8AC3E}">
+        <p14:creationId xmlns:p14="http://schemas.microsoft.com/office/powerpoint/2010/main" val="4104428027"/>
       </p:ext>
     </p:extLst>
   </p:cSld>

</xml_diff>